<commit_message>
Slide clean up, added a PDF version and a talking point placeholder file
Signed-off-by: vmzakharov <zakharov.vladimir.m@gmail.com>
</commit_message>
<xml_diff>
--- a/docs/RefactorToEcIntro.pptx
+++ b/docs/RefactorToEcIntro.pptx
@@ -15,8 +15,8 @@
     <p:sldId id="263" r:id="rId6"/>
     <p:sldId id="264" r:id="rId7"/>
     <p:sldId id="265" r:id="rId8"/>
-    <p:sldId id="267" r:id="rId9"/>
-    <p:sldId id="266" r:id="rId10"/>
+    <p:sldId id="266" r:id="rId9"/>
+    <p:sldId id="267" r:id="rId10"/>
   </p:sldIdLst>
   <p:sldSz cx="12192000" cy="6858000"/>
   <p:notesSz cx="6858000" cy="9144000"/>
@@ -4001,7 +4001,7 @@
         </p:blipFill>
         <p:spPr>
           <a:xfrm>
-            <a:off x="9556241" y="1365070"/>
+            <a:off x="9556241" y="2362020"/>
             <a:ext cx="1797559" cy="1370405"/>
           </a:xfrm>
           <a:prstGeom prst="rect">
@@ -4056,7 +4056,7 @@
         <p:spPr/>
         <p:txBody>
           <a:bodyPr>
-            <a:normAutofit fontScale="92500" lnSpcReduction="20000"/>
+            <a:normAutofit lnSpcReduction="10000"/>
           </a:bodyPr>
           <a:lstStyle/>
           <a:p>
@@ -4107,7 +4107,7 @@
             </a:br>
             <a:r>
               <a:rPr lang="en-US" dirty="0"/>
-              <a:t> framework named Caramel at Goldman Sachs in 2004</a:t>
+              <a:t>framework named Caramel at Goldman Sachs in 2004</a:t>
             </a:r>
           </a:p>
           <a:p>
@@ -4136,7 +4136,28 @@
             </a:pPr>
             <a:r>
               <a:rPr lang="en-US" dirty="0"/>
-              <a:t>GS Collections was migrated to the Eclipse Foundation, re-branded as Eclipse Collections in 2015</a:t>
+              <a:t>GS Collections was migrated to the Eclipse Foundation, re-branded as </a:t>
+            </a:r>
+            <a:r>
+              <a:rPr lang="en-US" dirty="0">
+                <a:solidFill>
+                  <a:srgbClr val="FF0000"/>
+                </a:solidFill>
+                <a:hlinkClick r:id="rId4"/>
+              </a:rPr>
+              <a:t>Eclipse Collections</a:t>
+            </a:r>
+            <a:r>
+              <a:rPr lang="en-US" dirty="0">
+                <a:solidFill>
+                  <a:srgbClr val="FF0000"/>
+                </a:solidFill>
+              </a:rPr>
+              <a:t> </a:t>
+            </a:r>
+            <a:r>
+              <a:rPr lang="en-US" dirty="0"/>
+              <a:t>in 2015</a:t>
             </a:r>
           </a:p>
           <a:p>
@@ -4147,16 +4168,18 @@
             </a:pPr>
             <a:r>
               <a:rPr lang="en-US" dirty="0"/>
-              <a:t>Eclipse Collections is open for contributions! https://github.com/eclipse/eclipse-collections/blob/ master/CONTRIBUTING.md</a:t>
+              <a:t>Eclipse Collections </a:t>
             </a:r>
-          </a:p>
-          <a:p>
-            <a:pPr>
-              <a:lnSpc>
-                <a:spcPct val="120000"/>
-              </a:lnSpc>
-            </a:pPr>
-            <a:endParaRPr lang="en-US" dirty="0"/>
+            <a:r>
+              <a:rPr lang="en-US" dirty="0">
+                <a:hlinkClick r:id="rId5"/>
+              </a:rPr>
+              <a:t>open for contributions</a:t>
+            </a:r>
+            <a:r>
+              <a:rPr lang="en-US" dirty="0"/>
+              <a:t>!</a:t>
+            </a:r>
           </a:p>
         </p:txBody>
       </p:sp>
@@ -4235,7 +4258,7 @@
         </p:nvCxnSpPr>
         <p:spPr>
           <a:xfrm rot="16200000" flipH="1">
-            <a:off x="7616049" y="4303489"/>
+            <a:off x="7616049" y="4137233"/>
             <a:ext cx="2092074" cy="486034"/>
           </a:xfrm>
           <a:prstGeom prst="curvedConnector3">
@@ -4318,7 +4341,7 @@
         </p:nvGrpSpPr>
         <p:grpSpPr>
           <a:xfrm>
-            <a:off x="3430530" y="3063683"/>
+            <a:off x="3430530" y="2897427"/>
             <a:ext cx="1390708" cy="873572"/>
             <a:chOff x="2298357" y="2685534"/>
             <a:chExt cx="3015048" cy="3410465"/>
@@ -4452,7 +4475,7 @@
         </p:nvSpPr>
         <p:spPr>
           <a:xfrm>
-            <a:off x="6988369" y="2572315"/>
+            <a:off x="6988369" y="2406059"/>
             <a:ext cx="1535833" cy="486382"/>
           </a:xfrm>
           <a:prstGeom prst="rect">
@@ -4484,7 +4507,7 @@
         </p:nvGrpSpPr>
         <p:grpSpPr>
           <a:xfrm>
-            <a:off x="7727877" y="2288175"/>
+            <a:off x="7727877" y="2121919"/>
             <a:ext cx="1614224" cy="2432086"/>
             <a:chOff x="2298357" y="2685534"/>
             <a:chExt cx="3015048" cy="3410465"/>
@@ -4611,11 +4634,13 @@
                 <a:rPr lang="en-US" sz="2000" dirty="0" err="1">
                   <a:ln>
                     <a:solidFill>
-                      <a:schemeClr val="tx1"/>
+                      <a:schemeClr val="accent6">
+                        <a:lumMod val="50000"/>
+                      </a:schemeClr>
                     </a:solidFill>
                   </a:ln>
                   <a:solidFill>
-                    <a:srgbClr val="00B050"/>
+                    <a:srgbClr val="33CC33"/>
                   </a:solidFill>
                 </a:rPr>
                 <a:t>BiMap</a:t>
@@ -4623,11 +4648,13 @@
               <a:endParaRPr lang="en-US" sz="2000" dirty="0">
                 <a:ln>
                   <a:solidFill>
-                    <a:schemeClr val="tx1"/>
+                    <a:schemeClr val="accent6">
+                      <a:lumMod val="50000"/>
+                    </a:schemeClr>
                   </a:solidFill>
                 </a:ln>
                 <a:solidFill>
-                  <a:srgbClr val="00B050"/>
+                  <a:srgbClr val="33CC33"/>
                 </a:solidFill>
               </a:endParaRPr>
             </a:p>
@@ -4710,7 +4737,7 @@
         </p:nvCxnSpPr>
         <p:spPr>
           <a:xfrm flipV="1">
-            <a:off x="2779879" y="3500469"/>
+            <a:off x="2779879" y="3334213"/>
             <a:ext cx="650651" cy="10051"/>
           </a:xfrm>
           <a:prstGeom prst="straightConnector1">
@@ -4757,7 +4784,7 @@
         </p:nvCxnSpPr>
         <p:spPr>
           <a:xfrm>
-            <a:off x="4821238" y="3500469"/>
+            <a:off x="4821238" y="3334213"/>
             <a:ext cx="531116" cy="0"/>
           </a:xfrm>
           <a:prstGeom prst="straightConnector1">
@@ -4802,7 +4829,7 @@
         </p:nvSpPr>
         <p:spPr>
           <a:xfrm>
-            <a:off x="2779878" y="2376748"/>
+            <a:off x="2779878" y="2210492"/>
             <a:ext cx="2568626" cy="898311"/>
           </a:xfrm>
           <a:custGeom>
@@ -5291,7 +5318,7 @@
         </p:nvGrpSpPr>
         <p:grpSpPr>
           <a:xfrm>
-            <a:off x="9744261" y="3198747"/>
+            <a:off x="9744261" y="3032491"/>
             <a:ext cx="1587611" cy="610938"/>
             <a:chOff x="2298357" y="2685534"/>
             <a:chExt cx="3015048" cy="3410465"/>
@@ -5429,7 +5456,7 @@
         </p:nvCxnSpPr>
         <p:spPr>
           <a:xfrm flipV="1">
-            <a:off x="9342101" y="3504216"/>
+            <a:off x="9342101" y="3337960"/>
             <a:ext cx="402160" cy="2"/>
           </a:xfrm>
           <a:prstGeom prst="straightConnector1">
@@ -5503,7 +5530,7 @@
         </p:nvGrpSpPr>
         <p:grpSpPr>
           <a:xfrm>
-            <a:off x="8152725" y="5592543"/>
+            <a:off x="8152725" y="5426287"/>
             <a:ext cx="2358204" cy="1007588"/>
             <a:chOff x="2298357" y="2685534"/>
             <a:chExt cx="3015048" cy="3410465"/>
@@ -5697,7 +5724,7 @@
         </p:nvGrpSpPr>
         <p:grpSpPr>
           <a:xfrm>
-            <a:off x="5352354" y="1895058"/>
+            <a:off x="5352354" y="1728802"/>
             <a:ext cx="1614224" cy="3210822"/>
             <a:chOff x="2298357" y="2685534"/>
             <a:chExt cx="3015048" cy="3410465"/>
@@ -5939,7 +5966,7 @@
         </p:nvSpPr>
         <p:spPr>
           <a:xfrm>
-            <a:off x="2783729" y="1361325"/>
+            <a:off x="2783729" y="1195069"/>
             <a:ext cx="4944148" cy="1735265"/>
           </a:xfrm>
           <a:custGeom>
@@ -6767,7 +6794,7 @@
         </p:nvCxnSpPr>
         <p:spPr>
           <a:xfrm>
-            <a:off x="6966578" y="3500469"/>
+            <a:off x="6966578" y="3334213"/>
             <a:ext cx="761299" cy="3749"/>
           </a:xfrm>
           <a:prstGeom prst="straightConnector1">
@@ -6812,7 +6839,7 @@
         </p:nvSpPr>
         <p:spPr>
           <a:xfrm flipV="1">
-            <a:off x="4821237" y="3758786"/>
+            <a:off x="4821237" y="3592530"/>
             <a:ext cx="2902789" cy="1880827"/>
           </a:xfrm>
           <a:custGeom>
@@ -7604,7 +7631,7 @@
         </p:nvCxnSpPr>
         <p:spPr>
           <a:xfrm rot="5400000">
-            <a:off x="9195037" y="4249511"/>
+            <a:off x="9195037" y="4083255"/>
             <a:ext cx="1782856" cy="903205"/>
           </a:xfrm>
           <a:prstGeom prst="curvedConnector3">
@@ -7652,7 +7679,7 @@
         </p:nvSpPr>
         <p:spPr>
           <a:xfrm>
-            <a:off x="5062082" y="1624169"/>
+            <a:off x="5062082" y="1457913"/>
             <a:ext cx="636602" cy="631606"/>
           </a:xfrm>
           <a:custGeom>
@@ -7793,8 +7820,8 @@
         </p:nvGrpSpPr>
         <p:grpSpPr>
           <a:xfrm>
-            <a:off x="785796" y="2979006"/>
-            <a:ext cx="2015206" cy="1063028"/>
+            <a:off x="785796" y="2812750"/>
+            <a:ext cx="1997932" cy="1063028"/>
             <a:chOff x="2298357" y="2685534"/>
             <a:chExt cx="3015048" cy="3410465"/>
           </a:xfrm>
@@ -7926,1316 +7953,143 @@
       </p:grpSp>
       <p:sp>
         <p:nvSpPr>
-          <p:cNvPr id="83" name="Freeform: Shape 82">
-            <a:extLst>
-              <a:ext uri="{FF2B5EF4-FFF2-40B4-BE49-F238E27FC236}">
-                <a16:creationId xmlns:a16="http://schemas.microsoft.com/office/drawing/2014/main" id="{74BC7405-45B4-4D5E-BD83-136EF3B0C1CA}"/>
-              </a:ext>
-            </a:extLst>
-          </p:cNvPr>
-          <p:cNvSpPr/>
-          <p:nvPr/>
-        </p:nvSpPr>
-        <p:spPr>
-          <a:xfrm flipV="1">
-            <a:off x="1681071" y="4551129"/>
-            <a:ext cx="6059599" cy="1476154"/>
-          </a:xfrm>
-          <a:custGeom>
-            <a:avLst/>
-            <a:gdLst>
-              <a:gd name="connsiteX0" fmla="*/ 0 w 3060745"/>
-              <a:gd name="connsiteY0" fmla="*/ 1396478 h 1469423"/>
-              <a:gd name="connsiteX1" fmla="*/ 696686 w 3060745"/>
-              <a:gd name="connsiteY1" fmla="*/ 220821 h 1469423"/>
-              <a:gd name="connsiteX2" fmla="*/ 2242457 w 3060745"/>
-              <a:gd name="connsiteY2" fmla="*/ 68421 h 1469423"/>
-              <a:gd name="connsiteX3" fmla="*/ 2634343 w 3060745"/>
-              <a:gd name="connsiteY3" fmla="*/ 1011849 h 1469423"/>
-              <a:gd name="connsiteX4" fmla="*/ 3033486 w 3060745"/>
-              <a:gd name="connsiteY4" fmla="*/ 1440021 h 1469423"/>
-              <a:gd name="connsiteX5" fmla="*/ 3026228 w 3060745"/>
-              <a:gd name="connsiteY5" fmla="*/ 1432764 h 1469423"/>
-              <a:gd name="connsiteX6" fmla="*/ 3026228 w 3060745"/>
-              <a:gd name="connsiteY6" fmla="*/ 1432764 h 1469423"/>
-              <a:gd name="connsiteX0" fmla="*/ 0 w 3060745"/>
-              <a:gd name="connsiteY0" fmla="*/ 1449918 h 1522863"/>
-              <a:gd name="connsiteX1" fmla="*/ 696686 w 3060745"/>
-              <a:gd name="connsiteY1" fmla="*/ 274261 h 1522863"/>
-              <a:gd name="connsiteX2" fmla="*/ 2242457 w 3060745"/>
-              <a:gd name="connsiteY2" fmla="*/ 121861 h 1522863"/>
-              <a:gd name="connsiteX3" fmla="*/ 2634343 w 3060745"/>
-              <a:gd name="connsiteY3" fmla="*/ 1065289 h 1522863"/>
-              <a:gd name="connsiteX4" fmla="*/ 3033486 w 3060745"/>
-              <a:gd name="connsiteY4" fmla="*/ 1493461 h 1522863"/>
-              <a:gd name="connsiteX5" fmla="*/ 3026228 w 3060745"/>
-              <a:gd name="connsiteY5" fmla="*/ 1486204 h 1522863"/>
-              <a:gd name="connsiteX6" fmla="*/ 3026228 w 3060745"/>
-              <a:gd name="connsiteY6" fmla="*/ 1486204 h 1522863"/>
-              <a:gd name="connsiteX0" fmla="*/ 0 w 3060745"/>
-              <a:gd name="connsiteY0" fmla="*/ 1388915 h 1461860"/>
-              <a:gd name="connsiteX1" fmla="*/ 544286 w 3060745"/>
-              <a:gd name="connsiteY1" fmla="*/ 1185715 h 1461860"/>
-              <a:gd name="connsiteX2" fmla="*/ 696686 w 3060745"/>
-              <a:gd name="connsiteY2" fmla="*/ 213258 h 1461860"/>
-              <a:gd name="connsiteX3" fmla="*/ 2242457 w 3060745"/>
-              <a:gd name="connsiteY3" fmla="*/ 60858 h 1461860"/>
-              <a:gd name="connsiteX4" fmla="*/ 2634343 w 3060745"/>
-              <a:gd name="connsiteY4" fmla="*/ 1004286 h 1461860"/>
-              <a:gd name="connsiteX5" fmla="*/ 3033486 w 3060745"/>
-              <a:gd name="connsiteY5" fmla="*/ 1432458 h 1461860"/>
-              <a:gd name="connsiteX6" fmla="*/ 3026228 w 3060745"/>
-              <a:gd name="connsiteY6" fmla="*/ 1425201 h 1461860"/>
-              <a:gd name="connsiteX7" fmla="*/ 3026228 w 3060745"/>
-              <a:gd name="connsiteY7" fmla="*/ 1425201 h 1461860"/>
-              <a:gd name="connsiteX0" fmla="*/ 0 w 3060745"/>
-              <a:gd name="connsiteY0" fmla="*/ 1429854 h 1502799"/>
-              <a:gd name="connsiteX1" fmla="*/ 544286 w 3060745"/>
-              <a:gd name="connsiteY1" fmla="*/ 1226654 h 1502799"/>
-              <a:gd name="connsiteX2" fmla="*/ 1008743 w 3060745"/>
-              <a:gd name="connsiteY2" fmla="*/ 152597 h 1502799"/>
-              <a:gd name="connsiteX3" fmla="*/ 2242457 w 3060745"/>
-              <a:gd name="connsiteY3" fmla="*/ 101797 h 1502799"/>
-              <a:gd name="connsiteX4" fmla="*/ 2634343 w 3060745"/>
-              <a:gd name="connsiteY4" fmla="*/ 1045225 h 1502799"/>
-              <a:gd name="connsiteX5" fmla="*/ 3033486 w 3060745"/>
-              <a:gd name="connsiteY5" fmla="*/ 1473397 h 1502799"/>
-              <a:gd name="connsiteX6" fmla="*/ 3026228 w 3060745"/>
-              <a:gd name="connsiteY6" fmla="*/ 1466140 h 1502799"/>
-              <a:gd name="connsiteX7" fmla="*/ 3026228 w 3060745"/>
-              <a:gd name="connsiteY7" fmla="*/ 1466140 h 1502799"/>
-              <a:gd name="connsiteX0" fmla="*/ 0 w 3833493"/>
-              <a:gd name="connsiteY0" fmla="*/ 1429854 h 1520408"/>
-              <a:gd name="connsiteX1" fmla="*/ 544286 w 3833493"/>
-              <a:gd name="connsiteY1" fmla="*/ 1226654 h 1520408"/>
-              <a:gd name="connsiteX2" fmla="*/ 1008743 w 3833493"/>
-              <a:gd name="connsiteY2" fmla="*/ 152597 h 1520408"/>
-              <a:gd name="connsiteX3" fmla="*/ 2242457 w 3833493"/>
-              <a:gd name="connsiteY3" fmla="*/ 101797 h 1520408"/>
-              <a:gd name="connsiteX4" fmla="*/ 2634343 w 3833493"/>
-              <a:gd name="connsiteY4" fmla="*/ 1045225 h 1520408"/>
-              <a:gd name="connsiteX5" fmla="*/ 3033486 w 3833493"/>
-              <a:gd name="connsiteY5" fmla="*/ 1473397 h 1520408"/>
-              <a:gd name="connsiteX6" fmla="*/ 3026228 w 3833493"/>
-              <a:gd name="connsiteY6" fmla="*/ 1466140 h 1520408"/>
-              <a:gd name="connsiteX7" fmla="*/ 3833493 w 3833493"/>
-              <a:gd name="connsiteY7" fmla="*/ 1088768 h 1520408"/>
-              <a:gd name="connsiteX0" fmla="*/ 0 w 3833493"/>
-              <a:gd name="connsiteY0" fmla="*/ 1429854 h 1620383"/>
-              <a:gd name="connsiteX1" fmla="*/ 544286 w 3833493"/>
-              <a:gd name="connsiteY1" fmla="*/ 1226654 h 1620383"/>
-              <a:gd name="connsiteX2" fmla="*/ 1008743 w 3833493"/>
-              <a:gd name="connsiteY2" fmla="*/ 152597 h 1620383"/>
-              <a:gd name="connsiteX3" fmla="*/ 2242457 w 3833493"/>
-              <a:gd name="connsiteY3" fmla="*/ 101797 h 1620383"/>
-              <a:gd name="connsiteX4" fmla="*/ 2634343 w 3833493"/>
-              <a:gd name="connsiteY4" fmla="*/ 1045225 h 1620383"/>
-              <a:gd name="connsiteX5" fmla="*/ 3033486 w 3833493"/>
-              <a:gd name="connsiteY5" fmla="*/ 1473397 h 1620383"/>
-              <a:gd name="connsiteX6" fmla="*/ 3026228 w 3833493"/>
-              <a:gd name="connsiteY6" fmla="*/ 1466140 h 1620383"/>
-              <a:gd name="connsiteX7" fmla="*/ 3833493 w 3833493"/>
-              <a:gd name="connsiteY7" fmla="*/ 1088768 h 1620383"/>
-              <a:gd name="connsiteX0" fmla="*/ 0 w 3307832"/>
-              <a:gd name="connsiteY0" fmla="*/ 1429854 h 1898351"/>
-              <a:gd name="connsiteX1" fmla="*/ 544286 w 3307832"/>
-              <a:gd name="connsiteY1" fmla="*/ 1226654 h 1898351"/>
-              <a:gd name="connsiteX2" fmla="*/ 1008743 w 3307832"/>
-              <a:gd name="connsiteY2" fmla="*/ 152597 h 1898351"/>
-              <a:gd name="connsiteX3" fmla="*/ 2242457 w 3307832"/>
-              <a:gd name="connsiteY3" fmla="*/ 101797 h 1898351"/>
-              <a:gd name="connsiteX4" fmla="*/ 2634343 w 3307832"/>
-              <a:gd name="connsiteY4" fmla="*/ 1045225 h 1898351"/>
-              <a:gd name="connsiteX5" fmla="*/ 3033486 w 3307832"/>
-              <a:gd name="connsiteY5" fmla="*/ 1473397 h 1898351"/>
-              <a:gd name="connsiteX6" fmla="*/ 3026228 w 3307832"/>
-              <a:gd name="connsiteY6" fmla="*/ 1466140 h 1898351"/>
-              <a:gd name="connsiteX7" fmla="*/ 3307832 w 3307832"/>
-              <a:gd name="connsiteY7" fmla="*/ 1473397 h 1898351"/>
-              <a:gd name="connsiteX0" fmla="*/ 0 w 3307832"/>
-              <a:gd name="connsiteY0" fmla="*/ 1429854 h 1502799"/>
-              <a:gd name="connsiteX1" fmla="*/ 544286 w 3307832"/>
-              <a:gd name="connsiteY1" fmla="*/ 1226654 h 1502799"/>
-              <a:gd name="connsiteX2" fmla="*/ 1008743 w 3307832"/>
-              <a:gd name="connsiteY2" fmla="*/ 152597 h 1502799"/>
-              <a:gd name="connsiteX3" fmla="*/ 2242457 w 3307832"/>
-              <a:gd name="connsiteY3" fmla="*/ 101797 h 1502799"/>
-              <a:gd name="connsiteX4" fmla="*/ 2634343 w 3307832"/>
-              <a:gd name="connsiteY4" fmla="*/ 1045225 h 1502799"/>
-              <a:gd name="connsiteX5" fmla="*/ 3033486 w 3307832"/>
-              <a:gd name="connsiteY5" fmla="*/ 1473397 h 1502799"/>
-              <a:gd name="connsiteX6" fmla="*/ 3026228 w 3307832"/>
-              <a:gd name="connsiteY6" fmla="*/ 1466140 h 1502799"/>
-              <a:gd name="connsiteX7" fmla="*/ 3307832 w 3307832"/>
-              <a:gd name="connsiteY7" fmla="*/ 1473397 h 1502799"/>
-              <a:gd name="connsiteX0" fmla="*/ 0 w 3307832"/>
-              <a:gd name="connsiteY0" fmla="*/ 1429854 h 1502799"/>
-              <a:gd name="connsiteX1" fmla="*/ 544286 w 3307832"/>
-              <a:gd name="connsiteY1" fmla="*/ 1226654 h 1502799"/>
-              <a:gd name="connsiteX2" fmla="*/ 1008743 w 3307832"/>
-              <a:gd name="connsiteY2" fmla="*/ 152597 h 1502799"/>
-              <a:gd name="connsiteX3" fmla="*/ 2242457 w 3307832"/>
-              <a:gd name="connsiteY3" fmla="*/ 101797 h 1502799"/>
-              <a:gd name="connsiteX4" fmla="*/ 2634343 w 3307832"/>
-              <a:gd name="connsiteY4" fmla="*/ 1045225 h 1502799"/>
-              <a:gd name="connsiteX5" fmla="*/ 3033486 w 3307832"/>
-              <a:gd name="connsiteY5" fmla="*/ 1473397 h 1502799"/>
-              <a:gd name="connsiteX6" fmla="*/ 3026228 w 3307832"/>
-              <a:gd name="connsiteY6" fmla="*/ 1466140 h 1502799"/>
-              <a:gd name="connsiteX7" fmla="*/ 3307832 w 3307832"/>
-              <a:gd name="connsiteY7" fmla="*/ 1473397 h 1502799"/>
-              <a:gd name="connsiteX0" fmla="*/ 0 w 3307832"/>
-              <a:gd name="connsiteY0" fmla="*/ 1429854 h 1502799"/>
-              <a:gd name="connsiteX1" fmla="*/ 544286 w 3307832"/>
-              <a:gd name="connsiteY1" fmla="*/ 1226654 h 1502799"/>
-              <a:gd name="connsiteX2" fmla="*/ 1008743 w 3307832"/>
-              <a:gd name="connsiteY2" fmla="*/ 152597 h 1502799"/>
-              <a:gd name="connsiteX3" fmla="*/ 2242457 w 3307832"/>
-              <a:gd name="connsiteY3" fmla="*/ 101797 h 1502799"/>
-              <a:gd name="connsiteX4" fmla="*/ 2634343 w 3307832"/>
-              <a:gd name="connsiteY4" fmla="*/ 1045225 h 1502799"/>
-              <a:gd name="connsiteX5" fmla="*/ 3033486 w 3307832"/>
-              <a:gd name="connsiteY5" fmla="*/ 1473397 h 1502799"/>
-              <a:gd name="connsiteX6" fmla="*/ 3026228 w 3307832"/>
-              <a:gd name="connsiteY6" fmla="*/ 1466140 h 1502799"/>
-              <a:gd name="connsiteX7" fmla="*/ 3307832 w 3307832"/>
-              <a:gd name="connsiteY7" fmla="*/ 1473397 h 1502799"/>
-              <a:gd name="connsiteX0" fmla="*/ 0 w 3307832"/>
-              <a:gd name="connsiteY0" fmla="*/ 1429854 h 1502799"/>
-              <a:gd name="connsiteX1" fmla="*/ 544286 w 3307832"/>
-              <a:gd name="connsiteY1" fmla="*/ 1226654 h 1502799"/>
-              <a:gd name="connsiteX2" fmla="*/ 1008743 w 3307832"/>
-              <a:gd name="connsiteY2" fmla="*/ 152597 h 1502799"/>
-              <a:gd name="connsiteX3" fmla="*/ 2242457 w 3307832"/>
-              <a:gd name="connsiteY3" fmla="*/ 101797 h 1502799"/>
-              <a:gd name="connsiteX4" fmla="*/ 2634343 w 3307832"/>
-              <a:gd name="connsiteY4" fmla="*/ 1045225 h 1502799"/>
-              <a:gd name="connsiteX5" fmla="*/ 3033486 w 3307832"/>
-              <a:gd name="connsiteY5" fmla="*/ 1473397 h 1502799"/>
-              <a:gd name="connsiteX6" fmla="*/ 3026228 w 3307832"/>
-              <a:gd name="connsiteY6" fmla="*/ 1466140 h 1502799"/>
-              <a:gd name="connsiteX7" fmla="*/ 3307832 w 3307832"/>
-              <a:gd name="connsiteY7" fmla="*/ 1473397 h 1502799"/>
-              <a:gd name="connsiteX0" fmla="*/ 0 w 3307832"/>
-              <a:gd name="connsiteY0" fmla="*/ 1429854 h 1487664"/>
-              <a:gd name="connsiteX1" fmla="*/ 544286 w 3307832"/>
-              <a:gd name="connsiteY1" fmla="*/ 1226654 h 1487664"/>
-              <a:gd name="connsiteX2" fmla="*/ 1008743 w 3307832"/>
-              <a:gd name="connsiteY2" fmla="*/ 152597 h 1487664"/>
-              <a:gd name="connsiteX3" fmla="*/ 2242457 w 3307832"/>
-              <a:gd name="connsiteY3" fmla="*/ 101797 h 1487664"/>
-              <a:gd name="connsiteX4" fmla="*/ 2634343 w 3307832"/>
-              <a:gd name="connsiteY4" fmla="*/ 1045225 h 1487664"/>
-              <a:gd name="connsiteX5" fmla="*/ 3033486 w 3307832"/>
-              <a:gd name="connsiteY5" fmla="*/ 1473397 h 1487664"/>
-              <a:gd name="connsiteX6" fmla="*/ 3213964 w 3307832"/>
-              <a:gd name="connsiteY6" fmla="*/ 1393568 h 1487664"/>
-              <a:gd name="connsiteX7" fmla="*/ 3307832 w 3307832"/>
-              <a:gd name="connsiteY7" fmla="*/ 1473397 h 1487664"/>
-              <a:gd name="connsiteX0" fmla="*/ 0 w 3307832"/>
-              <a:gd name="connsiteY0" fmla="*/ 1429854 h 1515186"/>
-              <a:gd name="connsiteX1" fmla="*/ 544286 w 3307832"/>
-              <a:gd name="connsiteY1" fmla="*/ 1226654 h 1515186"/>
-              <a:gd name="connsiteX2" fmla="*/ 1008743 w 3307832"/>
-              <a:gd name="connsiteY2" fmla="*/ 152597 h 1515186"/>
-              <a:gd name="connsiteX3" fmla="*/ 2242457 w 3307832"/>
-              <a:gd name="connsiteY3" fmla="*/ 101797 h 1515186"/>
-              <a:gd name="connsiteX4" fmla="*/ 2634343 w 3307832"/>
-              <a:gd name="connsiteY4" fmla="*/ 1045225 h 1515186"/>
-              <a:gd name="connsiteX5" fmla="*/ 3033486 w 3307832"/>
-              <a:gd name="connsiteY5" fmla="*/ 1473397 h 1515186"/>
-              <a:gd name="connsiteX6" fmla="*/ 3176418 w 3307832"/>
-              <a:gd name="connsiteY6" fmla="*/ 50997 h 1515186"/>
-              <a:gd name="connsiteX7" fmla="*/ 3307832 w 3307832"/>
-              <a:gd name="connsiteY7" fmla="*/ 1473397 h 1515186"/>
-              <a:gd name="connsiteX0" fmla="*/ 0 w 3307832"/>
-              <a:gd name="connsiteY0" fmla="*/ 1429854 h 1505113"/>
-              <a:gd name="connsiteX1" fmla="*/ 544286 w 3307832"/>
-              <a:gd name="connsiteY1" fmla="*/ 1226654 h 1505113"/>
-              <a:gd name="connsiteX2" fmla="*/ 1008743 w 3307832"/>
-              <a:gd name="connsiteY2" fmla="*/ 152597 h 1505113"/>
-              <a:gd name="connsiteX3" fmla="*/ 2242457 w 3307832"/>
-              <a:gd name="connsiteY3" fmla="*/ 101797 h 1505113"/>
-              <a:gd name="connsiteX4" fmla="*/ 2634343 w 3307832"/>
-              <a:gd name="connsiteY4" fmla="*/ 1045225 h 1505113"/>
-              <a:gd name="connsiteX5" fmla="*/ 3033486 w 3307832"/>
-              <a:gd name="connsiteY5" fmla="*/ 1473397 h 1505113"/>
-              <a:gd name="connsiteX6" fmla="*/ 3307832 w 3307832"/>
-              <a:gd name="connsiteY6" fmla="*/ 1473397 h 1505113"/>
-              <a:gd name="connsiteX0" fmla="*/ 0 w 3307832"/>
-              <a:gd name="connsiteY0" fmla="*/ 1429854 h 1495437"/>
-              <a:gd name="connsiteX1" fmla="*/ 544286 w 3307832"/>
-              <a:gd name="connsiteY1" fmla="*/ 1226654 h 1495437"/>
-              <a:gd name="connsiteX2" fmla="*/ 1008743 w 3307832"/>
-              <a:gd name="connsiteY2" fmla="*/ 152597 h 1495437"/>
-              <a:gd name="connsiteX3" fmla="*/ 2242457 w 3307832"/>
-              <a:gd name="connsiteY3" fmla="*/ 101797 h 1495437"/>
-              <a:gd name="connsiteX4" fmla="*/ 2634343 w 3307832"/>
-              <a:gd name="connsiteY4" fmla="*/ 1045225 h 1495437"/>
-              <a:gd name="connsiteX5" fmla="*/ 3033486 w 3307832"/>
-              <a:gd name="connsiteY5" fmla="*/ 1473397 h 1495437"/>
-              <a:gd name="connsiteX6" fmla="*/ 3307832 w 3307832"/>
-              <a:gd name="connsiteY6" fmla="*/ 1473397 h 1495437"/>
-              <a:gd name="connsiteX0" fmla="*/ 0 w 3389184"/>
-              <a:gd name="connsiteY0" fmla="*/ 1429854 h 1495437"/>
-              <a:gd name="connsiteX1" fmla="*/ 625638 w 3389184"/>
-              <a:gd name="connsiteY1" fmla="*/ 1226654 h 1495437"/>
-              <a:gd name="connsiteX2" fmla="*/ 1090095 w 3389184"/>
-              <a:gd name="connsiteY2" fmla="*/ 152597 h 1495437"/>
-              <a:gd name="connsiteX3" fmla="*/ 2323809 w 3389184"/>
-              <a:gd name="connsiteY3" fmla="*/ 101797 h 1495437"/>
-              <a:gd name="connsiteX4" fmla="*/ 2715695 w 3389184"/>
-              <a:gd name="connsiteY4" fmla="*/ 1045225 h 1495437"/>
-              <a:gd name="connsiteX5" fmla="*/ 3114838 w 3389184"/>
-              <a:gd name="connsiteY5" fmla="*/ 1473397 h 1495437"/>
-              <a:gd name="connsiteX6" fmla="*/ 3389184 w 3389184"/>
-              <a:gd name="connsiteY6" fmla="*/ 1473397 h 1495437"/>
-              <a:gd name="connsiteX0" fmla="*/ 0 w 3389184"/>
-              <a:gd name="connsiteY0" fmla="*/ 1429854 h 1495437"/>
-              <a:gd name="connsiteX1" fmla="*/ 625638 w 3389184"/>
-              <a:gd name="connsiteY1" fmla="*/ 1226654 h 1495437"/>
-              <a:gd name="connsiteX2" fmla="*/ 1090095 w 3389184"/>
-              <a:gd name="connsiteY2" fmla="*/ 152597 h 1495437"/>
-              <a:gd name="connsiteX3" fmla="*/ 2323809 w 3389184"/>
-              <a:gd name="connsiteY3" fmla="*/ 101797 h 1495437"/>
-              <a:gd name="connsiteX4" fmla="*/ 2715695 w 3389184"/>
-              <a:gd name="connsiteY4" fmla="*/ 1045225 h 1495437"/>
-              <a:gd name="connsiteX5" fmla="*/ 3114838 w 3389184"/>
-              <a:gd name="connsiteY5" fmla="*/ 1473397 h 1495437"/>
-              <a:gd name="connsiteX6" fmla="*/ 3389184 w 3389184"/>
-              <a:gd name="connsiteY6" fmla="*/ 1473397 h 1495437"/>
-              <a:gd name="connsiteX0" fmla="*/ 0 w 3395442"/>
-              <a:gd name="connsiteY0" fmla="*/ 1429854 h 1529343"/>
-              <a:gd name="connsiteX1" fmla="*/ 625638 w 3395442"/>
-              <a:gd name="connsiteY1" fmla="*/ 1226654 h 1529343"/>
-              <a:gd name="connsiteX2" fmla="*/ 1090095 w 3395442"/>
-              <a:gd name="connsiteY2" fmla="*/ 152597 h 1529343"/>
-              <a:gd name="connsiteX3" fmla="*/ 2323809 w 3395442"/>
-              <a:gd name="connsiteY3" fmla="*/ 101797 h 1529343"/>
-              <a:gd name="connsiteX4" fmla="*/ 2715695 w 3395442"/>
-              <a:gd name="connsiteY4" fmla="*/ 1045225 h 1529343"/>
-              <a:gd name="connsiteX5" fmla="*/ 3114838 w 3395442"/>
-              <a:gd name="connsiteY5" fmla="*/ 1473397 h 1529343"/>
-              <a:gd name="connsiteX6" fmla="*/ 3395442 w 3395442"/>
-              <a:gd name="connsiteY6" fmla="*/ 1524197 h 1529343"/>
-              <a:gd name="connsiteX0" fmla="*/ 0 w 3395442"/>
-              <a:gd name="connsiteY0" fmla="*/ 1429854 h 1524197"/>
-              <a:gd name="connsiteX1" fmla="*/ 625638 w 3395442"/>
-              <a:gd name="connsiteY1" fmla="*/ 1226654 h 1524197"/>
-              <a:gd name="connsiteX2" fmla="*/ 1090095 w 3395442"/>
-              <a:gd name="connsiteY2" fmla="*/ 152597 h 1524197"/>
-              <a:gd name="connsiteX3" fmla="*/ 2323809 w 3395442"/>
-              <a:gd name="connsiteY3" fmla="*/ 101797 h 1524197"/>
-              <a:gd name="connsiteX4" fmla="*/ 2715695 w 3395442"/>
-              <a:gd name="connsiteY4" fmla="*/ 1045225 h 1524197"/>
-              <a:gd name="connsiteX5" fmla="*/ 2952133 w 3395442"/>
-              <a:gd name="connsiteY5" fmla="*/ 1371797 h 1524197"/>
-              <a:gd name="connsiteX6" fmla="*/ 3395442 w 3395442"/>
-              <a:gd name="connsiteY6" fmla="*/ 1524197 h 1524197"/>
-              <a:gd name="connsiteX0" fmla="*/ 0 w 3389184"/>
-              <a:gd name="connsiteY0" fmla="*/ 1429854 h 1430006"/>
-              <a:gd name="connsiteX1" fmla="*/ 625638 w 3389184"/>
-              <a:gd name="connsiteY1" fmla="*/ 1226654 h 1430006"/>
-              <a:gd name="connsiteX2" fmla="*/ 1090095 w 3389184"/>
-              <a:gd name="connsiteY2" fmla="*/ 152597 h 1430006"/>
-              <a:gd name="connsiteX3" fmla="*/ 2323809 w 3389184"/>
-              <a:gd name="connsiteY3" fmla="*/ 101797 h 1430006"/>
-              <a:gd name="connsiteX4" fmla="*/ 2715695 w 3389184"/>
-              <a:gd name="connsiteY4" fmla="*/ 1045225 h 1430006"/>
-              <a:gd name="connsiteX5" fmla="*/ 2952133 w 3389184"/>
-              <a:gd name="connsiteY5" fmla="*/ 1371797 h 1430006"/>
-              <a:gd name="connsiteX6" fmla="*/ 3389184 w 3389184"/>
-              <a:gd name="connsiteY6" fmla="*/ 1429854 h 1430006"/>
-              <a:gd name="connsiteX0" fmla="*/ 0 w 3389184"/>
-              <a:gd name="connsiteY0" fmla="*/ 1336500 h 1336652"/>
-              <a:gd name="connsiteX1" fmla="*/ 625638 w 3389184"/>
-              <a:gd name="connsiteY1" fmla="*/ 1133300 h 1336652"/>
-              <a:gd name="connsiteX2" fmla="*/ 1065063 w 3389184"/>
-              <a:gd name="connsiteY2" fmla="*/ 523700 h 1336652"/>
-              <a:gd name="connsiteX3" fmla="*/ 2323809 w 3389184"/>
-              <a:gd name="connsiteY3" fmla="*/ 8443 h 1336652"/>
-              <a:gd name="connsiteX4" fmla="*/ 2715695 w 3389184"/>
-              <a:gd name="connsiteY4" fmla="*/ 951871 h 1336652"/>
-              <a:gd name="connsiteX5" fmla="*/ 2952133 w 3389184"/>
-              <a:gd name="connsiteY5" fmla="*/ 1278443 h 1336652"/>
-              <a:gd name="connsiteX6" fmla="*/ 3389184 w 3389184"/>
-              <a:gd name="connsiteY6" fmla="*/ 1336500 h 1336652"/>
-              <a:gd name="connsiteX0" fmla="*/ 0 w 3389184"/>
-              <a:gd name="connsiteY0" fmla="*/ 878150 h 878302"/>
-              <a:gd name="connsiteX1" fmla="*/ 625638 w 3389184"/>
-              <a:gd name="connsiteY1" fmla="*/ 674950 h 878302"/>
-              <a:gd name="connsiteX2" fmla="*/ 1065063 w 3389184"/>
-              <a:gd name="connsiteY2" fmla="*/ 65350 h 878302"/>
-              <a:gd name="connsiteX3" fmla="*/ 2179878 w 3389184"/>
-              <a:gd name="connsiteY3" fmla="*/ 65350 h 878302"/>
-              <a:gd name="connsiteX4" fmla="*/ 2715695 w 3389184"/>
-              <a:gd name="connsiteY4" fmla="*/ 493521 h 878302"/>
-              <a:gd name="connsiteX5" fmla="*/ 2952133 w 3389184"/>
-              <a:gd name="connsiteY5" fmla="*/ 820093 h 878302"/>
-              <a:gd name="connsiteX6" fmla="*/ 3389184 w 3389184"/>
-              <a:gd name="connsiteY6" fmla="*/ 878150 h 878302"/>
-              <a:gd name="connsiteX0" fmla="*/ 0 w 3389184"/>
-              <a:gd name="connsiteY0" fmla="*/ 898311 h 898463"/>
-              <a:gd name="connsiteX1" fmla="*/ 625638 w 3389184"/>
-              <a:gd name="connsiteY1" fmla="*/ 695111 h 898463"/>
-              <a:gd name="connsiteX2" fmla="*/ 1065063 w 3389184"/>
-              <a:gd name="connsiteY2" fmla="*/ 85511 h 898463"/>
-              <a:gd name="connsiteX3" fmla="*/ 2179878 w 3389184"/>
-              <a:gd name="connsiteY3" fmla="*/ 85511 h 898463"/>
-              <a:gd name="connsiteX4" fmla="*/ 2952133 w 3389184"/>
-              <a:gd name="connsiteY4" fmla="*/ 840254 h 898463"/>
-              <a:gd name="connsiteX5" fmla="*/ 3389184 w 3389184"/>
-              <a:gd name="connsiteY5" fmla="*/ 898311 h 898463"/>
-              <a:gd name="connsiteX0" fmla="*/ 0 w 3389184"/>
-              <a:gd name="connsiteY0" fmla="*/ 898419 h 898571"/>
-              <a:gd name="connsiteX1" fmla="*/ 396309 w 3389184"/>
-              <a:gd name="connsiteY1" fmla="*/ 697044 h 898571"/>
-              <a:gd name="connsiteX2" fmla="*/ 1065063 w 3389184"/>
-              <a:gd name="connsiteY2" fmla="*/ 85619 h 898571"/>
-              <a:gd name="connsiteX3" fmla="*/ 2179878 w 3389184"/>
-              <a:gd name="connsiteY3" fmla="*/ 85619 h 898571"/>
-              <a:gd name="connsiteX4" fmla="*/ 2952133 w 3389184"/>
-              <a:gd name="connsiteY4" fmla="*/ 840362 h 898571"/>
-              <a:gd name="connsiteX5" fmla="*/ 3389184 w 3389184"/>
-              <a:gd name="connsiteY5" fmla="*/ 898419 h 898571"/>
-              <a:gd name="connsiteX0" fmla="*/ 0 w 3389184"/>
-              <a:gd name="connsiteY0" fmla="*/ 898419 h 898571"/>
-              <a:gd name="connsiteX1" fmla="*/ 396309 w 3389184"/>
-              <a:gd name="connsiteY1" fmla="*/ 697044 h 898571"/>
-              <a:gd name="connsiteX2" fmla="*/ 1065063 w 3389184"/>
-              <a:gd name="connsiteY2" fmla="*/ 85619 h 898571"/>
-              <a:gd name="connsiteX3" fmla="*/ 2179878 w 3389184"/>
-              <a:gd name="connsiteY3" fmla="*/ 85619 h 898571"/>
-              <a:gd name="connsiteX4" fmla="*/ 2952133 w 3389184"/>
-              <a:gd name="connsiteY4" fmla="*/ 840362 h 898571"/>
-              <a:gd name="connsiteX5" fmla="*/ 3389184 w 3389184"/>
-              <a:gd name="connsiteY5" fmla="*/ 898419 h 898571"/>
-              <a:gd name="connsiteX0" fmla="*/ 0 w 3389184"/>
-              <a:gd name="connsiteY0" fmla="*/ 898419 h 898571"/>
-              <a:gd name="connsiteX1" fmla="*/ 396309 w 3389184"/>
-              <a:gd name="connsiteY1" fmla="*/ 697044 h 898571"/>
-              <a:gd name="connsiteX2" fmla="*/ 1065063 w 3389184"/>
-              <a:gd name="connsiteY2" fmla="*/ 85619 h 898571"/>
-              <a:gd name="connsiteX3" fmla="*/ 2179878 w 3389184"/>
-              <a:gd name="connsiteY3" fmla="*/ 85619 h 898571"/>
-              <a:gd name="connsiteX4" fmla="*/ 2952133 w 3389184"/>
-              <a:gd name="connsiteY4" fmla="*/ 840362 h 898571"/>
-              <a:gd name="connsiteX5" fmla="*/ 3389184 w 3389184"/>
-              <a:gd name="connsiteY5" fmla="*/ 898419 h 898571"/>
-              <a:gd name="connsiteX0" fmla="*/ 0 w 3389184"/>
-              <a:gd name="connsiteY0" fmla="*/ 902336 h 902488"/>
-              <a:gd name="connsiteX1" fmla="*/ 396309 w 3389184"/>
-              <a:gd name="connsiteY1" fmla="*/ 700961 h 902488"/>
-              <a:gd name="connsiteX2" fmla="*/ 675204 w 3389184"/>
-              <a:gd name="connsiteY2" fmla="*/ 82236 h 902488"/>
-              <a:gd name="connsiteX3" fmla="*/ 2179878 w 3389184"/>
-              <a:gd name="connsiteY3" fmla="*/ 89536 h 902488"/>
-              <a:gd name="connsiteX4" fmla="*/ 2952133 w 3389184"/>
-              <a:gd name="connsiteY4" fmla="*/ 844279 h 902488"/>
-              <a:gd name="connsiteX5" fmla="*/ 3389184 w 3389184"/>
-              <a:gd name="connsiteY5" fmla="*/ 902336 h 902488"/>
-              <a:gd name="connsiteX0" fmla="*/ 0 w 3389184"/>
-              <a:gd name="connsiteY0" fmla="*/ 902336 h 902488"/>
-              <a:gd name="connsiteX1" fmla="*/ 396309 w 3389184"/>
-              <a:gd name="connsiteY1" fmla="*/ 700961 h 902488"/>
-              <a:gd name="connsiteX2" fmla="*/ 675204 w 3389184"/>
-              <a:gd name="connsiteY2" fmla="*/ 82236 h 902488"/>
-              <a:gd name="connsiteX3" fmla="*/ 2179878 w 3389184"/>
-              <a:gd name="connsiteY3" fmla="*/ 89536 h 902488"/>
-              <a:gd name="connsiteX4" fmla="*/ 2952133 w 3389184"/>
-              <a:gd name="connsiteY4" fmla="*/ 844279 h 902488"/>
-              <a:gd name="connsiteX5" fmla="*/ 3389184 w 3389184"/>
-              <a:gd name="connsiteY5" fmla="*/ 902336 h 902488"/>
-              <a:gd name="connsiteX0" fmla="*/ 0 w 3389184"/>
-              <a:gd name="connsiteY0" fmla="*/ 889646 h 889798"/>
-              <a:gd name="connsiteX1" fmla="*/ 396309 w 3389184"/>
-              <a:gd name="connsiteY1" fmla="*/ 688271 h 889798"/>
-              <a:gd name="connsiteX2" fmla="*/ 675204 w 3389184"/>
-              <a:gd name="connsiteY2" fmla="*/ 69546 h 889798"/>
-              <a:gd name="connsiteX3" fmla="*/ 2179878 w 3389184"/>
-              <a:gd name="connsiteY3" fmla="*/ 76846 h 889798"/>
-              <a:gd name="connsiteX4" fmla="*/ 2952133 w 3389184"/>
-              <a:gd name="connsiteY4" fmla="*/ 831589 h 889798"/>
-              <a:gd name="connsiteX5" fmla="*/ 3389184 w 3389184"/>
-              <a:gd name="connsiteY5" fmla="*/ 889646 h 889798"/>
-              <a:gd name="connsiteX0" fmla="*/ 0 w 3389184"/>
-              <a:gd name="connsiteY0" fmla="*/ 897175 h 918589"/>
-              <a:gd name="connsiteX1" fmla="*/ 396309 w 3389184"/>
-              <a:gd name="connsiteY1" fmla="*/ 695800 h 918589"/>
-              <a:gd name="connsiteX2" fmla="*/ 675204 w 3389184"/>
-              <a:gd name="connsiteY2" fmla="*/ 77075 h 918589"/>
-              <a:gd name="connsiteX3" fmla="*/ 2505525 w 3389184"/>
-              <a:gd name="connsiteY3" fmla="*/ 93499 h 918589"/>
-              <a:gd name="connsiteX4" fmla="*/ 2952133 w 3389184"/>
-              <a:gd name="connsiteY4" fmla="*/ 839118 h 918589"/>
-              <a:gd name="connsiteX5" fmla="*/ 3389184 w 3389184"/>
-              <a:gd name="connsiteY5" fmla="*/ 897175 h 918589"/>
-              <a:gd name="connsiteX0" fmla="*/ 0 w 3389184"/>
-              <a:gd name="connsiteY0" fmla="*/ 897175 h 920529"/>
-              <a:gd name="connsiteX1" fmla="*/ 396309 w 3389184"/>
-              <a:gd name="connsiteY1" fmla="*/ 695800 h 920529"/>
-              <a:gd name="connsiteX2" fmla="*/ 675204 w 3389184"/>
-              <a:gd name="connsiteY2" fmla="*/ 77075 h 920529"/>
-              <a:gd name="connsiteX3" fmla="*/ 2505525 w 3389184"/>
-              <a:gd name="connsiteY3" fmla="*/ 93499 h 920529"/>
-              <a:gd name="connsiteX4" fmla="*/ 2952133 w 3389184"/>
-              <a:gd name="connsiteY4" fmla="*/ 839118 h 920529"/>
-              <a:gd name="connsiteX5" fmla="*/ 3389184 w 3389184"/>
-              <a:gd name="connsiteY5" fmla="*/ 897175 h 920529"/>
-              <a:gd name="connsiteX0" fmla="*/ 0 w 3389184"/>
-              <a:gd name="connsiteY0" fmla="*/ 897175 h 909732"/>
-              <a:gd name="connsiteX1" fmla="*/ 396309 w 3389184"/>
-              <a:gd name="connsiteY1" fmla="*/ 695800 h 909732"/>
-              <a:gd name="connsiteX2" fmla="*/ 675204 w 3389184"/>
-              <a:gd name="connsiteY2" fmla="*/ 77075 h 909732"/>
-              <a:gd name="connsiteX3" fmla="*/ 2505525 w 3389184"/>
-              <a:gd name="connsiteY3" fmla="*/ 93499 h 909732"/>
-              <a:gd name="connsiteX4" fmla="*/ 2952133 w 3389184"/>
-              <a:gd name="connsiteY4" fmla="*/ 839118 h 909732"/>
-              <a:gd name="connsiteX5" fmla="*/ 3389184 w 3389184"/>
-              <a:gd name="connsiteY5" fmla="*/ 897175 h 909732"/>
-              <a:gd name="connsiteX0" fmla="*/ 0 w 3389184"/>
-              <a:gd name="connsiteY0" fmla="*/ 897175 h 907311"/>
-              <a:gd name="connsiteX1" fmla="*/ 396309 w 3389184"/>
-              <a:gd name="connsiteY1" fmla="*/ 695800 h 907311"/>
-              <a:gd name="connsiteX2" fmla="*/ 675204 w 3389184"/>
-              <a:gd name="connsiteY2" fmla="*/ 77075 h 907311"/>
-              <a:gd name="connsiteX3" fmla="*/ 2505525 w 3389184"/>
-              <a:gd name="connsiteY3" fmla="*/ 93499 h 907311"/>
-              <a:gd name="connsiteX4" fmla="*/ 2952133 w 3389184"/>
-              <a:gd name="connsiteY4" fmla="*/ 839118 h 907311"/>
-              <a:gd name="connsiteX5" fmla="*/ 3389184 w 3389184"/>
-              <a:gd name="connsiteY5" fmla="*/ 897175 h 907311"/>
-              <a:gd name="connsiteX0" fmla="*/ 0 w 3389184"/>
-              <a:gd name="connsiteY0" fmla="*/ 897175 h 902604"/>
-              <a:gd name="connsiteX1" fmla="*/ 396309 w 3389184"/>
-              <a:gd name="connsiteY1" fmla="*/ 695800 h 902604"/>
-              <a:gd name="connsiteX2" fmla="*/ 675204 w 3389184"/>
-              <a:gd name="connsiteY2" fmla="*/ 77075 h 902604"/>
-              <a:gd name="connsiteX3" fmla="*/ 2505525 w 3389184"/>
-              <a:gd name="connsiteY3" fmla="*/ 93499 h 902604"/>
-              <a:gd name="connsiteX4" fmla="*/ 2952133 w 3389184"/>
-              <a:gd name="connsiteY4" fmla="*/ 839118 h 902604"/>
-              <a:gd name="connsiteX5" fmla="*/ 3389184 w 3389184"/>
-              <a:gd name="connsiteY5" fmla="*/ 897175 h 902604"/>
-              <a:gd name="connsiteX0" fmla="*/ 0 w 3389184"/>
-              <a:gd name="connsiteY0" fmla="*/ 897175 h 901357"/>
-              <a:gd name="connsiteX1" fmla="*/ 396309 w 3389184"/>
-              <a:gd name="connsiteY1" fmla="*/ 695800 h 901357"/>
-              <a:gd name="connsiteX2" fmla="*/ 675204 w 3389184"/>
-              <a:gd name="connsiteY2" fmla="*/ 77075 h 901357"/>
-              <a:gd name="connsiteX3" fmla="*/ 2505525 w 3389184"/>
-              <a:gd name="connsiteY3" fmla="*/ 93499 h 901357"/>
-              <a:gd name="connsiteX4" fmla="*/ 2952133 w 3389184"/>
-              <a:gd name="connsiteY4" fmla="*/ 839118 h 901357"/>
-              <a:gd name="connsiteX5" fmla="*/ 3389184 w 3389184"/>
-              <a:gd name="connsiteY5" fmla="*/ 897175 h 901357"/>
-              <a:gd name="connsiteX0" fmla="*/ 0 w 3389184"/>
-              <a:gd name="connsiteY0" fmla="*/ 897175 h 901357"/>
-              <a:gd name="connsiteX1" fmla="*/ 396309 w 3389184"/>
-              <a:gd name="connsiteY1" fmla="*/ 695800 h 901357"/>
-              <a:gd name="connsiteX2" fmla="*/ 675204 w 3389184"/>
-              <a:gd name="connsiteY2" fmla="*/ 77075 h 901357"/>
-              <a:gd name="connsiteX3" fmla="*/ 2505525 w 3389184"/>
-              <a:gd name="connsiteY3" fmla="*/ 93499 h 901357"/>
-              <a:gd name="connsiteX4" fmla="*/ 2952133 w 3389184"/>
-              <a:gd name="connsiteY4" fmla="*/ 839118 h 901357"/>
-              <a:gd name="connsiteX5" fmla="*/ 3389184 w 3389184"/>
-              <a:gd name="connsiteY5" fmla="*/ 897175 h 901357"/>
-              <a:gd name="connsiteX0" fmla="*/ 0 w 3389184"/>
-              <a:gd name="connsiteY0" fmla="*/ 897175 h 901357"/>
-              <a:gd name="connsiteX1" fmla="*/ 396309 w 3389184"/>
-              <a:gd name="connsiteY1" fmla="*/ 695800 h 901357"/>
-              <a:gd name="connsiteX2" fmla="*/ 675204 w 3389184"/>
-              <a:gd name="connsiteY2" fmla="*/ 77075 h 901357"/>
-              <a:gd name="connsiteX3" fmla="*/ 2505525 w 3389184"/>
-              <a:gd name="connsiteY3" fmla="*/ 93499 h 901357"/>
-              <a:gd name="connsiteX4" fmla="*/ 2952133 w 3389184"/>
-              <a:gd name="connsiteY4" fmla="*/ 839118 h 901357"/>
-              <a:gd name="connsiteX5" fmla="*/ 3389184 w 3389184"/>
-              <a:gd name="connsiteY5" fmla="*/ 897175 h 901357"/>
-              <a:gd name="connsiteX0" fmla="*/ 0 w 3389184"/>
-              <a:gd name="connsiteY0" fmla="*/ 897175 h 901357"/>
-              <a:gd name="connsiteX1" fmla="*/ 396309 w 3389184"/>
-              <a:gd name="connsiteY1" fmla="*/ 695800 h 901357"/>
-              <a:gd name="connsiteX2" fmla="*/ 675204 w 3389184"/>
-              <a:gd name="connsiteY2" fmla="*/ 77075 h 901357"/>
-              <a:gd name="connsiteX3" fmla="*/ 2505525 w 3389184"/>
-              <a:gd name="connsiteY3" fmla="*/ 93499 h 901357"/>
-              <a:gd name="connsiteX4" fmla="*/ 2952133 w 3389184"/>
-              <a:gd name="connsiteY4" fmla="*/ 839118 h 901357"/>
-              <a:gd name="connsiteX5" fmla="*/ 3389184 w 3389184"/>
-              <a:gd name="connsiteY5" fmla="*/ 897175 h 901357"/>
-              <a:gd name="connsiteX0" fmla="*/ 0 w 3389184"/>
-              <a:gd name="connsiteY0" fmla="*/ 897175 h 903061"/>
-              <a:gd name="connsiteX1" fmla="*/ 396309 w 3389184"/>
-              <a:gd name="connsiteY1" fmla="*/ 695800 h 903061"/>
-              <a:gd name="connsiteX2" fmla="*/ 675204 w 3389184"/>
-              <a:gd name="connsiteY2" fmla="*/ 77075 h 903061"/>
-              <a:gd name="connsiteX3" fmla="*/ 2505525 w 3389184"/>
-              <a:gd name="connsiteY3" fmla="*/ 93499 h 903061"/>
-              <a:gd name="connsiteX4" fmla="*/ 2952133 w 3389184"/>
-              <a:gd name="connsiteY4" fmla="*/ 839118 h 903061"/>
-              <a:gd name="connsiteX5" fmla="*/ 3389184 w 3389184"/>
-              <a:gd name="connsiteY5" fmla="*/ 897175 h 903061"/>
-              <a:gd name="connsiteX0" fmla="*/ 0 w 3389184"/>
-              <a:gd name="connsiteY0" fmla="*/ 897175 h 903061"/>
-              <a:gd name="connsiteX1" fmla="*/ 396309 w 3389184"/>
-              <a:gd name="connsiteY1" fmla="*/ 695800 h 903061"/>
-              <a:gd name="connsiteX2" fmla="*/ 675204 w 3389184"/>
-              <a:gd name="connsiteY2" fmla="*/ 77075 h 903061"/>
-              <a:gd name="connsiteX3" fmla="*/ 2505525 w 3389184"/>
-              <a:gd name="connsiteY3" fmla="*/ 93499 h 903061"/>
-              <a:gd name="connsiteX4" fmla="*/ 2952133 w 3389184"/>
-              <a:gd name="connsiteY4" fmla="*/ 839118 h 903061"/>
-              <a:gd name="connsiteX5" fmla="*/ 3389184 w 3389184"/>
-              <a:gd name="connsiteY5" fmla="*/ 897175 h 903061"/>
-              <a:gd name="connsiteX0" fmla="*/ 0 w 3389184"/>
-              <a:gd name="connsiteY0" fmla="*/ 897175 h 903061"/>
-              <a:gd name="connsiteX1" fmla="*/ 396309 w 3389184"/>
-              <a:gd name="connsiteY1" fmla="*/ 695800 h 903061"/>
-              <a:gd name="connsiteX2" fmla="*/ 675204 w 3389184"/>
-              <a:gd name="connsiteY2" fmla="*/ 77075 h 903061"/>
-              <a:gd name="connsiteX3" fmla="*/ 2505525 w 3389184"/>
-              <a:gd name="connsiteY3" fmla="*/ 93499 h 903061"/>
-              <a:gd name="connsiteX4" fmla="*/ 2952133 w 3389184"/>
-              <a:gd name="connsiteY4" fmla="*/ 839118 h 903061"/>
-              <a:gd name="connsiteX5" fmla="*/ 3389184 w 3389184"/>
-              <a:gd name="connsiteY5" fmla="*/ 897175 h 903061"/>
-              <a:gd name="connsiteX0" fmla="*/ 0 w 3389184"/>
-              <a:gd name="connsiteY0" fmla="*/ 897175 h 903061"/>
-              <a:gd name="connsiteX1" fmla="*/ 396309 w 3389184"/>
-              <a:gd name="connsiteY1" fmla="*/ 695800 h 903061"/>
-              <a:gd name="connsiteX2" fmla="*/ 675204 w 3389184"/>
-              <a:gd name="connsiteY2" fmla="*/ 77075 h 903061"/>
-              <a:gd name="connsiteX3" fmla="*/ 2505525 w 3389184"/>
-              <a:gd name="connsiteY3" fmla="*/ 93499 h 903061"/>
-              <a:gd name="connsiteX4" fmla="*/ 2952133 w 3389184"/>
-              <a:gd name="connsiteY4" fmla="*/ 839118 h 903061"/>
-              <a:gd name="connsiteX5" fmla="*/ 3389184 w 3389184"/>
-              <a:gd name="connsiteY5" fmla="*/ 897175 h 903061"/>
-              <a:gd name="connsiteX0" fmla="*/ 0 w 3389184"/>
-              <a:gd name="connsiteY0" fmla="*/ 896991 h 902877"/>
-              <a:gd name="connsiteX1" fmla="*/ 362946 w 3389184"/>
-              <a:gd name="connsiteY1" fmla="*/ 692696 h 902877"/>
-              <a:gd name="connsiteX2" fmla="*/ 675204 w 3389184"/>
-              <a:gd name="connsiteY2" fmla="*/ 76891 h 902877"/>
-              <a:gd name="connsiteX3" fmla="*/ 2505525 w 3389184"/>
-              <a:gd name="connsiteY3" fmla="*/ 93315 h 902877"/>
-              <a:gd name="connsiteX4" fmla="*/ 2952133 w 3389184"/>
-              <a:gd name="connsiteY4" fmla="*/ 838934 h 902877"/>
-              <a:gd name="connsiteX5" fmla="*/ 3389184 w 3389184"/>
-              <a:gd name="connsiteY5" fmla="*/ 896991 h 902877"/>
-              <a:gd name="connsiteX0" fmla="*/ 0 w 3389184"/>
-              <a:gd name="connsiteY0" fmla="*/ 896991 h 902877"/>
-              <a:gd name="connsiteX1" fmla="*/ 362946 w 3389184"/>
-              <a:gd name="connsiteY1" fmla="*/ 692696 h 902877"/>
-              <a:gd name="connsiteX2" fmla="*/ 675204 w 3389184"/>
-              <a:gd name="connsiteY2" fmla="*/ 76891 h 902877"/>
-              <a:gd name="connsiteX3" fmla="*/ 2505525 w 3389184"/>
-              <a:gd name="connsiteY3" fmla="*/ 93315 h 902877"/>
-              <a:gd name="connsiteX4" fmla="*/ 2952133 w 3389184"/>
-              <a:gd name="connsiteY4" fmla="*/ 838934 h 902877"/>
-              <a:gd name="connsiteX5" fmla="*/ 3389184 w 3389184"/>
-              <a:gd name="connsiteY5" fmla="*/ 896991 h 902877"/>
-              <a:gd name="connsiteX0" fmla="*/ 0 w 3389184"/>
-              <a:gd name="connsiteY0" fmla="*/ 896991 h 902877"/>
-              <a:gd name="connsiteX1" fmla="*/ 362946 w 3389184"/>
-              <a:gd name="connsiteY1" fmla="*/ 692696 h 902877"/>
-              <a:gd name="connsiteX2" fmla="*/ 675204 w 3389184"/>
-              <a:gd name="connsiteY2" fmla="*/ 76891 h 902877"/>
-              <a:gd name="connsiteX3" fmla="*/ 2505525 w 3389184"/>
-              <a:gd name="connsiteY3" fmla="*/ 93315 h 902877"/>
-              <a:gd name="connsiteX4" fmla="*/ 2952133 w 3389184"/>
-              <a:gd name="connsiteY4" fmla="*/ 838934 h 902877"/>
-              <a:gd name="connsiteX5" fmla="*/ 3389184 w 3389184"/>
-              <a:gd name="connsiteY5" fmla="*/ 896991 h 902877"/>
-              <a:gd name="connsiteX0" fmla="*/ 0 w 3389184"/>
-              <a:gd name="connsiteY0" fmla="*/ 896991 h 902877"/>
-              <a:gd name="connsiteX1" fmla="*/ 362946 w 3389184"/>
-              <a:gd name="connsiteY1" fmla="*/ 692696 h 902877"/>
-              <a:gd name="connsiteX2" fmla="*/ 675204 w 3389184"/>
-              <a:gd name="connsiteY2" fmla="*/ 76891 h 902877"/>
-              <a:gd name="connsiteX3" fmla="*/ 2505525 w 3389184"/>
-              <a:gd name="connsiteY3" fmla="*/ 93315 h 902877"/>
-              <a:gd name="connsiteX4" fmla="*/ 2952133 w 3389184"/>
-              <a:gd name="connsiteY4" fmla="*/ 838934 h 902877"/>
-              <a:gd name="connsiteX5" fmla="*/ 3389184 w 3389184"/>
-              <a:gd name="connsiteY5" fmla="*/ 896991 h 902877"/>
-              <a:gd name="connsiteX0" fmla="*/ 0 w 3389184"/>
-              <a:gd name="connsiteY0" fmla="*/ 896991 h 899840"/>
-              <a:gd name="connsiteX1" fmla="*/ 362946 w 3389184"/>
-              <a:gd name="connsiteY1" fmla="*/ 692696 h 899840"/>
-              <a:gd name="connsiteX2" fmla="*/ 675204 w 3389184"/>
-              <a:gd name="connsiteY2" fmla="*/ 76891 h 899840"/>
-              <a:gd name="connsiteX3" fmla="*/ 2505525 w 3389184"/>
-              <a:gd name="connsiteY3" fmla="*/ 93315 h 899840"/>
-              <a:gd name="connsiteX4" fmla="*/ 2952133 w 3389184"/>
-              <a:gd name="connsiteY4" fmla="*/ 838934 h 899840"/>
-              <a:gd name="connsiteX5" fmla="*/ 3389184 w 3389184"/>
-              <a:gd name="connsiteY5" fmla="*/ 896991 h 899840"/>
-              <a:gd name="connsiteX0" fmla="*/ 0 w 3389184"/>
-              <a:gd name="connsiteY0" fmla="*/ 896991 h 902155"/>
-              <a:gd name="connsiteX1" fmla="*/ 362946 w 3389184"/>
-              <a:gd name="connsiteY1" fmla="*/ 692696 h 902155"/>
-              <a:gd name="connsiteX2" fmla="*/ 675204 w 3389184"/>
-              <a:gd name="connsiteY2" fmla="*/ 76891 h 902155"/>
-              <a:gd name="connsiteX3" fmla="*/ 2505525 w 3389184"/>
-              <a:gd name="connsiteY3" fmla="*/ 93315 h 902155"/>
-              <a:gd name="connsiteX4" fmla="*/ 2952133 w 3389184"/>
-              <a:gd name="connsiteY4" fmla="*/ 838934 h 902155"/>
-              <a:gd name="connsiteX5" fmla="*/ 3389184 w 3389184"/>
-              <a:gd name="connsiteY5" fmla="*/ 896991 h 902155"/>
-              <a:gd name="connsiteX0" fmla="*/ 0 w 3389184"/>
-              <a:gd name="connsiteY0" fmla="*/ 897803 h 907644"/>
-              <a:gd name="connsiteX1" fmla="*/ 362946 w 3389184"/>
-              <a:gd name="connsiteY1" fmla="*/ 693508 h 907644"/>
-              <a:gd name="connsiteX2" fmla="*/ 675204 w 3389184"/>
-              <a:gd name="connsiteY2" fmla="*/ 77703 h 907644"/>
-              <a:gd name="connsiteX3" fmla="*/ 2505525 w 3389184"/>
-              <a:gd name="connsiteY3" fmla="*/ 94127 h 907644"/>
-              <a:gd name="connsiteX4" fmla="*/ 2927111 w 3389184"/>
-              <a:gd name="connsiteY4" fmla="*/ 852886 h 907644"/>
-              <a:gd name="connsiteX5" fmla="*/ 3389184 w 3389184"/>
-              <a:gd name="connsiteY5" fmla="*/ 897803 h 907644"/>
-              <a:gd name="connsiteX0" fmla="*/ 0 w 3389184"/>
-              <a:gd name="connsiteY0" fmla="*/ 897803 h 901349"/>
-              <a:gd name="connsiteX1" fmla="*/ 362946 w 3389184"/>
-              <a:gd name="connsiteY1" fmla="*/ 693508 h 901349"/>
-              <a:gd name="connsiteX2" fmla="*/ 675204 w 3389184"/>
-              <a:gd name="connsiteY2" fmla="*/ 77703 h 901349"/>
-              <a:gd name="connsiteX3" fmla="*/ 2505525 w 3389184"/>
-              <a:gd name="connsiteY3" fmla="*/ 94127 h 901349"/>
-              <a:gd name="connsiteX4" fmla="*/ 2927111 w 3389184"/>
-              <a:gd name="connsiteY4" fmla="*/ 852886 h 901349"/>
-              <a:gd name="connsiteX5" fmla="*/ 3389184 w 3389184"/>
-              <a:gd name="connsiteY5" fmla="*/ 897803 h 901349"/>
-              <a:gd name="connsiteX0" fmla="*/ 0 w 3389184"/>
-              <a:gd name="connsiteY0" fmla="*/ 896901 h 896901"/>
-              <a:gd name="connsiteX1" fmla="*/ 362946 w 3389184"/>
-              <a:gd name="connsiteY1" fmla="*/ 692606 h 896901"/>
-              <a:gd name="connsiteX2" fmla="*/ 675204 w 3389184"/>
-              <a:gd name="connsiteY2" fmla="*/ 76801 h 896901"/>
-              <a:gd name="connsiteX3" fmla="*/ 2505525 w 3389184"/>
-              <a:gd name="connsiteY3" fmla="*/ 93225 h 896901"/>
-              <a:gd name="connsiteX4" fmla="*/ 2915990 w 3389184"/>
-              <a:gd name="connsiteY4" fmla="*/ 837385 h 896901"/>
-              <a:gd name="connsiteX5" fmla="*/ 3389184 w 3389184"/>
-              <a:gd name="connsiteY5" fmla="*/ 896901 h 896901"/>
-              <a:gd name="connsiteX0" fmla="*/ 0 w 3389184"/>
-              <a:gd name="connsiteY0" fmla="*/ 879845 h 879845"/>
-              <a:gd name="connsiteX1" fmla="*/ 371989 w 3389184"/>
-              <a:gd name="connsiteY1" fmla="*/ 388782 h 879845"/>
-              <a:gd name="connsiteX2" fmla="*/ 675204 w 3389184"/>
-              <a:gd name="connsiteY2" fmla="*/ 59745 h 879845"/>
-              <a:gd name="connsiteX3" fmla="*/ 2505525 w 3389184"/>
-              <a:gd name="connsiteY3" fmla="*/ 76169 h 879845"/>
-              <a:gd name="connsiteX4" fmla="*/ 2915990 w 3389184"/>
-              <a:gd name="connsiteY4" fmla="*/ 820329 h 879845"/>
-              <a:gd name="connsiteX5" fmla="*/ 3389184 w 3389184"/>
-              <a:gd name="connsiteY5" fmla="*/ 879845 h 879845"/>
-              <a:gd name="connsiteX0" fmla="*/ 0 w 3321362"/>
-              <a:gd name="connsiteY0" fmla="*/ 573435 h 879845"/>
-              <a:gd name="connsiteX1" fmla="*/ 304167 w 3321362"/>
-              <a:gd name="connsiteY1" fmla="*/ 388782 h 879845"/>
-              <a:gd name="connsiteX2" fmla="*/ 607382 w 3321362"/>
-              <a:gd name="connsiteY2" fmla="*/ 59745 h 879845"/>
-              <a:gd name="connsiteX3" fmla="*/ 2437703 w 3321362"/>
-              <a:gd name="connsiteY3" fmla="*/ 76169 h 879845"/>
-              <a:gd name="connsiteX4" fmla="*/ 2848168 w 3321362"/>
-              <a:gd name="connsiteY4" fmla="*/ 820329 h 879845"/>
-              <a:gd name="connsiteX5" fmla="*/ 3321362 w 3321362"/>
-              <a:gd name="connsiteY5" fmla="*/ 879845 h 879845"/>
-              <a:gd name="connsiteX0" fmla="*/ 0 w 3321362"/>
-              <a:gd name="connsiteY0" fmla="*/ 573435 h 896804"/>
-              <a:gd name="connsiteX1" fmla="*/ 304167 w 3321362"/>
-              <a:gd name="connsiteY1" fmla="*/ 388782 h 896804"/>
-              <a:gd name="connsiteX2" fmla="*/ 607382 w 3321362"/>
-              <a:gd name="connsiteY2" fmla="*/ 59745 h 896804"/>
-              <a:gd name="connsiteX3" fmla="*/ 2975755 w 3321362"/>
-              <a:gd name="connsiteY3" fmla="*/ 76169 h 896804"/>
-              <a:gd name="connsiteX4" fmla="*/ 2848168 w 3321362"/>
-              <a:gd name="connsiteY4" fmla="*/ 820329 h 896804"/>
-              <a:gd name="connsiteX5" fmla="*/ 3321362 w 3321362"/>
-              <a:gd name="connsiteY5" fmla="*/ 879845 h 896804"/>
-              <a:gd name="connsiteX0" fmla="*/ 0 w 3321362"/>
-              <a:gd name="connsiteY0" fmla="*/ 563396 h 869806"/>
-              <a:gd name="connsiteX1" fmla="*/ 304167 w 3321362"/>
-              <a:gd name="connsiteY1" fmla="*/ 378743 h 869806"/>
-              <a:gd name="connsiteX2" fmla="*/ 607382 w 3321362"/>
-              <a:gd name="connsiteY2" fmla="*/ 49706 h 869806"/>
-              <a:gd name="connsiteX3" fmla="*/ 2975755 w 3321362"/>
-              <a:gd name="connsiteY3" fmla="*/ 66130 h 869806"/>
-              <a:gd name="connsiteX4" fmla="*/ 3191797 w 3321362"/>
-              <a:gd name="connsiteY4" fmla="*/ 661014 h 869806"/>
-              <a:gd name="connsiteX5" fmla="*/ 3321362 w 3321362"/>
-              <a:gd name="connsiteY5" fmla="*/ 869806 h 869806"/>
-              <a:gd name="connsiteX0" fmla="*/ 0 w 3321362"/>
-              <a:gd name="connsiteY0" fmla="*/ 567306 h 873716"/>
-              <a:gd name="connsiteX1" fmla="*/ 304167 w 3321362"/>
-              <a:gd name="connsiteY1" fmla="*/ 382653 h 873716"/>
-              <a:gd name="connsiteX2" fmla="*/ 607382 w 3321362"/>
-              <a:gd name="connsiteY2" fmla="*/ 53616 h 873716"/>
-              <a:gd name="connsiteX3" fmla="*/ 2975755 w 3321362"/>
-              <a:gd name="connsiteY3" fmla="*/ 70040 h 873716"/>
-              <a:gd name="connsiteX4" fmla="*/ 3101368 w 3321362"/>
-              <a:gd name="connsiteY4" fmla="*/ 723849 h 873716"/>
-              <a:gd name="connsiteX5" fmla="*/ 3321362 w 3321362"/>
-              <a:gd name="connsiteY5" fmla="*/ 873716 h 873716"/>
-              <a:gd name="connsiteX0" fmla="*/ 0 w 3321362"/>
-              <a:gd name="connsiteY0" fmla="*/ 567306 h 873716"/>
-              <a:gd name="connsiteX1" fmla="*/ 304167 w 3321362"/>
-              <a:gd name="connsiteY1" fmla="*/ 382653 h 873716"/>
-              <a:gd name="connsiteX2" fmla="*/ 607382 w 3321362"/>
-              <a:gd name="connsiteY2" fmla="*/ 53616 h 873716"/>
-              <a:gd name="connsiteX3" fmla="*/ 2975755 w 3321362"/>
-              <a:gd name="connsiteY3" fmla="*/ 70040 h 873716"/>
-              <a:gd name="connsiteX4" fmla="*/ 3101368 w 3321362"/>
-              <a:gd name="connsiteY4" fmla="*/ 723849 h 873716"/>
-              <a:gd name="connsiteX5" fmla="*/ 3321362 w 3321362"/>
-              <a:gd name="connsiteY5" fmla="*/ 873716 h 873716"/>
-              <a:gd name="connsiteX0" fmla="*/ 0 w 3325884"/>
-              <a:gd name="connsiteY0" fmla="*/ 567306 h 762434"/>
-              <a:gd name="connsiteX1" fmla="*/ 304167 w 3325884"/>
-              <a:gd name="connsiteY1" fmla="*/ 382653 h 762434"/>
-              <a:gd name="connsiteX2" fmla="*/ 607382 w 3325884"/>
-              <a:gd name="connsiteY2" fmla="*/ 53616 h 762434"/>
-              <a:gd name="connsiteX3" fmla="*/ 2975755 w 3325884"/>
-              <a:gd name="connsiteY3" fmla="*/ 70040 h 762434"/>
-              <a:gd name="connsiteX4" fmla="*/ 3101368 w 3325884"/>
-              <a:gd name="connsiteY4" fmla="*/ 723849 h 762434"/>
-              <a:gd name="connsiteX5" fmla="*/ 3325884 w 3325884"/>
-              <a:gd name="connsiteY5" fmla="*/ 696941 h 762434"/>
-              <a:gd name="connsiteX0" fmla="*/ 0 w 3325884"/>
-              <a:gd name="connsiteY0" fmla="*/ 557826 h 687461"/>
-              <a:gd name="connsiteX1" fmla="*/ 304167 w 3325884"/>
-              <a:gd name="connsiteY1" fmla="*/ 373173 h 687461"/>
-              <a:gd name="connsiteX2" fmla="*/ 607382 w 3325884"/>
-              <a:gd name="connsiteY2" fmla="*/ 44136 h 687461"/>
-              <a:gd name="connsiteX3" fmla="*/ 2975755 w 3325884"/>
-              <a:gd name="connsiteY3" fmla="*/ 60560 h 687461"/>
-              <a:gd name="connsiteX4" fmla="*/ 3110411 w 3325884"/>
-              <a:gd name="connsiteY4" fmla="*/ 569020 h 687461"/>
-              <a:gd name="connsiteX5" fmla="*/ 3325884 w 3325884"/>
-              <a:gd name="connsiteY5" fmla="*/ 687461 h 687461"/>
-              <a:gd name="connsiteX0" fmla="*/ 0 w 3325884"/>
-              <a:gd name="connsiteY0" fmla="*/ 557583 h 687218"/>
-              <a:gd name="connsiteX1" fmla="*/ 240867 w 3325884"/>
-              <a:gd name="connsiteY1" fmla="*/ 369001 h 687218"/>
-              <a:gd name="connsiteX2" fmla="*/ 607382 w 3325884"/>
-              <a:gd name="connsiteY2" fmla="*/ 43893 h 687218"/>
-              <a:gd name="connsiteX3" fmla="*/ 2975755 w 3325884"/>
-              <a:gd name="connsiteY3" fmla="*/ 60317 h 687218"/>
-              <a:gd name="connsiteX4" fmla="*/ 3110411 w 3325884"/>
-              <a:gd name="connsiteY4" fmla="*/ 568777 h 687218"/>
-              <a:gd name="connsiteX5" fmla="*/ 3325884 w 3325884"/>
-              <a:gd name="connsiteY5" fmla="*/ 687218 h 687218"/>
-              <a:gd name="connsiteX0" fmla="*/ 0 w 3325884"/>
-              <a:gd name="connsiteY0" fmla="*/ 557583 h 687218"/>
-              <a:gd name="connsiteX1" fmla="*/ 240867 w 3325884"/>
-              <a:gd name="connsiteY1" fmla="*/ 369001 h 687218"/>
-              <a:gd name="connsiteX2" fmla="*/ 607382 w 3325884"/>
-              <a:gd name="connsiteY2" fmla="*/ 43893 h 687218"/>
-              <a:gd name="connsiteX3" fmla="*/ 2975755 w 3325884"/>
-              <a:gd name="connsiteY3" fmla="*/ 60317 h 687218"/>
-              <a:gd name="connsiteX4" fmla="*/ 3110411 w 3325884"/>
-              <a:gd name="connsiteY4" fmla="*/ 568777 h 687218"/>
-              <a:gd name="connsiteX5" fmla="*/ 3325884 w 3325884"/>
-              <a:gd name="connsiteY5" fmla="*/ 687218 h 687218"/>
-              <a:gd name="connsiteX0" fmla="*/ 0 w 3325884"/>
-              <a:gd name="connsiteY0" fmla="*/ 557583 h 687218"/>
-              <a:gd name="connsiteX1" fmla="*/ 240867 w 3325884"/>
-              <a:gd name="connsiteY1" fmla="*/ 369001 h 687218"/>
-              <a:gd name="connsiteX2" fmla="*/ 607382 w 3325884"/>
-              <a:gd name="connsiteY2" fmla="*/ 43893 h 687218"/>
-              <a:gd name="connsiteX3" fmla="*/ 2975755 w 3325884"/>
-              <a:gd name="connsiteY3" fmla="*/ 60317 h 687218"/>
-              <a:gd name="connsiteX4" fmla="*/ 3110411 w 3325884"/>
-              <a:gd name="connsiteY4" fmla="*/ 568777 h 687218"/>
-              <a:gd name="connsiteX5" fmla="*/ 3325884 w 3325884"/>
-              <a:gd name="connsiteY5" fmla="*/ 687218 h 687218"/>
-              <a:gd name="connsiteX0" fmla="*/ 0 w 3325884"/>
-              <a:gd name="connsiteY0" fmla="*/ 571387 h 701022"/>
-              <a:gd name="connsiteX1" fmla="*/ 240867 w 3325884"/>
-              <a:gd name="connsiteY1" fmla="*/ 382805 h 701022"/>
-              <a:gd name="connsiteX2" fmla="*/ 607382 w 3325884"/>
-              <a:gd name="connsiteY2" fmla="*/ 57697 h 701022"/>
-              <a:gd name="connsiteX3" fmla="*/ 2975755 w 3325884"/>
-              <a:gd name="connsiteY3" fmla="*/ 74121 h 701022"/>
-              <a:gd name="connsiteX4" fmla="*/ 3110411 w 3325884"/>
-              <a:gd name="connsiteY4" fmla="*/ 582581 h 701022"/>
-              <a:gd name="connsiteX5" fmla="*/ 3325884 w 3325884"/>
-              <a:gd name="connsiteY5" fmla="*/ 701022 h 701022"/>
-              <a:gd name="connsiteX0" fmla="*/ 0 w 3325884"/>
-              <a:gd name="connsiteY0" fmla="*/ 533944 h 663579"/>
-              <a:gd name="connsiteX1" fmla="*/ 240867 w 3325884"/>
-              <a:gd name="connsiteY1" fmla="*/ 345362 h 663579"/>
-              <a:gd name="connsiteX2" fmla="*/ 607382 w 3325884"/>
-              <a:gd name="connsiteY2" fmla="*/ 20254 h 663579"/>
-              <a:gd name="connsiteX3" fmla="*/ 2975755 w 3325884"/>
-              <a:gd name="connsiteY3" fmla="*/ 36678 h 663579"/>
-              <a:gd name="connsiteX4" fmla="*/ 3110411 w 3325884"/>
-              <a:gd name="connsiteY4" fmla="*/ 545138 h 663579"/>
-              <a:gd name="connsiteX5" fmla="*/ 3325884 w 3325884"/>
-              <a:gd name="connsiteY5" fmla="*/ 663579 h 663579"/>
-              <a:gd name="connsiteX0" fmla="*/ 0 w 3325884"/>
-              <a:gd name="connsiteY0" fmla="*/ 555224 h 684859"/>
-              <a:gd name="connsiteX1" fmla="*/ 240867 w 3325884"/>
-              <a:gd name="connsiteY1" fmla="*/ 366642 h 684859"/>
-              <a:gd name="connsiteX2" fmla="*/ 607382 w 3325884"/>
-              <a:gd name="connsiteY2" fmla="*/ 41534 h 684859"/>
-              <a:gd name="connsiteX3" fmla="*/ 2975755 w 3325884"/>
-              <a:gd name="connsiteY3" fmla="*/ 57958 h 684859"/>
-              <a:gd name="connsiteX4" fmla="*/ 3110411 w 3325884"/>
-              <a:gd name="connsiteY4" fmla="*/ 566418 h 684859"/>
-              <a:gd name="connsiteX5" fmla="*/ 3325884 w 3325884"/>
-              <a:gd name="connsiteY5" fmla="*/ 684859 h 684859"/>
-              <a:gd name="connsiteX0" fmla="*/ 0 w 3325884"/>
-              <a:gd name="connsiteY0" fmla="*/ 555224 h 684859"/>
-              <a:gd name="connsiteX1" fmla="*/ 240867 w 3325884"/>
-              <a:gd name="connsiteY1" fmla="*/ 366642 h 684859"/>
-              <a:gd name="connsiteX2" fmla="*/ 607382 w 3325884"/>
-              <a:gd name="connsiteY2" fmla="*/ 41534 h 684859"/>
-              <a:gd name="connsiteX3" fmla="*/ 2975755 w 3325884"/>
-              <a:gd name="connsiteY3" fmla="*/ 57958 h 684859"/>
-              <a:gd name="connsiteX4" fmla="*/ 3110411 w 3325884"/>
-              <a:gd name="connsiteY4" fmla="*/ 566418 h 684859"/>
-              <a:gd name="connsiteX5" fmla="*/ 3325884 w 3325884"/>
-              <a:gd name="connsiteY5" fmla="*/ 684859 h 684859"/>
-              <a:gd name="connsiteX0" fmla="*/ 0 w 3325884"/>
-              <a:gd name="connsiteY0" fmla="*/ 555224 h 684859"/>
-              <a:gd name="connsiteX1" fmla="*/ 240867 w 3325884"/>
-              <a:gd name="connsiteY1" fmla="*/ 366642 h 684859"/>
-              <a:gd name="connsiteX2" fmla="*/ 607382 w 3325884"/>
-              <a:gd name="connsiteY2" fmla="*/ 41534 h 684859"/>
-              <a:gd name="connsiteX3" fmla="*/ 2975755 w 3325884"/>
-              <a:gd name="connsiteY3" fmla="*/ 57958 h 684859"/>
-              <a:gd name="connsiteX4" fmla="*/ 3110411 w 3325884"/>
-              <a:gd name="connsiteY4" fmla="*/ 566418 h 684859"/>
-              <a:gd name="connsiteX5" fmla="*/ 3325884 w 3325884"/>
-              <a:gd name="connsiteY5" fmla="*/ 684859 h 684859"/>
-              <a:gd name="connsiteX0" fmla="*/ 0 w 3325884"/>
-              <a:gd name="connsiteY0" fmla="*/ 555224 h 684859"/>
-              <a:gd name="connsiteX1" fmla="*/ 240867 w 3325884"/>
-              <a:gd name="connsiteY1" fmla="*/ 366642 h 684859"/>
-              <a:gd name="connsiteX2" fmla="*/ 607382 w 3325884"/>
-              <a:gd name="connsiteY2" fmla="*/ 41534 h 684859"/>
-              <a:gd name="connsiteX3" fmla="*/ 2975755 w 3325884"/>
-              <a:gd name="connsiteY3" fmla="*/ 57958 h 684859"/>
-              <a:gd name="connsiteX4" fmla="*/ 3110411 w 3325884"/>
-              <a:gd name="connsiteY4" fmla="*/ 566418 h 684859"/>
-              <a:gd name="connsiteX5" fmla="*/ 3325884 w 3325884"/>
-              <a:gd name="connsiteY5" fmla="*/ 684859 h 684859"/>
-              <a:gd name="connsiteX0" fmla="*/ 0 w 3325884"/>
-              <a:gd name="connsiteY0" fmla="*/ 555224 h 684859"/>
-              <a:gd name="connsiteX1" fmla="*/ 240867 w 3325884"/>
-              <a:gd name="connsiteY1" fmla="*/ 366642 h 684859"/>
-              <a:gd name="connsiteX2" fmla="*/ 607382 w 3325884"/>
-              <a:gd name="connsiteY2" fmla="*/ 41534 h 684859"/>
-              <a:gd name="connsiteX3" fmla="*/ 2975755 w 3325884"/>
-              <a:gd name="connsiteY3" fmla="*/ 57958 h 684859"/>
-              <a:gd name="connsiteX4" fmla="*/ 3110411 w 3325884"/>
-              <a:gd name="connsiteY4" fmla="*/ 566418 h 684859"/>
-              <a:gd name="connsiteX5" fmla="*/ 3325884 w 3325884"/>
-              <a:gd name="connsiteY5" fmla="*/ 684859 h 684859"/>
-              <a:gd name="connsiteX0" fmla="*/ 0 w 3325884"/>
-              <a:gd name="connsiteY0" fmla="*/ 569800 h 699435"/>
-              <a:gd name="connsiteX1" fmla="*/ 607382 w 3325884"/>
-              <a:gd name="connsiteY1" fmla="*/ 56110 h 699435"/>
-              <a:gd name="connsiteX2" fmla="*/ 2975755 w 3325884"/>
-              <a:gd name="connsiteY2" fmla="*/ 72534 h 699435"/>
-              <a:gd name="connsiteX3" fmla="*/ 3110411 w 3325884"/>
-              <a:gd name="connsiteY3" fmla="*/ 580994 h 699435"/>
-              <a:gd name="connsiteX4" fmla="*/ 3325884 w 3325884"/>
-              <a:gd name="connsiteY4" fmla="*/ 699435 h 699435"/>
-              <a:gd name="connsiteX0" fmla="*/ 0 w 3325884"/>
-              <a:gd name="connsiteY0" fmla="*/ 565325 h 694960"/>
-              <a:gd name="connsiteX1" fmla="*/ 325240 w 3325884"/>
-              <a:gd name="connsiteY1" fmla="*/ 497982 h 694960"/>
-              <a:gd name="connsiteX2" fmla="*/ 607382 w 3325884"/>
-              <a:gd name="connsiteY2" fmla="*/ 51635 h 694960"/>
-              <a:gd name="connsiteX3" fmla="*/ 2975755 w 3325884"/>
-              <a:gd name="connsiteY3" fmla="*/ 68059 h 694960"/>
-              <a:gd name="connsiteX4" fmla="*/ 3110411 w 3325884"/>
-              <a:gd name="connsiteY4" fmla="*/ 576519 h 694960"/>
-              <a:gd name="connsiteX5" fmla="*/ 3325884 w 3325884"/>
-              <a:gd name="connsiteY5" fmla="*/ 694960 h 694960"/>
-              <a:gd name="connsiteX0" fmla="*/ 0 w 3325884"/>
-              <a:gd name="connsiteY0" fmla="*/ 566879 h 696514"/>
-              <a:gd name="connsiteX1" fmla="*/ 307155 w 3325884"/>
-              <a:gd name="connsiteY1" fmla="*/ 523106 h 696514"/>
-              <a:gd name="connsiteX2" fmla="*/ 607382 w 3325884"/>
-              <a:gd name="connsiteY2" fmla="*/ 53189 h 696514"/>
-              <a:gd name="connsiteX3" fmla="*/ 2975755 w 3325884"/>
-              <a:gd name="connsiteY3" fmla="*/ 69613 h 696514"/>
-              <a:gd name="connsiteX4" fmla="*/ 3110411 w 3325884"/>
-              <a:gd name="connsiteY4" fmla="*/ 578073 h 696514"/>
-              <a:gd name="connsiteX5" fmla="*/ 3325884 w 3325884"/>
-              <a:gd name="connsiteY5" fmla="*/ 696514 h 696514"/>
-              <a:gd name="connsiteX0" fmla="*/ 0 w 3325884"/>
-              <a:gd name="connsiteY0" fmla="*/ 565842 h 695477"/>
-              <a:gd name="connsiteX1" fmla="*/ 338805 w 3325884"/>
-              <a:gd name="connsiteY1" fmla="*/ 506355 h 695477"/>
-              <a:gd name="connsiteX2" fmla="*/ 607382 w 3325884"/>
-              <a:gd name="connsiteY2" fmla="*/ 52152 h 695477"/>
-              <a:gd name="connsiteX3" fmla="*/ 2975755 w 3325884"/>
-              <a:gd name="connsiteY3" fmla="*/ 68576 h 695477"/>
-              <a:gd name="connsiteX4" fmla="*/ 3110411 w 3325884"/>
-              <a:gd name="connsiteY4" fmla="*/ 577036 h 695477"/>
-              <a:gd name="connsiteX5" fmla="*/ 3325884 w 3325884"/>
-              <a:gd name="connsiteY5" fmla="*/ 695477 h 695477"/>
-              <a:gd name="connsiteX0" fmla="*/ 0 w 3325884"/>
-              <a:gd name="connsiteY0" fmla="*/ 565842 h 695477"/>
-              <a:gd name="connsiteX1" fmla="*/ 338805 w 3325884"/>
-              <a:gd name="connsiteY1" fmla="*/ 506355 h 695477"/>
-              <a:gd name="connsiteX2" fmla="*/ 607382 w 3325884"/>
-              <a:gd name="connsiteY2" fmla="*/ 52152 h 695477"/>
-              <a:gd name="connsiteX3" fmla="*/ 2975755 w 3325884"/>
-              <a:gd name="connsiteY3" fmla="*/ 68576 h 695477"/>
-              <a:gd name="connsiteX4" fmla="*/ 3110411 w 3325884"/>
-              <a:gd name="connsiteY4" fmla="*/ 577036 h 695477"/>
-              <a:gd name="connsiteX5" fmla="*/ 3325884 w 3325884"/>
-              <a:gd name="connsiteY5" fmla="*/ 695477 h 695477"/>
-              <a:gd name="connsiteX0" fmla="*/ 0 w 3325884"/>
-              <a:gd name="connsiteY0" fmla="*/ 565842 h 695477"/>
-              <a:gd name="connsiteX1" fmla="*/ 338805 w 3325884"/>
-              <a:gd name="connsiteY1" fmla="*/ 506355 h 695477"/>
-              <a:gd name="connsiteX2" fmla="*/ 607382 w 3325884"/>
-              <a:gd name="connsiteY2" fmla="*/ 52152 h 695477"/>
-              <a:gd name="connsiteX3" fmla="*/ 2975755 w 3325884"/>
-              <a:gd name="connsiteY3" fmla="*/ 68576 h 695477"/>
-              <a:gd name="connsiteX4" fmla="*/ 3110411 w 3325884"/>
-              <a:gd name="connsiteY4" fmla="*/ 577036 h 695477"/>
-              <a:gd name="connsiteX5" fmla="*/ 3325884 w 3325884"/>
-              <a:gd name="connsiteY5" fmla="*/ 695477 h 695477"/>
-              <a:gd name="connsiteX0" fmla="*/ 0 w 3325884"/>
-              <a:gd name="connsiteY0" fmla="*/ 565842 h 695477"/>
-              <a:gd name="connsiteX1" fmla="*/ 338805 w 3325884"/>
-              <a:gd name="connsiteY1" fmla="*/ 506355 h 695477"/>
-              <a:gd name="connsiteX2" fmla="*/ 607382 w 3325884"/>
-              <a:gd name="connsiteY2" fmla="*/ 52152 h 695477"/>
-              <a:gd name="connsiteX3" fmla="*/ 2975755 w 3325884"/>
-              <a:gd name="connsiteY3" fmla="*/ 68576 h 695477"/>
-              <a:gd name="connsiteX4" fmla="*/ 3110411 w 3325884"/>
-              <a:gd name="connsiteY4" fmla="*/ 577036 h 695477"/>
-              <a:gd name="connsiteX5" fmla="*/ 3325884 w 3325884"/>
-              <a:gd name="connsiteY5" fmla="*/ 695477 h 695477"/>
-              <a:gd name="connsiteX0" fmla="*/ 0 w 3325884"/>
-              <a:gd name="connsiteY0" fmla="*/ 565842 h 695487"/>
-              <a:gd name="connsiteX1" fmla="*/ 338805 w 3325884"/>
-              <a:gd name="connsiteY1" fmla="*/ 506355 h 695487"/>
-              <a:gd name="connsiteX2" fmla="*/ 607382 w 3325884"/>
-              <a:gd name="connsiteY2" fmla="*/ 52152 h 695487"/>
-              <a:gd name="connsiteX3" fmla="*/ 2975755 w 3325884"/>
-              <a:gd name="connsiteY3" fmla="*/ 68576 h 695487"/>
-              <a:gd name="connsiteX4" fmla="*/ 3110411 w 3325884"/>
-              <a:gd name="connsiteY4" fmla="*/ 577036 h 695487"/>
-              <a:gd name="connsiteX5" fmla="*/ 3325884 w 3325884"/>
-              <a:gd name="connsiteY5" fmla="*/ 695477 h 695487"/>
-              <a:gd name="connsiteX0" fmla="*/ 0 w 3325884"/>
-              <a:gd name="connsiteY0" fmla="*/ 565842 h 697100"/>
-              <a:gd name="connsiteX1" fmla="*/ 338805 w 3325884"/>
-              <a:gd name="connsiteY1" fmla="*/ 506355 h 697100"/>
-              <a:gd name="connsiteX2" fmla="*/ 607382 w 3325884"/>
-              <a:gd name="connsiteY2" fmla="*/ 52152 h 697100"/>
-              <a:gd name="connsiteX3" fmla="*/ 2975755 w 3325884"/>
-              <a:gd name="connsiteY3" fmla="*/ 68576 h 697100"/>
-              <a:gd name="connsiteX4" fmla="*/ 3110411 w 3325884"/>
-              <a:gd name="connsiteY4" fmla="*/ 577036 h 697100"/>
-              <a:gd name="connsiteX5" fmla="*/ 3325884 w 3325884"/>
-              <a:gd name="connsiteY5" fmla="*/ 695477 h 697100"/>
-              <a:gd name="connsiteX0" fmla="*/ 0 w 3325884"/>
-              <a:gd name="connsiteY0" fmla="*/ 565842 h 696950"/>
-              <a:gd name="connsiteX1" fmla="*/ 338805 w 3325884"/>
-              <a:gd name="connsiteY1" fmla="*/ 506355 h 696950"/>
-              <a:gd name="connsiteX2" fmla="*/ 607382 w 3325884"/>
-              <a:gd name="connsiteY2" fmla="*/ 52152 h 696950"/>
-              <a:gd name="connsiteX3" fmla="*/ 2975755 w 3325884"/>
-              <a:gd name="connsiteY3" fmla="*/ 68576 h 696950"/>
-              <a:gd name="connsiteX4" fmla="*/ 3110411 w 3325884"/>
-              <a:gd name="connsiteY4" fmla="*/ 577036 h 696950"/>
-              <a:gd name="connsiteX5" fmla="*/ 3325884 w 3325884"/>
-              <a:gd name="connsiteY5" fmla="*/ 695477 h 696950"/>
-              <a:gd name="connsiteX0" fmla="*/ 0 w 3325884"/>
-              <a:gd name="connsiteY0" fmla="*/ 565842 h 696950"/>
-              <a:gd name="connsiteX1" fmla="*/ 338805 w 3325884"/>
-              <a:gd name="connsiteY1" fmla="*/ 506355 h 696950"/>
-              <a:gd name="connsiteX2" fmla="*/ 607382 w 3325884"/>
-              <a:gd name="connsiteY2" fmla="*/ 52152 h 696950"/>
-              <a:gd name="connsiteX3" fmla="*/ 2975755 w 3325884"/>
-              <a:gd name="connsiteY3" fmla="*/ 68576 h 696950"/>
-              <a:gd name="connsiteX4" fmla="*/ 3110411 w 3325884"/>
-              <a:gd name="connsiteY4" fmla="*/ 577036 h 696950"/>
-              <a:gd name="connsiteX5" fmla="*/ 3325884 w 3325884"/>
-              <a:gd name="connsiteY5" fmla="*/ 695477 h 696950"/>
-              <a:gd name="connsiteX0" fmla="*/ 0 w 3325884"/>
-              <a:gd name="connsiteY0" fmla="*/ 573048 h 702683"/>
-              <a:gd name="connsiteX1" fmla="*/ 338805 w 3325884"/>
-              <a:gd name="connsiteY1" fmla="*/ 513561 h 702683"/>
-              <a:gd name="connsiteX2" fmla="*/ 607382 w 3325884"/>
-              <a:gd name="connsiteY2" fmla="*/ 59358 h 702683"/>
-              <a:gd name="connsiteX3" fmla="*/ 2975755 w 3325884"/>
-              <a:gd name="connsiteY3" fmla="*/ 75782 h 702683"/>
-              <a:gd name="connsiteX4" fmla="*/ 3325884 w 3325884"/>
-              <a:gd name="connsiteY4" fmla="*/ 702683 h 702683"/>
-              <a:gd name="connsiteX0" fmla="*/ 0 w 3325884"/>
-              <a:gd name="connsiteY0" fmla="*/ 551040 h 680675"/>
-              <a:gd name="connsiteX1" fmla="*/ 338805 w 3325884"/>
-              <a:gd name="connsiteY1" fmla="*/ 491553 h 680675"/>
-              <a:gd name="connsiteX2" fmla="*/ 607382 w 3325884"/>
-              <a:gd name="connsiteY2" fmla="*/ 37350 h 680675"/>
-              <a:gd name="connsiteX3" fmla="*/ 2975755 w 3325884"/>
-              <a:gd name="connsiteY3" fmla="*/ 53774 h 680675"/>
-              <a:gd name="connsiteX4" fmla="*/ 3271415 w 3325884"/>
-              <a:gd name="connsiteY4" fmla="*/ 275863 h 680675"/>
-              <a:gd name="connsiteX5" fmla="*/ 3325884 w 3325884"/>
-              <a:gd name="connsiteY5" fmla="*/ 680675 h 680675"/>
-              <a:gd name="connsiteX0" fmla="*/ 0 w 3325884"/>
-              <a:gd name="connsiteY0" fmla="*/ 569361 h 698996"/>
-              <a:gd name="connsiteX1" fmla="*/ 338805 w 3325884"/>
-              <a:gd name="connsiteY1" fmla="*/ 509874 h 698996"/>
-              <a:gd name="connsiteX2" fmla="*/ 607382 w 3325884"/>
-              <a:gd name="connsiteY2" fmla="*/ 55671 h 698996"/>
-              <a:gd name="connsiteX3" fmla="*/ 2975755 w 3325884"/>
-              <a:gd name="connsiteY3" fmla="*/ 72095 h 698996"/>
-              <a:gd name="connsiteX4" fmla="*/ 3127648 w 3325884"/>
-              <a:gd name="connsiteY4" fmla="*/ 639387 h 698996"/>
-              <a:gd name="connsiteX5" fmla="*/ 3325884 w 3325884"/>
-              <a:gd name="connsiteY5" fmla="*/ 698996 h 698996"/>
-              <a:gd name="connsiteX0" fmla="*/ 0 w 3325884"/>
-              <a:gd name="connsiteY0" fmla="*/ 569361 h 698996"/>
-              <a:gd name="connsiteX1" fmla="*/ 338805 w 3325884"/>
-              <a:gd name="connsiteY1" fmla="*/ 509874 h 698996"/>
-              <a:gd name="connsiteX2" fmla="*/ 607382 w 3325884"/>
-              <a:gd name="connsiteY2" fmla="*/ 55671 h 698996"/>
-              <a:gd name="connsiteX3" fmla="*/ 2975755 w 3325884"/>
-              <a:gd name="connsiteY3" fmla="*/ 72095 h 698996"/>
-              <a:gd name="connsiteX4" fmla="*/ 3127648 w 3325884"/>
-              <a:gd name="connsiteY4" fmla="*/ 639387 h 698996"/>
-              <a:gd name="connsiteX5" fmla="*/ 3325884 w 3325884"/>
-              <a:gd name="connsiteY5" fmla="*/ 698996 h 698996"/>
-              <a:gd name="connsiteX0" fmla="*/ 0 w 3325884"/>
-              <a:gd name="connsiteY0" fmla="*/ 569361 h 708387"/>
-              <a:gd name="connsiteX1" fmla="*/ 338805 w 3325884"/>
-              <a:gd name="connsiteY1" fmla="*/ 509874 h 708387"/>
-              <a:gd name="connsiteX2" fmla="*/ 607382 w 3325884"/>
-              <a:gd name="connsiteY2" fmla="*/ 55671 h 708387"/>
-              <a:gd name="connsiteX3" fmla="*/ 2975755 w 3325884"/>
-              <a:gd name="connsiteY3" fmla="*/ 72095 h 708387"/>
-              <a:gd name="connsiteX4" fmla="*/ 3127648 w 3325884"/>
-              <a:gd name="connsiteY4" fmla="*/ 639387 h 708387"/>
-              <a:gd name="connsiteX5" fmla="*/ 3325884 w 3325884"/>
-              <a:gd name="connsiteY5" fmla="*/ 698996 h 708387"/>
-              <a:gd name="connsiteX0" fmla="*/ 0 w 3325884"/>
-              <a:gd name="connsiteY0" fmla="*/ 564901 h 703927"/>
-              <a:gd name="connsiteX1" fmla="*/ 338805 w 3325884"/>
-              <a:gd name="connsiteY1" fmla="*/ 505414 h 703927"/>
-              <a:gd name="connsiteX2" fmla="*/ 607382 w 3325884"/>
-              <a:gd name="connsiteY2" fmla="*/ 51211 h 703927"/>
-              <a:gd name="connsiteX3" fmla="*/ 2975755 w 3325884"/>
-              <a:gd name="connsiteY3" fmla="*/ 67635 h 703927"/>
-              <a:gd name="connsiteX4" fmla="*/ 3127648 w 3325884"/>
-              <a:gd name="connsiteY4" fmla="*/ 634927 h 703927"/>
-              <a:gd name="connsiteX5" fmla="*/ 3325884 w 3325884"/>
-              <a:gd name="connsiteY5" fmla="*/ 694536 h 703927"/>
-            </a:gdLst>
-            <a:ahLst/>
-            <a:cxnLst>
-              <a:cxn ang="0">
-                <a:pos x="connsiteX0" y="connsiteY0"/>
-              </a:cxn>
-              <a:cxn ang="0">
-                <a:pos x="connsiteX1" y="connsiteY1"/>
-              </a:cxn>
-              <a:cxn ang="0">
-                <a:pos x="connsiteX2" y="connsiteY2"/>
-              </a:cxn>
-              <a:cxn ang="0">
-                <a:pos x="connsiteX3" y="connsiteY3"/>
-              </a:cxn>
-              <a:cxn ang="0">
-                <a:pos x="connsiteX4" y="connsiteY4"/>
-              </a:cxn>
-              <a:cxn ang="0">
-                <a:pos x="connsiteX5" y="connsiteY5"/>
-              </a:cxn>
-            </a:cxnLst>
-            <a:rect l="l" t="t" r="r" b="b"/>
-            <a:pathLst>
-              <a:path w="3325884" h="703927">
-                <a:moveTo>
-                  <a:pt x="0" y="564901"/>
-                </a:moveTo>
-                <a:cubicBezTo>
-                  <a:pt x="155186" y="562189"/>
-                  <a:pt x="237575" y="591029"/>
-                  <a:pt x="338805" y="505414"/>
-                </a:cubicBezTo>
-                <a:cubicBezTo>
-                  <a:pt x="440035" y="419799"/>
-                  <a:pt x="167890" y="124174"/>
-                  <a:pt x="607382" y="51211"/>
-                </a:cubicBezTo>
-                <a:cubicBezTo>
-                  <a:pt x="1046874" y="-21752"/>
-                  <a:pt x="2790967" y="-17161"/>
-                  <a:pt x="2975755" y="67635"/>
-                </a:cubicBezTo>
-                <a:cubicBezTo>
-                  <a:pt x="3160543" y="152431"/>
-                  <a:pt x="3069293" y="530444"/>
-                  <a:pt x="3127648" y="634927"/>
-                </a:cubicBezTo>
-                <a:cubicBezTo>
-                  <a:pt x="3186003" y="739410"/>
-                  <a:pt x="3235773" y="694064"/>
-                  <a:pt x="3325884" y="694536"/>
-                </a:cubicBezTo>
-              </a:path>
-            </a:pathLst>
-          </a:custGeom>
-          <a:noFill/>
-          <a:ln w="38100">
-            <a:solidFill>
-              <a:schemeClr val="accent5">
-                <a:lumMod val="75000"/>
-              </a:schemeClr>
-            </a:solidFill>
-            <a:tailEnd type="arrow" w="med" len="lg"/>
-          </a:ln>
-        </p:spPr>
-        <p:style>
-          <a:lnRef idx="2">
-            <a:schemeClr val="accent1">
-              <a:shade val="50000"/>
-            </a:schemeClr>
-          </a:lnRef>
-          <a:fillRef idx="1">
-            <a:schemeClr val="accent1"/>
-          </a:fillRef>
-          <a:effectRef idx="0">
-            <a:schemeClr val="accent1"/>
-          </a:effectRef>
-          <a:fontRef idx="minor">
-            <a:schemeClr val="lt1"/>
-          </a:fontRef>
-        </p:style>
-        <p:txBody>
-          <a:bodyPr rtlCol="0" anchor="ctr"/>
-          <a:lstStyle/>
-          <a:p>
-            <a:pPr algn="ctr"/>
-            <a:endParaRPr lang="en-US" sz="1400"/>
-          </a:p>
-        </p:txBody>
-      </p:sp>
-      <p:sp>
-        <p:nvSpPr>
-          <p:cNvPr id="84" name="Oval 83">
-            <a:extLst>
-              <a:ext uri="{FF2B5EF4-FFF2-40B4-BE49-F238E27FC236}">
-                <a16:creationId xmlns:a16="http://schemas.microsoft.com/office/drawing/2014/main" id="{A7FEE1C8-82AE-4EBA-9D40-8B835FA61407}"/>
-              </a:ext>
-            </a:extLst>
-          </p:cNvPr>
-          <p:cNvSpPr/>
+          <p:cNvPr id="3" name="TextBox 2">
+            <a:extLst>
+              <a:ext uri="{FF2B5EF4-FFF2-40B4-BE49-F238E27FC236}">
+                <a16:creationId xmlns:a16="http://schemas.microsoft.com/office/drawing/2014/main" id="{2E6EDEC0-655C-4732-B98B-B83FB6CA77DC}"/>
+              </a:ext>
+            </a:extLst>
+          </p:cNvPr>
+          <p:cNvSpPr txBox="1"/>
           <p:nvPr/>
         </p:nvSpPr>
         <p:spPr>
           <a:xfrm>
-            <a:off x="527222" y="4419568"/>
-            <a:ext cx="1462345" cy="938557"/>
+            <a:off x="681973" y="4178417"/>
+            <a:ext cx="4262705" cy="2400657"/>
           </a:xfrm>
-          <a:prstGeom prst="ellipse">
+          <a:prstGeom prst="rect">
             <a:avLst/>
           </a:prstGeom>
-          <a:solidFill>
-            <a:srgbClr val="0070C0"/>
-          </a:solidFill>
-          <a:ln>
-            <a:solidFill>
-              <a:schemeClr val="accent5">
-                <a:lumMod val="75000"/>
-              </a:schemeClr>
-            </a:solidFill>
-          </a:ln>
+          <a:noFill/>
         </p:spPr>
-        <p:style>
-          <a:lnRef idx="2">
-            <a:schemeClr val="accent1">
-              <a:shade val="50000"/>
-            </a:schemeClr>
-          </a:lnRef>
-          <a:fillRef idx="1">
-            <a:schemeClr val="accent1"/>
-          </a:fillRef>
-          <a:effectRef idx="0">
-            <a:schemeClr val="accent1"/>
-          </a:effectRef>
-          <a:fontRef idx="minor">
-            <a:schemeClr val="lt1"/>
-          </a:fontRef>
-        </p:style>
         <p:txBody>
-          <a:bodyPr rtlCol="0" anchor="ctr"/>
+          <a:bodyPr wrap="none" rtlCol="0">
+            <a:spAutoFit/>
+          </a:bodyPr>
           <a:lstStyle/>
           <a:p>
-            <a:pPr algn="ctr"/>
+            <a:pPr>
+              <a:lnSpc>
+                <a:spcPct val="125000"/>
+              </a:lnSpc>
+            </a:pPr>
             <a:r>
-              <a:rPr lang="en-US" sz="2800" dirty="0"/>
-              <a:t>Start</a:t>
+              <a:rPr lang="en-US" sz="2400" dirty="0" err="1">
+                <a:solidFill>
+                  <a:srgbClr val="7030A0"/>
+                </a:solidFill>
+                <a:latin typeface="Consolas" panose="020B0609020204030204" pitchFamily="49" charset="0"/>
+              </a:rPr>
+              <a:t>MutableIntList</a:t>
             </a:r>
+            <a:endParaRPr lang="en-US" sz="2400" dirty="0">
+              <a:solidFill>
+                <a:srgbClr val="7030A0"/>
+              </a:solidFill>
+              <a:latin typeface="Consolas" panose="020B0609020204030204" pitchFamily="49" charset="0"/>
+            </a:endParaRPr>
+          </a:p>
+          <a:p>
+            <a:pPr>
+              <a:lnSpc>
+                <a:spcPct val="125000"/>
+              </a:lnSpc>
+            </a:pPr>
+            <a:r>
+              <a:rPr lang="en-US" sz="2400" dirty="0" err="1">
+                <a:solidFill>
+                  <a:srgbClr val="7030A0"/>
+                </a:solidFill>
+                <a:latin typeface="Consolas" panose="020B0609020204030204" pitchFamily="49" charset="0"/>
+              </a:rPr>
+              <a:t>LongStack</a:t>
+            </a:r>
+            <a:endParaRPr lang="en-US" sz="2400" dirty="0">
+              <a:solidFill>
+                <a:srgbClr val="7030A0"/>
+              </a:solidFill>
+              <a:latin typeface="Consolas" panose="020B0609020204030204" pitchFamily="49" charset="0"/>
+            </a:endParaRPr>
+          </a:p>
+          <a:p>
+            <a:pPr>
+              <a:lnSpc>
+                <a:spcPct val="125000"/>
+              </a:lnSpc>
+            </a:pPr>
+            <a:r>
+              <a:rPr lang="en-US" sz="2400" dirty="0" err="1">
+                <a:solidFill>
+                  <a:srgbClr val="7030A0"/>
+                </a:solidFill>
+                <a:latin typeface="Consolas" panose="020B0609020204030204" pitchFamily="49" charset="0"/>
+              </a:rPr>
+              <a:t>SortedBagMultimap</a:t>
+            </a:r>
+            <a:endParaRPr lang="en-US" sz="2400" dirty="0">
+              <a:solidFill>
+                <a:srgbClr val="7030A0"/>
+              </a:solidFill>
+              <a:latin typeface="Consolas" panose="020B0609020204030204" pitchFamily="49" charset="0"/>
+            </a:endParaRPr>
+          </a:p>
+          <a:p>
+            <a:pPr>
+              <a:lnSpc>
+                <a:spcPct val="125000"/>
+              </a:lnSpc>
+            </a:pPr>
+            <a:r>
+              <a:rPr lang="en-US" sz="2400" dirty="0" err="1">
+                <a:solidFill>
+                  <a:srgbClr val="7030A0"/>
+                </a:solidFill>
+                <a:latin typeface="Consolas" panose="020B0609020204030204" pitchFamily="49" charset="0"/>
+              </a:rPr>
+              <a:t>ImmutableObjectLongMap</a:t>
+            </a:r>
+            <a:endParaRPr lang="en-US" sz="2400" dirty="0">
+              <a:solidFill>
+                <a:srgbClr val="7030A0"/>
+              </a:solidFill>
+              <a:latin typeface="Consolas" panose="020B0609020204030204" pitchFamily="49" charset="0"/>
+            </a:endParaRPr>
+          </a:p>
+          <a:p>
+            <a:pPr>
+              <a:lnSpc>
+                <a:spcPct val="125000"/>
+              </a:lnSpc>
+            </a:pPr>
+            <a:r>
+              <a:rPr lang="en-US" sz="2400" dirty="0" err="1">
+                <a:solidFill>
+                  <a:srgbClr val="7030A0"/>
+                </a:solidFill>
+                <a:latin typeface="Consolas" panose="020B0609020204030204" pitchFamily="49" charset="0"/>
+              </a:rPr>
+              <a:t>MutableSortedSetMultimap</a:t>
+            </a:r>
+            <a:endParaRPr lang="en-US" sz="2400" dirty="0">
+              <a:solidFill>
+                <a:srgbClr val="7030A0"/>
+              </a:solidFill>
+              <a:latin typeface="Consolas" panose="020B0609020204030204" pitchFamily="49" charset="0"/>
+            </a:endParaRPr>
           </a:p>
         </p:txBody>
       </p:sp>
-      <p:cxnSp>
-        <p:nvCxnSpPr>
-          <p:cNvPr id="85" name="Straight Arrow Connector 84">
-            <a:extLst>
-              <a:ext uri="{FF2B5EF4-FFF2-40B4-BE49-F238E27FC236}">
-                <a16:creationId xmlns:a16="http://schemas.microsoft.com/office/drawing/2014/main" id="{296FACB8-D98A-4163-84CB-C8851B17718A}"/>
-              </a:ext>
-            </a:extLst>
-          </p:cNvPr>
-          <p:cNvCxnSpPr>
-            <a:cxnSpLocks/>
-            <a:stCxn id="84" idx="0"/>
-          </p:cNvCxnSpPr>
-          <p:nvPr/>
-        </p:nvCxnSpPr>
-        <p:spPr>
-          <a:xfrm flipV="1">
-            <a:off x="1258395" y="4008450"/>
-            <a:ext cx="0" cy="411118"/>
-          </a:xfrm>
-          <a:prstGeom prst="straightConnector1">
-            <a:avLst/>
-          </a:prstGeom>
-          <a:ln w="38100">
-            <a:solidFill>
-              <a:schemeClr val="accent5">
-                <a:lumMod val="75000"/>
-              </a:schemeClr>
-            </a:solidFill>
-            <a:headEnd type="none" w="med" len="med"/>
-            <a:tailEnd type="arrow" w="med" len="lg"/>
-          </a:ln>
-        </p:spPr>
-        <p:style>
-          <a:lnRef idx="1">
-            <a:schemeClr val="accent1"/>
-          </a:lnRef>
-          <a:fillRef idx="0">
-            <a:schemeClr val="accent1"/>
-          </a:fillRef>
-          <a:effectRef idx="0">
-            <a:schemeClr val="accent1"/>
-          </a:effectRef>
-          <a:fontRef idx="minor">
-            <a:schemeClr val="tx1"/>
-          </a:fontRef>
-        </p:style>
-      </p:cxnSp>
     </p:spTree>
     <p:extLst>
       <p:ext uri="{BB962C8B-B14F-4D97-AF65-F5344CB8AC3E}">
@@ -11532,6 +10386,244 @@
       </p:grpSpPr>
       <p:cxnSp>
         <p:nvCxnSpPr>
+          <p:cNvPr id="73" name="Straight Connector 72">
+            <a:extLst>
+              <a:ext uri="{FF2B5EF4-FFF2-40B4-BE49-F238E27FC236}">
+                <a16:creationId xmlns:a16="http://schemas.microsoft.com/office/drawing/2014/main" id="{62F04C01-EC0A-4954-AFDA-0AFB773491B7}"/>
+              </a:ext>
+            </a:extLst>
+          </p:cNvPr>
+          <p:cNvCxnSpPr>
+            <a:cxnSpLocks/>
+            <a:endCxn id="49" idx="6"/>
+          </p:cNvCxnSpPr>
+          <p:nvPr/>
+        </p:nvCxnSpPr>
+        <p:spPr>
+          <a:xfrm flipH="1" flipV="1">
+            <a:off x="8109398" y="3796049"/>
+            <a:ext cx="1714053" cy="431554"/>
+          </a:xfrm>
+          <a:prstGeom prst="line">
+            <a:avLst/>
+          </a:prstGeom>
+          <a:ln w="28575">
+            <a:solidFill>
+              <a:schemeClr val="accent5">
+                <a:lumMod val="75000"/>
+              </a:schemeClr>
+            </a:solidFill>
+          </a:ln>
+        </p:spPr>
+        <p:style>
+          <a:lnRef idx="1">
+            <a:schemeClr val="accent1"/>
+          </a:lnRef>
+          <a:fillRef idx="0">
+            <a:schemeClr val="accent1"/>
+          </a:fillRef>
+          <a:effectRef idx="0">
+            <a:schemeClr val="accent1"/>
+          </a:effectRef>
+          <a:fontRef idx="minor">
+            <a:schemeClr val="tx1"/>
+          </a:fontRef>
+        </p:style>
+      </p:cxnSp>
+      <p:cxnSp>
+        <p:nvCxnSpPr>
+          <p:cNvPr id="70" name="Straight Connector 69">
+            <a:extLst>
+              <a:ext uri="{FF2B5EF4-FFF2-40B4-BE49-F238E27FC236}">
+                <a16:creationId xmlns:a16="http://schemas.microsoft.com/office/drawing/2014/main" id="{A94C37A3-CF1F-4B8E-A4C6-9B614ECD4438}"/>
+              </a:ext>
+            </a:extLst>
+          </p:cNvPr>
+          <p:cNvCxnSpPr>
+            <a:cxnSpLocks/>
+            <a:endCxn id="49" idx="7"/>
+          </p:cNvCxnSpPr>
+          <p:nvPr/>
+        </p:nvCxnSpPr>
+        <p:spPr>
+          <a:xfrm flipH="1">
+            <a:off x="8094342" y="2921023"/>
+            <a:ext cx="1361716" cy="836028"/>
+          </a:xfrm>
+          <a:prstGeom prst="line">
+            <a:avLst/>
+          </a:prstGeom>
+          <a:ln w="28575">
+            <a:solidFill>
+              <a:schemeClr val="accent5">
+                <a:lumMod val="75000"/>
+              </a:schemeClr>
+            </a:solidFill>
+          </a:ln>
+        </p:spPr>
+        <p:style>
+          <a:lnRef idx="1">
+            <a:schemeClr val="accent1"/>
+          </a:lnRef>
+          <a:fillRef idx="0">
+            <a:schemeClr val="accent1"/>
+          </a:fillRef>
+          <a:effectRef idx="0">
+            <a:schemeClr val="accent1"/>
+          </a:effectRef>
+          <a:fontRef idx="minor">
+            <a:schemeClr val="tx1"/>
+          </a:fontRef>
+        </p:style>
+      </p:cxnSp>
+      <p:sp>
+        <p:nvSpPr>
+          <p:cNvPr id="56" name="Oval 55">
+            <a:extLst>
+              <a:ext uri="{FF2B5EF4-FFF2-40B4-BE49-F238E27FC236}">
+                <a16:creationId xmlns:a16="http://schemas.microsoft.com/office/drawing/2014/main" id="{655C4984-C970-483D-9E58-29CCEAA139D8}"/>
+              </a:ext>
+            </a:extLst>
+          </p:cNvPr>
+          <p:cNvSpPr/>
+          <p:nvPr/>
+        </p:nvSpPr>
+        <p:spPr>
+          <a:xfrm>
+            <a:off x="5467938" y="2576220"/>
+            <a:ext cx="146396" cy="146396"/>
+          </a:xfrm>
+          <a:prstGeom prst="ellipse">
+            <a:avLst/>
+          </a:prstGeom>
+          <a:solidFill>
+            <a:schemeClr val="bg1"/>
+          </a:solidFill>
+          <a:ln>
+            <a:noFill/>
+          </a:ln>
+        </p:spPr>
+        <p:style>
+          <a:lnRef idx="2">
+            <a:schemeClr val="accent1">
+              <a:shade val="50000"/>
+            </a:schemeClr>
+          </a:lnRef>
+          <a:fillRef idx="1">
+            <a:schemeClr val="accent1"/>
+          </a:fillRef>
+          <a:effectRef idx="0">
+            <a:schemeClr val="accent1"/>
+          </a:effectRef>
+          <a:fontRef idx="minor">
+            <a:schemeClr val="lt1"/>
+          </a:fontRef>
+        </p:style>
+        <p:txBody>
+          <a:bodyPr rtlCol="0" anchor="ctr"/>
+          <a:lstStyle/>
+          <a:p>
+            <a:pPr algn="ctr"/>
+            <a:endParaRPr lang="en-US"/>
+          </a:p>
+        </p:txBody>
+      </p:sp>
+      <p:cxnSp>
+        <p:nvCxnSpPr>
+          <p:cNvPr id="39" name="Straight Connector 38">
+            <a:extLst>
+              <a:ext uri="{FF2B5EF4-FFF2-40B4-BE49-F238E27FC236}">
+                <a16:creationId xmlns:a16="http://schemas.microsoft.com/office/drawing/2014/main" id="{F6EA9C6D-B52F-4FF8-B968-A7D72EFF8F7D}"/>
+              </a:ext>
+            </a:extLst>
+          </p:cNvPr>
+          <p:cNvCxnSpPr>
+            <a:cxnSpLocks/>
+            <a:stCxn id="62" idx="3"/>
+            <a:endCxn id="56" idx="5"/>
+          </p:cNvCxnSpPr>
+          <p:nvPr/>
+        </p:nvCxnSpPr>
+        <p:spPr>
+          <a:xfrm flipH="1">
+            <a:off x="5592895" y="1570784"/>
+            <a:ext cx="687860" cy="1130393"/>
+          </a:xfrm>
+          <a:prstGeom prst="line">
+            <a:avLst/>
+          </a:prstGeom>
+          <a:ln w="28575">
+            <a:solidFill>
+              <a:schemeClr val="accent5">
+                <a:lumMod val="75000"/>
+              </a:schemeClr>
+            </a:solidFill>
+          </a:ln>
+        </p:spPr>
+        <p:style>
+          <a:lnRef idx="1">
+            <a:schemeClr val="accent1"/>
+          </a:lnRef>
+          <a:fillRef idx="0">
+            <a:schemeClr val="accent1"/>
+          </a:fillRef>
+          <a:effectRef idx="0">
+            <a:schemeClr val="accent1"/>
+          </a:effectRef>
+          <a:fontRef idx="minor">
+            <a:schemeClr val="tx1"/>
+          </a:fontRef>
+        </p:style>
+      </p:cxnSp>
+      <p:cxnSp>
+        <p:nvCxnSpPr>
+          <p:cNvPr id="38" name="Straight Connector 37">
+            <a:extLst>
+              <a:ext uri="{FF2B5EF4-FFF2-40B4-BE49-F238E27FC236}">
+                <a16:creationId xmlns:a16="http://schemas.microsoft.com/office/drawing/2014/main" id="{FD95DB42-9DBF-4F08-B1F7-BEBD78CDF7BE}"/>
+              </a:ext>
+            </a:extLst>
+          </p:cNvPr>
+          <p:cNvCxnSpPr>
+            <a:cxnSpLocks/>
+            <a:stCxn id="61" idx="5"/>
+            <a:endCxn id="56" idx="2"/>
+          </p:cNvCxnSpPr>
+          <p:nvPr/>
+        </p:nvCxnSpPr>
+        <p:spPr>
+          <a:xfrm>
+            <a:off x="3192594" y="1516182"/>
+            <a:ext cx="2275344" cy="1133236"/>
+          </a:xfrm>
+          <a:prstGeom prst="line">
+            <a:avLst/>
+          </a:prstGeom>
+          <a:ln w="28575">
+            <a:solidFill>
+              <a:schemeClr val="accent5">
+                <a:lumMod val="75000"/>
+              </a:schemeClr>
+            </a:solidFill>
+          </a:ln>
+        </p:spPr>
+        <p:style>
+          <a:lnRef idx="1">
+            <a:schemeClr val="accent1"/>
+          </a:lnRef>
+          <a:fillRef idx="0">
+            <a:schemeClr val="accent1"/>
+          </a:fillRef>
+          <a:effectRef idx="0">
+            <a:schemeClr val="accent1"/>
+          </a:effectRef>
+          <a:fontRef idx="minor">
+            <a:schemeClr val="tx1"/>
+          </a:fontRef>
+        </p:style>
+      </p:cxnSp>
+      <p:cxnSp>
+        <p:nvCxnSpPr>
           <p:cNvPr id="57" name="Straight Connector 56">
             <a:extLst>
               <a:ext uri="{FF2B5EF4-FFF2-40B4-BE49-F238E27FC236}">
@@ -11595,8 +10687,8 @@
         </p:nvCxnSpPr>
         <p:spPr>
           <a:xfrm flipH="1" flipV="1">
-            <a:off x="5510016" y="3961331"/>
-            <a:ext cx="2991381" cy="1010348"/>
+            <a:off x="5495387" y="3961331"/>
+            <a:ext cx="3505301" cy="1242706"/>
           </a:xfrm>
           <a:prstGeom prst="line">
             <a:avLst/>
@@ -11831,7 +10923,7 @@
         <p:spPr>
           <a:xfrm flipH="1">
             <a:off x="2714977" y="3886200"/>
-            <a:ext cx="2613657" cy="0"/>
+            <a:ext cx="2634344" cy="0"/>
           </a:xfrm>
           <a:prstGeom prst="line">
             <a:avLst/>
@@ -12448,12 +11540,73 @@
           </p:txBody>
         </p:sp>
       </p:grpSp>
+      <p:sp>
+        <p:nvSpPr>
+          <p:cNvPr id="55" name="Rectangle: Rounded Corners 54">
+            <a:extLst>
+              <a:ext uri="{FF2B5EF4-FFF2-40B4-BE49-F238E27FC236}">
+                <a16:creationId xmlns:a16="http://schemas.microsoft.com/office/drawing/2014/main" id="{C1CF0171-131C-41C1-9CC8-197E074F250E}"/>
+              </a:ext>
+            </a:extLst>
+          </p:cNvPr>
+          <p:cNvSpPr/>
+          <p:nvPr/>
+        </p:nvSpPr>
+        <p:spPr>
+          <a:xfrm>
+            <a:off x="3772655" y="2453015"/>
+            <a:ext cx="3470856" cy="392806"/>
+          </a:xfrm>
+          <a:prstGeom prst="roundRect">
+            <a:avLst/>
+          </a:prstGeom>
+          <a:solidFill>
+            <a:schemeClr val="bg1"/>
+          </a:solidFill>
+          <a:ln>
+            <a:noFill/>
+          </a:ln>
+        </p:spPr>
+        <p:style>
+          <a:lnRef idx="2">
+            <a:schemeClr val="accent1">
+              <a:shade val="50000"/>
+            </a:schemeClr>
+          </a:lnRef>
+          <a:fillRef idx="1">
+            <a:schemeClr val="accent1"/>
+          </a:fillRef>
+          <a:effectRef idx="0">
+            <a:schemeClr val="accent1"/>
+          </a:effectRef>
+          <a:fontRef idx="minor">
+            <a:schemeClr val="lt1"/>
+          </a:fontRef>
+        </p:style>
+        <p:txBody>
+          <a:bodyPr rtlCol="0" anchor="ctr"/>
+          <a:lstStyle/>
+          <a:p>
+            <a:pPr algn="ctr"/>
+            <a:r>
+              <a:rPr lang="en-US" sz="2000" dirty="0">
+                <a:solidFill>
+                  <a:schemeClr val="accent5">
+                    <a:lumMod val="50000"/>
+                  </a:schemeClr>
+                </a:solidFill>
+              </a:rPr>
+              <a:t>Testability/Debuggability</a:t>
+            </a:r>
+          </a:p>
+        </p:txBody>
+      </p:sp>
       <p:grpSp>
         <p:nvGrpSpPr>
-          <p:cNvPr id="19" name="Group 18">
-            <a:extLst>
-              <a:ext uri="{FF2B5EF4-FFF2-40B4-BE49-F238E27FC236}">
-                <a16:creationId xmlns:a16="http://schemas.microsoft.com/office/drawing/2014/main" id="{F4095EC7-1E52-4FBC-8292-E9226101EB71}"/>
+          <p:cNvPr id="16" name="Group 15">
+            <a:extLst>
+              <a:ext uri="{FF2B5EF4-FFF2-40B4-BE49-F238E27FC236}">
+                <a16:creationId xmlns:a16="http://schemas.microsoft.com/office/drawing/2014/main" id="{8F891046-6C17-4FB4-A6CB-48E071904A92}"/>
               </a:ext>
             </a:extLst>
           </p:cNvPr>
@@ -12462,140 +11615,8 @@
         </p:nvGrpSpPr>
         <p:grpSpPr>
           <a:xfrm>
-            <a:off x="3772655" y="2453015"/>
-            <a:ext cx="3470856" cy="392806"/>
-            <a:chOff x="3772655" y="2453015"/>
-            <a:chExt cx="3470856" cy="392806"/>
-          </a:xfrm>
-        </p:grpSpPr>
-        <p:sp>
-          <p:nvSpPr>
-            <p:cNvPr id="55" name="Rectangle: Rounded Corners 54">
-              <a:extLst>
-                <a:ext uri="{FF2B5EF4-FFF2-40B4-BE49-F238E27FC236}">
-                  <a16:creationId xmlns:a16="http://schemas.microsoft.com/office/drawing/2014/main" id="{C1CF0171-131C-41C1-9CC8-197E074F250E}"/>
-                </a:ext>
-              </a:extLst>
-            </p:cNvPr>
-            <p:cNvSpPr/>
-            <p:nvPr/>
-          </p:nvSpPr>
-          <p:spPr>
-            <a:xfrm>
-              <a:off x="3772655" y="2453015"/>
-              <a:ext cx="3470856" cy="392806"/>
-            </a:xfrm>
-            <a:prstGeom prst="roundRect">
-              <a:avLst/>
-            </a:prstGeom>
-            <a:solidFill>
-              <a:schemeClr val="bg1"/>
-            </a:solidFill>
-            <a:ln>
-              <a:noFill/>
-            </a:ln>
-          </p:spPr>
-          <p:style>
-            <a:lnRef idx="2">
-              <a:schemeClr val="accent1">
-                <a:shade val="50000"/>
-              </a:schemeClr>
-            </a:lnRef>
-            <a:fillRef idx="1">
-              <a:schemeClr val="accent1"/>
-            </a:fillRef>
-            <a:effectRef idx="0">
-              <a:schemeClr val="accent1"/>
-            </a:effectRef>
-            <a:fontRef idx="minor">
-              <a:schemeClr val="lt1"/>
-            </a:fontRef>
-          </p:style>
-          <p:txBody>
-            <a:bodyPr rtlCol="0" anchor="ctr"/>
-            <a:lstStyle/>
-            <a:p>
-              <a:pPr algn="ctr"/>
-              <a:r>
-                <a:rPr lang="en-US" sz="2000" dirty="0">
-                  <a:solidFill>
-                    <a:schemeClr val="accent5">
-                      <a:lumMod val="50000"/>
-                    </a:schemeClr>
-                  </a:solidFill>
-                </a:rPr>
-                <a:t>Testability/Debuggability</a:t>
-              </a:r>
-            </a:p>
-          </p:txBody>
-        </p:sp>
-        <p:sp>
-          <p:nvSpPr>
-            <p:cNvPr id="56" name="Oval 55">
-              <a:extLst>
-                <a:ext uri="{FF2B5EF4-FFF2-40B4-BE49-F238E27FC236}">
-                  <a16:creationId xmlns:a16="http://schemas.microsoft.com/office/drawing/2014/main" id="{655C4984-C970-483D-9E58-29CCEAA139D8}"/>
-                </a:ext>
-              </a:extLst>
-            </p:cNvPr>
-            <p:cNvSpPr/>
-            <p:nvPr/>
-          </p:nvSpPr>
-          <p:spPr>
-            <a:xfrm>
-              <a:off x="5467938" y="2576220"/>
-              <a:ext cx="146396" cy="146396"/>
-            </a:xfrm>
-            <a:prstGeom prst="ellipse">
-              <a:avLst/>
-            </a:prstGeom>
-            <a:noFill/>
-            <a:ln>
-              <a:noFill/>
-            </a:ln>
-          </p:spPr>
-          <p:style>
-            <a:lnRef idx="2">
-              <a:schemeClr val="accent1">
-                <a:shade val="50000"/>
-              </a:schemeClr>
-            </a:lnRef>
-            <a:fillRef idx="1">
-              <a:schemeClr val="accent1"/>
-            </a:fillRef>
-            <a:effectRef idx="0">
-              <a:schemeClr val="accent1"/>
-            </a:effectRef>
-            <a:fontRef idx="minor">
-              <a:schemeClr val="lt1"/>
-            </a:fontRef>
-          </p:style>
-          <p:txBody>
-            <a:bodyPr rtlCol="0" anchor="ctr"/>
-            <a:lstStyle/>
-            <a:p>
-              <a:pPr algn="ctr"/>
-              <a:endParaRPr lang="en-US"/>
-            </a:p>
-          </p:txBody>
-        </p:sp>
-      </p:grpSp>
-      <p:grpSp>
-        <p:nvGrpSpPr>
-          <p:cNvPr id="16" name="Group 15">
-            <a:extLst>
-              <a:ext uri="{FF2B5EF4-FFF2-40B4-BE49-F238E27FC236}">
-                <a16:creationId xmlns:a16="http://schemas.microsoft.com/office/drawing/2014/main" id="{8F891046-6C17-4FB4-A6CB-48E071904A92}"/>
-              </a:ext>
-            </a:extLst>
-          </p:cNvPr>
-          <p:cNvGrpSpPr/>
-          <p:nvPr/>
-        </p:nvGrpSpPr>
-        <p:grpSpPr>
-          <a:xfrm>
-            <a:off x="4462530" y="3689797"/>
-            <a:ext cx="1944710" cy="392806"/>
+            <a:off x="4651850" y="3689797"/>
+            <a:ext cx="1566070" cy="392806"/>
             <a:chOff x="4462530" y="3689797"/>
             <a:chExt cx="1944710" cy="392806"/>
           </a:xfrm>
@@ -12660,7 +11681,7 @@
                     </a:schemeClr>
                   </a:solidFill>
                 </a:rPr>
-                <a:t>Refactoring</a:t>
+                <a:t>Benefits</a:t>
               </a:r>
             </a:p>
           </p:txBody>
@@ -12862,7 +11883,7 @@
         </p:nvGrpSpPr>
         <p:grpSpPr>
           <a:xfrm>
-            <a:off x="6877647" y="4864181"/>
+            <a:off x="7376938" y="5096539"/>
             <a:ext cx="4016776" cy="392806"/>
             <a:chOff x="6877647" y="4864181"/>
             <a:chExt cx="4016776" cy="392806"/>
@@ -12944,7 +11965,7 @@
                     </a:schemeClr>
                   </a:solidFill>
                 </a:rPr>
-                <a:t>citation needed</a:t>
+                <a:t>citation needed </a:t>
               </a:r>
               <a:r>
                 <a:rPr lang="en-US" sz="2000" baseline="30000" dirty="0">
@@ -13010,6 +12031,796 @@
           </p:txBody>
         </p:sp>
       </p:grpSp>
+      <p:sp>
+        <p:nvSpPr>
+          <p:cNvPr id="41" name="Rectangle: Rounded Corners 40">
+            <a:extLst>
+              <a:ext uri="{FF2B5EF4-FFF2-40B4-BE49-F238E27FC236}">
+                <a16:creationId xmlns:a16="http://schemas.microsoft.com/office/drawing/2014/main" id="{7BFCD735-7B58-4948-851A-E0DD8D70F701}"/>
+              </a:ext>
+            </a:extLst>
+          </p:cNvPr>
+          <p:cNvSpPr/>
+          <p:nvPr/>
+        </p:nvSpPr>
+        <p:spPr>
+          <a:xfrm>
+            <a:off x="3388725" y="6011997"/>
+            <a:ext cx="2613657" cy="357852"/>
+          </a:xfrm>
+          <a:prstGeom prst="roundRect">
+            <a:avLst/>
+          </a:prstGeom>
+          <a:solidFill>
+            <a:schemeClr val="bg1"/>
+          </a:solidFill>
+          <a:ln>
+            <a:noFill/>
+          </a:ln>
+        </p:spPr>
+        <p:style>
+          <a:lnRef idx="2">
+            <a:schemeClr val="accent1">
+              <a:shade val="50000"/>
+            </a:schemeClr>
+          </a:lnRef>
+          <a:fillRef idx="1">
+            <a:schemeClr val="accent1"/>
+          </a:fillRef>
+          <a:effectRef idx="0">
+            <a:schemeClr val="accent1"/>
+          </a:effectRef>
+          <a:fontRef idx="minor">
+            <a:schemeClr val="lt1"/>
+          </a:fontRef>
+        </p:style>
+        <p:txBody>
+          <a:bodyPr rtlCol="0" anchor="ctr"/>
+          <a:lstStyle/>
+          <a:p>
+            <a:pPr algn="ctr"/>
+            <a:r>
+              <a:rPr lang="en-US" sz="1600" dirty="0">
+                <a:solidFill>
+                  <a:schemeClr val="accent5">
+                    <a:lumMod val="50000"/>
+                  </a:schemeClr>
+                </a:solidFill>
+              </a:rPr>
+              <a:t>Efficient Maps and Sets</a:t>
+            </a:r>
+          </a:p>
+        </p:txBody>
+      </p:sp>
+      <p:sp>
+        <p:nvSpPr>
+          <p:cNvPr id="45" name="Rectangle: Rounded Corners 44">
+            <a:extLst>
+              <a:ext uri="{FF2B5EF4-FFF2-40B4-BE49-F238E27FC236}">
+                <a16:creationId xmlns:a16="http://schemas.microsoft.com/office/drawing/2014/main" id="{DE38DB02-B971-4712-A42D-D9307D0F8534}"/>
+              </a:ext>
+            </a:extLst>
+          </p:cNvPr>
+          <p:cNvSpPr/>
+          <p:nvPr/>
+        </p:nvSpPr>
+        <p:spPr>
+          <a:xfrm>
+            <a:off x="5642637" y="5685382"/>
+            <a:ext cx="1987117" cy="357852"/>
+          </a:xfrm>
+          <a:prstGeom prst="roundRect">
+            <a:avLst/>
+          </a:prstGeom>
+          <a:solidFill>
+            <a:schemeClr val="bg1"/>
+          </a:solidFill>
+          <a:ln>
+            <a:noFill/>
+          </a:ln>
+        </p:spPr>
+        <p:style>
+          <a:lnRef idx="2">
+            <a:schemeClr val="accent1">
+              <a:shade val="50000"/>
+            </a:schemeClr>
+          </a:lnRef>
+          <a:fillRef idx="1">
+            <a:schemeClr val="accent1"/>
+          </a:fillRef>
+          <a:effectRef idx="0">
+            <a:schemeClr val="accent1"/>
+          </a:effectRef>
+          <a:fontRef idx="minor">
+            <a:schemeClr val="lt1"/>
+          </a:fontRef>
+        </p:style>
+        <p:txBody>
+          <a:bodyPr rtlCol="0" anchor="ctr"/>
+          <a:lstStyle/>
+          <a:p>
+            <a:pPr algn="ctr"/>
+            <a:r>
+              <a:rPr lang="en-US" sz="1600" dirty="0">
+                <a:solidFill>
+                  <a:schemeClr val="accent5">
+                    <a:lumMod val="50000"/>
+                  </a:schemeClr>
+                </a:solidFill>
+              </a:rPr>
+              <a:t>Primitive Types</a:t>
+            </a:r>
+          </a:p>
+        </p:txBody>
+      </p:sp>
+      <p:cxnSp>
+        <p:nvCxnSpPr>
+          <p:cNvPr id="46" name="Straight Connector 45">
+            <a:extLst>
+              <a:ext uri="{FF2B5EF4-FFF2-40B4-BE49-F238E27FC236}">
+                <a16:creationId xmlns:a16="http://schemas.microsoft.com/office/drawing/2014/main" id="{3436C283-3582-4E20-BE08-5847E8594F0C}"/>
+              </a:ext>
+            </a:extLst>
+          </p:cNvPr>
+          <p:cNvCxnSpPr>
+            <a:cxnSpLocks/>
+            <a:stCxn id="4" idx="3"/>
+            <a:endCxn id="49" idx="6"/>
+          </p:cNvCxnSpPr>
+          <p:nvPr/>
+        </p:nvCxnSpPr>
+        <p:spPr>
+          <a:xfrm flipV="1">
+            <a:off x="6217920" y="3796049"/>
+            <a:ext cx="1891478" cy="90151"/>
+          </a:xfrm>
+          <a:prstGeom prst="line">
+            <a:avLst/>
+          </a:prstGeom>
+          <a:ln w="76200">
+            <a:solidFill>
+              <a:schemeClr val="accent5">
+                <a:lumMod val="75000"/>
+              </a:schemeClr>
+            </a:solidFill>
+          </a:ln>
+        </p:spPr>
+        <p:style>
+          <a:lnRef idx="1">
+            <a:schemeClr val="accent1"/>
+          </a:lnRef>
+          <a:fillRef idx="0">
+            <a:schemeClr val="accent1"/>
+          </a:fillRef>
+          <a:effectRef idx="0">
+            <a:schemeClr val="accent1"/>
+          </a:effectRef>
+          <a:fontRef idx="minor">
+            <a:schemeClr val="tx1"/>
+          </a:fontRef>
+        </p:style>
+      </p:cxnSp>
+      <p:grpSp>
+        <p:nvGrpSpPr>
+          <p:cNvPr id="83" name="Group 82">
+            <a:extLst>
+              <a:ext uri="{FF2B5EF4-FFF2-40B4-BE49-F238E27FC236}">
+                <a16:creationId xmlns:a16="http://schemas.microsoft.com/office/drawing/2014/main" id="{3FBF4829-A9A3-4D51-8C17-3AF0E0A06358}"/>
+              </a:ext>
+            </a:extLst>
+          </p:cNvPr>
+          <p:cNvGrpSpPr/>
+          <p:nvPr/>
+        </p:nvGrpSpPr>
+        <p:grpSpPr>
+          <a:xfrm>
+            <a:off x="7308408" y="3600011"/>
+            <a:ext cx="1368017" cy="392074"/>
+            <a:chOff x="7308409" y="3659579"/>
+            <a:chExt cx="919582" cy="272938"/>
+          </a:xfrm>
+        </p:grpSpPr>
+        <p:sp>
+          <p:nvSpPr>
+            <p:cNvPr id="49" name="Oval 48">
+              <a:extLst>
+                <a:ext uri="{FF2B5EF4-FFF2-40B4-BE49-F238E27FC236}">
+                  <a16:creationId xmlns:a16="http://schemas.microsoft.com/office/drawing/2014/main" id="{E17CD356-20B7-418C-BDDE-C9387B5C8842}"/>
+                </a:ext>
+              </a:extLst>
+            </p:cNvPr>
+            <p:cNvSpPr/>
+            <p:nvPr/>
+          </p:nvSpPr>
+          <p:spPr>
+            <a:xfrm>
+              <a:off x="7777725" y="3757655"/>
+              <a:ext cx="69110" cy="76786"/>
+            </a:xfrm>
+            <a:prstGeom prst="ellipse">
+              <a:avLst/>
+            </a:prstGeom>
+            <a:solidFill>
+              <a:schemeClr val="bg1"/>
+            </a:solidFill>
+            <a:ln>
+              <a:noFill/>
+            </a:ln>
+          </p:spPr>
+          <p:style>
+            <a:lnRef idx="2">
+              <a:schemeClr val="accent1">
+                <a:shade val="50000"/>
+              </a:schemeClr>
+            </a:lnRef>
+            <a:fillRef idx="1">
+              <a:schemeClr val="accent1"/>
+            </a:fillRef>
+            <a:effectRef idx="0">
+              <a:schemeClr val="accent1"/>
+            </a:effectRef>
+            <a:fontRef idx="minor">
+              <a:schemeClr val="lt1"/>
+            </a:fontRef>
+          </p:style>
+          <p:txBody>
+            <a:bodyPr rtlCol="0" anchor="ctr"/>
+            <a:lstStyle/>
+            <a:p>
+              <a:pPr algn="ctr"/>
+              <a:endParaRPr lang="en-US"/>
+            </a:p>
+          </p:txBody>
+        </p:sp>
+        <p:sp>
+          <p:nvSpPr>
+            <p:cNvPr id="48" name="Rectangle: Rounded Corners 47">
+              <a:extLst>
+                <a:ext uri="{FF2B5EF4-FFF2-40B4-BE49-F238E27FC236}">
+                  <a16:creationId xmlns:a16="http://schemas.microsoft.com/office/drawing/2014/main" id="{66D9EE61-976B-48A3-8962-E5DDD77C8FB9}"/>
+                </a:ext>
+              </a:extLst>
+            </p:cNvPr>
+            <p:cNvSpPr/>
+            <p:nvPr/>
+          </p:nvSpPr>
+          <p:spPr>
+            <a:xfrm>
+              <a:off x="7308409" y="3659579"/>
+              <a:ext cx="919582" cy="272938"/>
+            </a:xfrm>
+            <a:prstGeom prst="roundRect">
+              <a:avLst/>
+            </a:prstGeom>
+            <a:solidFill>
+              <a:schemeClr val="bg1"/>
+            </a:solidFill>
+            <a:ln>
+              <a:noFill/>
+            </a:ln>
+          </p:spPr>
+          <p:style>
+            <a:lnRef idx="2">
+              <a:schemeClr val="accent1">
+                <a:shade val="50000"/>
+              </a:schemeClr>
+            </a:lnRef>
+            <a:fillRef idx="1">
+              <a:schemeClr val="accent1"/>
+            </a:fillRef>
+            <a:effectRef idx="0">
+              <a:schemeClr val="accent1"/>
+            </a:effectRef>
+            <a:fontRef idx="minor">
+              <a:schemeClr val="lt1"/>
+            </a:fontRef>
+          </p:style>
+          <p:txBody>
+            <a:bodyPr rtlCol="0" anchor="ctr"/>
+            <a:lstStyle/>
+            <a:p>
+              <a:pPr algn="ctr"/>
+              <a:r>
+                <a:rPr lang="en-US" sz="2000" dirty="0">
+                  <a:solidFill>
+                    <a:schemeClr val="accent5">
+                      <a:lumMod val="50000"/>
+                    </a:schemeClr>
+                  </a:solidFill>
+                </a:rPr>
+                <a:t>It’s Easy!</a:t>
+              </a:r>
+            </a:p>
+          </p:txBody>
+        </p:sp>
+      </p:grpSp>
+      <p:sp>
+        <p:nvSpPr>
+          <p:cNvPr id="50" name="Rectangle: Rounded Corners 49">
+            <a:extLst>
+              <a:ext uri="{FF2B5EF4-FFF2-40B4-BE49-F238E27FC236}">
+                <a16:creationId xmlns:a16="http://schemas.microsoft.com/office/drawing/2014/main" id="{E93DF77B-E8D5-4704-B0CC-6B066B12D557}"/>
+              </a:ext>
+            </a:extLst>
+          </p:cNvPr>
+          <p:cNvSpPr/>
+          <p:nvPr/>
+        </p:nvSpPr>
+        <p:spPr>
+          <a:xfrm>
+            <a:off x="7629754" y="2649418"/>
+            <a:ext cx="3659777" cy="296968"/>
+          </a:xfrm>
+          <a:prstGeom prst="roundRect">
+            <a:avLst/>
+          </a:prstGeom>
+          <a:solidFill>
+            <a:schemeClr val="bg1"/>
+          </a:solidFill>
+          <a:ln>
+            <a:noFill/>
+          </a:ln>
+        </p:spPr>
+        <p:style>
+          <a:lnRef idx="2">
+            <a:schemeClr val="accent1">
+              <a:shade val="50000"/>
+            </a:schemeClr>
+          </a:lnRef>
+          <a:fillRef idx="1">
+            <a:schemeClr val="accent1"/>
+          </a:fillRef>
+          <a:effectRef idx="0">
+            <a:schemeClr val="accent1"/>
+          </a:effectRef>
+          <a:fontRef idx="minor">
+            <a:schemeClr val="lt1"/>
+          </a:fontRef>
+        </p:style>
+        <p:txBody>
+          <a:bodyPr rtlCol="0" anchor="ctr"/>
+          <a:lstStyle/>
+          <a:p>
+            <a:pPr algn="ctr"/>
+            <a:r>
+              <a:rPr lang="en-US" sz="1600" dirty="0">
+                <a:solidFill>
+                  <a:schemeClr val="accent5">
+                    <a:lumMod val="50000"/>
+                  </a:schemeClr>
+                </a:solidFill>
+              </a:rPr>
+              <a:t>Drop-in replacement for JDK types</a:t>
+            </a:r>
+          </a:p>
+        </p:txBody>
+      </p:sp>
+      <p:sp>
+        <p:nvSpPr>
+          <p:cNvPr id="51" name="Rectangle: Rounded Corners 50">
+            <a:extLst>
+              <a:ext uri="{FF2B5EF4-FFF2-40B4-BE49-F238E27FC236}">
+                <a16:creationId xmlns:a16="http://schemas.microsoft.com/office/drawing/2014/main" id="{2EC6B313-D048-4281-9629-870BE14E83A4}"/>
+              </a:ext>
+            </a:extLst>
+          </p:cNvPr>
+          <p:cNvSpPr/>
+          <p:nvPr/>
+        </p:nvSpPr>
+        <p:spPr>
+          <a:xfrm>
+            <a:off x="9146754" y="4252326"/>
+            <a:ext cx="2443689" cy="310647"/>
+          </a:xfrm>
+          <a:prstGeom prst="roundRect">
+            <a:avLst/>
+          </a:prstGeom>
+          <a:solidFill>
+            <a:schemeClr val="bg1"/>
+          </a:solidFill>
+          <a:ln>
+            <a:noFill/>
+          </a:ln>
+        </p:spPr>
+        <p:style>
+          <a:lnRef idx="2">
+            <a:schemeClr val="accent1">
+              <a:shade val="50000"/>
+            </a:schemeClr>
+          </a:lnRef>
+          <a:fillRef idx="1">
+            <a:schemeClr val="accent1"/>
+          </a:fillRef>
+          <a:effectRef idx="0">
+            <a:schemeClr val="accent1"/>
+          </a:effectRef>
+          <a:fontRef idx="minor">
+            <a:schemeClr val="lt1"/>
+          </a:fontRef>
+        </p:style>
+        <p:txBody>
+          <a:bodyPr rtlCol="0" anchor="ctr"/>
+          <a:lstStyle/>
+          <a:p>
+            <a:pPr algn="ctr"/>
+            <a:r>
+              <a:rPr lang="en-US" sz="1600" dirty="0">
+                <a:solidFill>
+                  <a:schemeClr val="accent5">
+                    <a:lumMod val="50000"/>
+                  </a:schemeClr>
+                </a:solidFill>
+              </a:rPr>
+              <a:t>Intuitive humane APIs</a:t>
+            </a:r>
+          </a:p>
+        </p:txBody>
+      </p:sp>
+      <p:cxnSp>
+        <p:nvCxnSpPr>
+          <p:cNvPr id="52" name="Straight Connector 51">
+            <a:extLst>
+              <a:ext uri="{FF2B5EF4-FFF2-40B4-BE49-F238E27FC236}">
+                <a16:creationId xmlns:a16="http://schemas.microsoft.com/office/drawing/2014/main" id="{9B322B75-02DC-46CE-BD9C-9B025ED16272}"/>
+              </a:ext>
+            </a:extLst>
+          </p:cNvPr>
+          <p:cNvCxnSpPr>
+            <a:cxnSpLocks/>
+          </p:cNvCxnSpPr>
+          <p:nvPr/>
+        </p:nvCxnSpPr>
+        <p:spPr>
+          <a:xfrm>
+            <a:off x="5614334" y="5229233"/>
+            <a:ext cx="643275" cy="552760"/>
+          </a:xfrm>
+          <a:prstGeom prst="line">
+            <a:avLst/>
+          </a:prstGeom>
+          <a:ln w="28575">
+            <a:solidFill>
+              <a:schemeClr val="accent5">
+                <a:lumMod val="75000"/>
+              </a:schemeClr>
+            </a:solidFill>
+          </a:ln>
+        </p:spPr>
+        <p:style>
+          <a:lnRef idx="1">
+            <a:schemeClr val="accent1"/>
+          </a:lnRef>
+          <a:fillRef idx="0">
+            <a:schemeClr val="accent1"/>
+          </a:fillRef>
+          <a:effectRef idx="0">
+            <a:schemeClr val="accent1"/>
+          </a:effectRef>
+          <a:fontRef idx="minor">
+            <a:schemeClr val="tx1"/>
+          </a:fontRef>
+        </p:style>
+      </p:cxnSp>
+      <p:cxnSp>
+        <p:nvCxnSpPr>
+          <p:cNvPr id="53" name="Straight Connector 52">
+            <a:extLst>
+              <a:ext uri="{FF2B5EF4-FFF2-40B4-BE49-F238E27FC236}">
+                <a16:creationId xmlns:a16="http://schemas.microsoft.com/office/drawing/2014/main" id="{B16FCD28-B7DE-4C87-9788-4475E74F7A32}"/>
+              </a:ext>
+            </a:extLst>
+          </p:cNvPr>
+          <p:cNvCxnSpPr>
+            <a:cxnSpLocks/>
+          </p:cNvCxnSpPr>
+          <p:nvPr/>
+        </p:nvCxnSpPr>
+        <p:spPr>
+          <a:xfrm flipH="1">
+            <a:off x="4676928" y="5290588"/>
+            <a:ext cx="233043" cy="721409"/>
+          </a:xfrm>
+          <a:prstGeom prst="line">
+            <a:avLst/>
+          </a:prstGeom>
+          <a:ln w="28575">
+            <a:solidFill>
+              <a:schemeClr val="accent5">
+                <a:lumMod val="75000"/>
+              </a:schemeClr>
+            </a:solidFill>
+          </a:ln>
+        </p:spPr>
+        <p:style>
+          <a:lnRef idx="1">
+            <a:schemeClr val="accent1"/>
+          </a:lnRef>
+          <a:fillRef idx="0">
+            <a:schemeClr val="accent1"/>
+          </a:fillRef>
+          <a:effectRef idx="0">
+            <a:schemeClr val="accent1"/>
+          </a:effectRef>
+          <a:fontRef idx="minor">
+            <a:schemeClr val="tx1"/>
+          </a:fontRef>
+        </p:style>
+      </p:cxnSp>
+      <p:grpSp>
+        <p:nvGrpSpPr>
+          <p:cNvPr id="64" name="Group 63">
+            <a:extLst>
+              <a:ext uri="{FF2B5EF4-FFF2-40B4-BE49-F238E27FC236}">
+                <a16:creationId xmlns:a16="http://schemas.microsoft.com/office/drawing/2014/main" id="{85D17B82-B3D5-4E7D-B9EE-0FF21EB03D04}"/>
+              </a:ext>
+            </a:extLst>
+          </p:cNvPr>
+          <p:cNvGrpSpPr/>
+          <p:nvPr/>
+        </p:nvGrpSpPr>
+        <p:grpSpPr>
+          <a:xfrm>
+            <a:off x="2073499" y="1292268"/>
+            <a:ext cx="2134673" cy="357852"/>
+            <a:chOff x="2073499" y="1292268"/>
+            <a:chExt cx="2134673" cy="357852"/>
+          </a:xfrm>
+        </p:grpSpPr>
+        <p:sp>
+          <p:nvSpPr>
+            <p:cNvPr id="61" name="Oval 60">
+              <a:extLst>
+                <a:ext uri="{FF2B5EF4-FFF2-40B4-BE49-F238E27FC236}">
+                  <a16:creationId xmlns:a16="http://schemas.microsoft.com/office/drawing/2014/main" id="{B0F5BA2C-9D02-4DA9-8E0E-9373CC2402DA}"/>
+                </a:ext>
+              </a:extLst>
+            </p:cNvPr>
+            <p:cNvSpPr/>
+            <p:nvPr/>
+          </p:nvSpPr>
+          <p:spPr>
+            <a:xfrm>
+              <a:off x="3067637" y="1391225"/>
+              <a:ext cx="146396" cy="146396"/>
+            </a:xfrm>
+            <a:prstGeom prst="ellipse">
+              <a:avLst/>
+            </a:prstGeom>
+            <a:solidFill>
+              <a:schemeClr val="bg1"/>
+            </a:solidFill>
+            <a:ln>
+              <a:noFill/>
+            </a:ln>
+          </p:spPr>
+          <p:style>
+            <a:lnRef idx="2">
+              <a:schemeClr val="accent1">
+                <a:shade val="50000"/>
+              </a:schemeClr>
+            </a:lnRef>
+            <a:fillRef idx="1">
+              <a:schemeClr val="accent1"/>
+            </a:fillRef>
+            <a:effectRef idx="0">
+              <a:schemeClr val="accent1"/>
+            </a:effectRef>
+            <a:fontRef idx="minor">
+              <a:schemeClr val="lt1"/>
+            </a:fontRef>
+          </p:style>
+          <p:txBody>
+            <a:bodyPr rtlCol="0" anchor="ctr"/>
+            <a:lstStyle/>
+            <a:p>
+              <a:pPr algn="ctr"/>
+              <a:endParaRPr lang="en-US"/>
+            </a:p>
+          </p:txBody>
+        </p:sp>
+        <p:sp>
+          <p:nvSpPr>
+            <p:cNvPr id="36" name="Rectangle: Rounded Corners 35">
+              <a:extLst>
+                <a:ext uri="{FF2B5EF4-FFF2-40B4-BE49-F238E27FC236}">
+                  <a16:creationId xmlns:a16="http://schemas.microsoft.com/office/drawing/2014/main" id="{677DD06C-5DCA-4668-9AE7-D56B2C8C9711}"/>
+                </a:ext>
+              </a:extLst>
+            </p:cNvPr>
+            <p:cNvSpPr/>
+            <p:nvPr/>
+          </p:nvSpPr>
+          <p:spPr>
+            <a:xfrm>
+              <a:off x="2073499" y="1292268"/>
+              <a:ext cx="2134673" cy="357852"/>
+            </a:xfrm>
+            <a:prstGeom prst="roundRect">
+              <a:avLst/>
+            </a:prstGeom>
+            <a:solidFill>
+              <a:schemeClr val="bg1"/>
+            </a:solidFill>
+            <a:ln>
+              <a:noFill/>
+            </a:ln>
+          </p:spPr>
+          <p:style>
+            <a:lnRef idx="2">
+              <a:schemeClr val="accent1">
+                <a:shade val="50000"/>
+              </a:schemeClr>
+            </a:lnRef>
+            <a:fillRef idx="1">
+              <a:schemeClr val="accent1"/>
+            </a:fillRef>
+            <a:effectRef idx="0">
+              <a:schemeClr val="accent1"/>
+            </a:effectRef>
+            <a:fontRef idx="minor">
+              <a:schemeClr val="lt1"/>
+            </a:fontRef>
+          </p:style>
+          <p:txBody>
+            <a:bodyPr rtlCol="0" anchor="ctr"/>
+            <a:lstStyle/>
+            <a:p>
+              <a:pPr algn="ctr"/>
+              <a:r>
+                <a:rPr lang="en-US" sz="1600" dirty="0">
+                  <a:solidFill>
+                    <a:schemeClr val="accent5">
+                      <a:lumMod val="50000"/>
+                    </a:schemeClr>
+                  </a:solidFill>
+                </a:rPr>
+                <a:t>Lazy or Eager</a:t>
+              </a:r>
+            </a:p>
+          </p:txBody>
+        </p:sp>
+      </p:grpSp>
+      <p:grpSp>
+        <p:nvGrpSpPr>
+          <p:cNvPr id="69" name="Group 68">
+            <a:extLst>
+              <a:ext uri="{FF2B5EF4-FFF2-40B4-BE49-F238E27FC236}">
+                <a16:creationId xmlns:a16="http://schemas.microsoft.com/office/drawing/2014/main" id="{245856BD-8054-402E-9177-3543718FDD61}"/>
+              </a:ext>
+            </a:extLst>
+          </p:cNvPr>
+          <p:cNvGrpSpPr/>
+          <p:nvPr/>
+        </p:nvGrpSpPr>
+        <p:grpSpPr>
+          <a:xfrm>
+            <a:off x="5642637" y="1342366"/>
+            <a:ext cx="1398368" cy="357852"/>
+            <a:chOff x="5642637" y="1342366"/>
+            <a:chExt cx="1398368" cy="357852"/>
+          </a:xfrm>
+        </p:grpSpPr>
+        <p:sp>
+          <p:nvSpPr>
+            <p:cNvPr id="62" name="Oval 61">
+              <a:extLst>
+                <a:ext uri="{FF2B5EF4-FFF2-40B4-BE49-F238E27FC236}">
+                  <a16:creationId xmlns:a16="http://schemas.microsoft.com/office/drawing/2014/main" id="{26F9C284-3D46-47CE-8536-606AE52A2762}"/>
+                </a:ext>
+              </a:extLst>
+            </p:cNvPr>
+            <p:cNvSpPr/>
+            <p:nvPr/>
+          </p:nvSpPr>
+          <p:spPr>
+            <a:xfrm>
+              <a:off x="6266711" y="1445827"/>
+              <a:ext cx="95900" cy="146396"/>
+            </a:xfrm>
+            <a:prstGeom prst="ellipse">
+              <a:avLst/>
+            </a:prstGeom>
+            <a:solidFill>
+              <a:schemeClr val="bg1"/>
+            </a:solidFill>
+            <a:ln>
+              <a:noFill/>
+            </a:ln>
+          </p:spPr>
+          <p:style>
+            <a:lnRef idx="2">
+              <a:schemeClr val="accent1">
+                <a:shade val="50000"/>
+              </a:schemeClr>
+            </a:lnRef>
+            <a:fillRef idx="1">
+              <a:schemeClr val="accent1"/>
+            </a:fillRef>
+            <a:effectRef idx="0">
+              <a:schemeClr val="accent1"/>
+            </a:effectRef>
+            <a:fontRef idx="minor">
+              <a:schemeClr val="lt1"/>
+            </a:fontRef>
+          </p:style>
+          <p:txBody>
+            <a:bodyPr rtlCol="0" anchor="ctr"/>
+            <a:lstStyle/>
+            <a:p>
+              <a:pPr algn="ctr"/>
+              <a:endParaRPr lang="en-US"/>
+            </a:p>
+          </p:txBody>
+        </p:sp>
+        <p:sp>
+          <p:nvSpPr>
+            <p:cNvPr id="37" name="Rectangle: Rounded Corners 36">
+              <a:extLst>
+                <a:ext uri="{FF2B5EF4-FFF2-40B4-BE49-F238E27FC236}">
+                  <a16:creationId xmlns:a16="http://schemas.microsoft.com/office/drawing/2014/main" id="{C48FFFFE-2F68-4F31-8AC0-433C870D8152}"/>
+                </a:ext>
+              </a:extLst>
+            </p:cNvPr>
+            <p:cNvSpPr/>
+            <p:nvPr/>
+          </p:nvSpPr>
+          <p:spPr>
+            <a:xfrm>
+              <a:off x="5642637" y="1342366"/>
+              <a:ext cx="1398368" cy="357852"/>
+            </a:xfrm>
+            <a:prstGeom prst="roundRect">
+              <a:avLst/>
+            </a:prstGeom>
+            <a:solidFill>
+              <a:schemeClr val="bg1"/>
+            </a:solidFill>
+            <a:ln>
+              <a:noFill/>
+            </a:ln>
+          </p:spPr>
+          <p:style>
+            <a:lnRef idx="2">
+              <a:schemeClr val="accent1">
+                <a:shade val="50000"/>
+              </a:schemeClr>
+            </a:lnRef>
+            <a:fillRef idx="1">
+              <a:schemeClr val="accent1"/>
+            </a:fillRef>
+            <a:effectRef idx="0">
+              <a:schemeClr val="accent1"/>
+            </a:effectRef>
+            <a:fontRef idx="minor">
+              <a:schemeClr val="lt1"/>
+            </a:fontRef>
+          </p:style>
+          <p:txBody>
+            <a:bodyPr rtlCol="0" anchor="ctr"/>
+            <a:lstStyle/>
+            <a:p>
+              <a:pPr algn="ctr"/>
+              <a:r>
+                <a:rPr lang="en-US" sz="1600" dirty="0" err="1">
+                  <a:solidFill>
+                    <a:schemeClr val="accent5">
+                      <a:lumMod val="50000"/>
+                    </a:schemeClr>
+                  </a:solidFill>
+                </a:rPr>
+                <a:t>TestUtils</a:t>
+              </a:r>
+              <a:endParaRPr lang="en-US" sz="1600" dirty="0">
+                <a:solidFill>
+                  <a:schemeClr val="accent5">
+                    <a:lumMod val="50000"/>
+                  </a:schemeClr>
+                </a:solidFill>
+              </a:endParaRPr>
+            </a:p>
+          </p:txBody>
+        </p:sp>
+      </p:grpSp>
     </p:spTree>
     <p:extLst>
       <p:ext uri="{BB962C8B-B14F-4D97-AF65-F5344CB8AC3E}">
@@ -13129,10 +12940,10 @@
       </p:grpSpPr>
       <p:sp>
         <p:nvSpPr>
-          <p:cNvPr id="4" name="Title 3">
-            <a:extLst>
-              <a:ext uri="{FF2B5EF4-FFF2-40B4-BE49-F238E27FC236}">
-                <a16:creationId xmlns:a16="http://schemas.microsoft.com/office/drawing/2014/main" id="{0391B244-ADF8-4CC5-9581-25C374AADC2A}"/>
+          <p:cNvPr id="2" name="Title 1">
+            <a:extLst>
+              <a:ext uri="{FF2B5EF4-FFF2-40B4-BE49-F238E27FC236}">
+                <a16:creationId xmlns:a16="http://schemas.microsoft.com/office/drawing/2014/main" id="{6EC97955-5F81-4961-86D0-519879FEA5AA}"/>
               </a:ext>
             </a:extLst>
           </p:cNvPr>
@@ -13150,33 +12961,8 @@
           <a:p>
             <a:r>
               <a:rPr lang="en-US" dirty="0"/>
-              <a:t>Appendix</a:t>
+              <a:t>JMH Benchmark Results</a:t>
             </a:r>
-          </a:p>
-        </p:txBody>
-      </p:sp>
-      <p:sp>
-        <p:nvSpPr>
-          <p:cNvPr id="5" name="Text Placeholder 4">
-            <a:extLst>
-              <a:ext uri="{FF2B5EF4-FFF2-40B4-BE49-F238E27FC236}">
-                <a16:creationId xmlns:a16="http://schemas.microsoft.com/office/drawing/2014/main" id="{DAEBAAAE-DF02-406D-B00B-156F95292CAC}"/>
-              </a:ext>
-            </a:extLst>
-          </p:cNvPr>
-          <p:cNvSpPr>
-            <a:spLocks noGrp="1"/>
-          </p:cNvSpPr>
-          <p:nvPr>
-            <p:ph type="body" idx="1"/>
-          </p:nvPr>
-        </p:nvSpPr>
-        <p:spPr/>
-        <p:txBody>
-          <a:bodyPr/>
-          <a:lstStyle/>
-          <a:p>
-            <a:endParaRPr lang="en-US" dirty="0"/>
           </a:p>
         </p:txBody>
       </p:sp>
@@ -13185,7 +12971,7 @@
           <p:cNvPr id="3" name="Slide Number Placeholder 2">
             <a:extLst>
               <a:ext uri="{FF2B5EF4-FFF2-40B4-BE49-F238E27FC236}">
-                <a16:creationId xmlns:a16="http://schemas.microsoft.com/office/drawing/2014/main" id="{1EC64AA7-7F15-4582-B564-7A8C86EB679B}"/>
+                <a16:creationId xmlns:a16="http://schemas.microsoft.com/office/drawing/2014/main" id="{9548E156-819E-4EED-9B8B-D205F8B45A0B}"/>
               </a:ext>
             </a:extLst>
           </p:cNvPr>
@@ -13212,7 +12998,7 @@
     </p:spTree>
     <p:extLst>
       <p:ext uri="{BB962C8B-B14F-4D97-AF65-F5344CB8AC3E}">
-        <p14:creationId xmlns:p14="http://schemas.microsoft.com/office/powerpoint/2010/main" val="600932898"/>
+        <p14:creationId xmlns:p14="http://schemas.microsoft.com/office/powerpoint/2010/main" val="619593670"/>
       </p:ext>
     </p:extLst>
   </p:cSld>
@@ -13244,7 +13030,7 @@
           <p:cNvPr id="2" name="Title 1">
             <a:extLst>
               <a:ext uri="{FF2B5EF4-FFF2-40B4-BE49-F238E27FC236}">
-                <a16:creationId xmlns:a16="http://schemas.microsoft.com/office/drawing/2014/main" id="{BAEBAA91-1A36-496A-9F00-4A0BAD5847ED}"/>
+                <a16:creationId xmlns:a16="http://schemas.microsoft.com/office/drawing/2014/main" id="{04D96E18-4D57-4F56-8D07-909F93855EEA}"/>
               </a:ext>
             </a:extLst>
           </p:cNvPr>
@@ -13262,7 +13048,7 @@
           <a:p>
             <a:r>
               <a:rPr lang="en-US" dirty="0"/>
-              <a:t>Example: Find Corners</a:t>
+              <a:t>Memory Usage Comparison</a:t>
             </a:r>
           </a:p>
         </p:txBody>
@@ -13272,7 +13058,7 @@
           <p:cNvPr id="3" name="Slide Number Placeholder 2">
             <a:extLst>
               <a:ext uri="{FF2B5EF4-FFF2-40B4-BE49-F238E27FC236}">
-                <a16:creationId xmlns:a16="http://schemas.microsoft.com/office/drawing/2014/main" id="{02FCC449-9E26-465D-8E24-94B19D17EBD4}"/>
+                <a16:creationId xmlns:a16="http://schemas.microsoft.com/office/drawing/2014/main" id="{885CA2D9-69D5-40FF-B640-6B98926BDD62}"/>
               </a:ext>
             </a:extLst>
           </p:cNvPr>
@@ -13299,7 +13085,7 @@
     </p:spTree>
     <p:extLst>
       <p:ext uri="{BB962C8B-B14F-4D97-AF65-F5344CB8AC3E}">
-        <p14:creationId xmlns:p14="http://schemas.microsoft.com/office/powerpoint/2010/main" val="222843062"/>
+        <p14:creationId xmlns:p14="http://schemas.microsoft.com/office/powerpoint/2010/main" val="3262160996"/>
       </p:ext>
     </p:extLst>
   </p:cSld>

</xml_diff>

<commit_message>
Updated the presentation, added factory slide
Signed-off-by: vmzakharov <zakharov.vladimir.m@gmail.com>
</commit_message>
<xml_diff>
--- a/docs/RefactorToEcIntro.pptx
+++ b/docs/RefactorToEcIntro.pptx
@@ -5,18 +5,19 @@
     <p:sldMasterId id="2147483648" r:id="rId1"/>
   </p:sldMasterIdLst>
   <p:notesMasterIdLst>
-    <p:notesMasterId r:id="rId11"/>
+    <p:notesMasterId r:id="rId12"/>
   </p:notesMasterIdLst>
   <p:sldIdLst>
     <p:sldId id="256" r:id="rId2"/>
     <p:sldId id="257" r:id="rId3"/>
     <p:sldId id="259" r:id="rId4"/>
-    <p:sldId id="260" r:id="rId5"/>
-    <p:sldId id="263" r:id="rId6"/>
-    <p:sldId id="264" r:id="rId7"/>
-    <p:sldId id="265" r:id="rId8"/>
-    <p:sldId id="266" r:id="rId9"/>
-    <p:sldId id="267" r:id="rId10"/>
+    <p:sldId id="269" r:id="rId5"/>
+    <p:sldId id="260" r:id="rId6"/>
+    <p:sldId id="263" r:id="rId7"/>
+    <p:sldId id="264" r:id="rId8"/>
+    <p:sldId id="265" r:id="rId9"/>
+    <p:sldId id="266" r:id="rId10"/>
+    <p:sldId id="267" r:id="rId11"/>
   </p:sldIdLst>
   <p:sldSz cx="12192000" cy="6858000"/>
   <p:notesSz cx="6858000" cy="9144000"/>
@@ -209,7 +210,7 @@
           <a:p>
             <a:fld id="{0A3ECF1A-C506-483F-9BD5-3A37EAB21BED}" type="datetimeFigureOut">
               <a:rPr lang="en-US" smtClean="0"/>
-              <a:t>1/4/2018</a:t>
+              <a:t>1/8/2018</a:t>
             </a:fld>
             <a:endParaRPr lang="en-US"/>
           </a:p>
@@ -476,6 +477,90 @@
 </p:notesMaster>
 </file>
 
+<file path=ppt/notesSlides/notesSlide1.xml><?xml version="1.0" encoding="utf-8"?>
+<p:notes xmlns:a="http://schemas.openxmlformats.org/drawingml/2006/main" xmlns:r="http://schemas.openxmlformats.org/officeDocument/2006/relationships" xmlns:p="http://schemas.openxmlformats.org/presentationml/2006/main">
+  <p:cSld>
+    <p:spTree>
+      <p:nvGrpSpPr>
+        <p:cNvPr id="1" name=""/>
+        <p:cNvGrpSpPr/>
+        <p:nvPr/>
+      </p:nvGrpSpPr>
+      <p:grpSpPr>
+        <a:xfrm>
+          <a:off x="0" y="0"/>
+          <a:ext cx="0" cy="0"/>
+          <a:chOff x="0" y="0"/>
+          <a:chExt cx="0" cy="0"/>
+        </a:xfrm>
+      </p:grpSpPr>
+      <p:sp>
+        <p:nvSpPr>
+          <p:cNvPr id="2" name="Slide Image Placeholder 1"/>
+          <p:cNvSpPr>
+            <a:spLocks noGrp="1" noRot="1" noChangeAspect="1"/>
+          </p:cNvSpPr>
+          <p:nvPr>
+            <p:ph type="sldImg"/>
+          </p:nvPr>
+        </p:nvSpPr>
+        <p:spPr/>
+      </p:sp>
+      <p:sp>
+        <p:nvSpPr>
+          <p:cNvPr id="3" name="Notes Placeholder 2"/>
+          <p:cNvSpPr>
+            <a:spLocks noGrp="1"/>
+          </p:cNvSpPr>
+          <p:nvPr>
+            <p:ph type="body" idx="1"/>
+          </p:nvPr>
+        </p:nvSpPr>
+        <p:spPr/>
+        <p:txBody>
+          <a:bodyPr/>
+          <a:lstStyle/>
+          <a:p>
+            <a:endParaRPr lang="en-US" dirty="0"/>
+          </a:p>
+        </p:txBody>
+      </p:sp>
+      <p:sp>
+        <p:nvSpPr>
+          <p:cNvPr id="4" name="Slide Number Placeholder 3"/>
+          <p:cNvSpPr>
+            <a:spLocks noGrp="1"/>
+          </p:cNvSpPr>
+          <p:nvPr>
+            <p:ph type="sldNum" sz="quarter" idx="10"/>
+          </p:nvPr>
+        </p:nvSpPr>
+        <p:spPr/>
+        <p:txBody>
+          <a:bodyPr/>
+          <a:lstStyle/>
+          <a:p>
+            <a:fld id="{BC990887-F08A-441E-8BED-BD7C9F1329BD}" type="slidenum">
+              <a:rPr lang="en-US" smtClean="0"/>
+              <a:t>5</a:t>
+            </a:fld>
+            <a:endParaRPr lang="en-US"/>
+          </a:p>
+        </p:txBody>
+      </p:sp>
+    </p:spTree>
+    <p:extLst>
+      <p:ext uri="{BB962C8B-B14F-4D97-AF65-F5344CB8AC3E}">
+        <p14:creationId xmlns:p14="http://schemas.microsoft.com/office/powerpoint/2010/main" val="917949724"/>
+      </p:ext>
+    </p:extLst>
+  </p:cSld>
+  <p:clrMapOvr>
+    <a:masterClrMapping/>
+  </p:clrMapOvr>
+</p:notes>
+</file>
+
 <file path=ppt/slideLayouts/slideLayout1.xml><?xml version="1.0" encoding="utf-8"?>
 <p:sldLayout xmlns:a="http://schemas.openxmlformats.org/drawingml/2006/main" xmlns:r="http://schemas.openxmlformats.org/officeDocument/2006/relationships" xmlns:p="http://schemas.openxmlformats.org/presentationml/2006/main" type="title" preserve="1">
   <p:cSld name="Title Slide">
@@ -623,7 +708,7 @@
           <a:p>
             <a:fld id="{B01E6D21-A8A9-47BB-AAF4-BA66E1D4CADC}" type="datetime1">
               <a:rPr lang="en-US" smtClean="0"/>
-              <a:t>1/4/2018</a:t>
+              <a:t>1/8/2018</a:t>
             </a:fld>
             <a:endParaRPr lang="en-US"/>
           </a:p>
@@ -821,7 +906,7 @@
           <a:p>
             <a:fld id="{ED35BEB7-6A69-46B0-87F9-C824B47AE71E}" type="datetime1">
               <a:rPr lang="en-US" smtClean="0"/>
-              <a:t>1/4/2018</a:t>
+              <a:t>1/8/2018</a:t>
             </a:fld>
             <a:endParaRPr lang="en-US"/>
           </a:p>
@@ -1029,7 +1114,7 @@
           <a:p>
             <a:fld id="{EC05F448-01D4-43D9-A78F-C558AA092412}" type="datetime1">
               <a:rPr lang="en-US" smtClean="0"/>
-              <a:t>1/4/2018</a:t>
+              <a:t>1/8/2018</a:t>
             </a:fld>
             <a:endParaRPr lang="en-US"/>
           </a:p>
@@ -1227,7 +1312,7 @@
           <a:p>
             <a:fld id="{C59299DC-A265-4E49-B17A-DE0D5C00C9AB}" type="datetime1">
               <a:rPr lang="en-US" smtClean="0"/>
-              <a:t>1/4/2018</a:t>
+              <a:t>1/8/2018</a:t>
             </a:fld>
             <a:endParaRPr lang="en-US"/>
           </a:p>
@@ -1545,7 +1630,7 @@
           <a:p>
             <a:fld id="{204EBBBC-15A7-4FCE-B6B7-3947C545F524}" type="datetime1">
               <a:rPr lang="en-US" smtClean="0"/>
-              <a:t>1/4/2018</a:t>
+              <a:t>1/8/2018</a:t>
             </a:fld>
             <a:endParaRPr lang="en-US"/>
           </a:p>
@@ -1810,7 +1895,7 @@
           <a:p>
             <a:fld id="{88496FF8-6CE1-4C50-9FF1-F4B619FD13C1}" type="datetime1">
               <a:rPr lang="en-US" smtClean="0"/>
-              <a:t>1/4/2018</a:t>
+              <a:t>1/8/2018</a:t>
             </a:fld>
             <a:endParaRPr lang="en-US"/>
           </a:p>
@@ -2265,7 +2350,7 @@
           <a:p>
             <a:fld id="{7A870CA9-64F7-4D04-A791-C33F2DA5696A}" type="datetime1">
               <a:rPr lang="en-US" smtClean="0"/>
-              <a:t>1/4/2018</a:t>
+              <a:t>1/8/2018</a:t>
             </a:fld>
             <a:endParaRPr lang="en-US"/>
           </a:p>
@@ -2449,7 +2534,7 @@
           <a:p>
             <a:fld id="{036E2797-557C-4D30-BD50-A93066FAC4DE}" type="datetime1">
               <a:rPr lang="en-US" smtClean="0"/>
-              <a:t>1/4/2018</a:t>
+              <a:t>1/8/2018</a:t>
             </a:fld>
             <a:endParaRPr lang="en-US"/>
           </a:p>
@@ -2605,7 +2690,7 @@
           <a:p>
             <a:fld id="{6B8338EF-DB38-47F2-AC4F-ED460855DDBE}" type="datetime1">
               <a:rPr lang="en-US" smtClean="0"/>
-              <a:t>1/4/2018</a:t>
+              <a:t>1/8/2018</a:t>
             </a:fld>
             <a:endParaRPr lang="en-US"/>
           </a:p>
@@ -2916,7 +3001,7 @@
           <a:p>
             <a:fld id="{5A4D1A4B-CD09-4B45-8956-0726DCFE9F61}" type="datetime1">
               <a:rPr lang="en-US" smtClean="0"/>
-              <a:t>1/4/2018</a:t>
+              <a:t>1/8/2018</a:t>
             </a:fld>
             <a:endParaRPr lang="en-US"/>
           </a:p>
@@ -3204,7 +3289,7 @@
           <a:p>
             <a:fld id="{4F3145A3-6131-4271-9039-944CD844150A}" type="datetime1">
               <a:rPr lang="en-US" smtClean="0"/>
-              <a:t>1/4/2018</a:t>
+              <a:t>1/8/2018</a:t>
             </a:fld>
             <a:endParaRPr lang="en-US"/>
           </a:p>
@@ -3445,7 +3530,7 @@
           <a:p>
             <a:fld id="{F3DFC797-DE7B-4026-9213-8D54CB76373D}" type="datetime1">
               <a:rPr lang="en-US" smtClean="0"/>
-              <a:t>1/4/2018</a:t>
+              <a:t>1/8/2018</a:t>
             </a:fld>
             <a:endParaRPr lang="en-US"/>
           </a:p>
@@ -3921,7 +4006,7 @@
           </a:bodyPr>
           <a:lstStyle/>
           <a:p>
-            <a:endParaRPr lang="ru-RU" dirty="0">
+            <a:endParaRPr lang="ru-RU" sz="3200" dirty="0">
               <a:solidFill>
                 <a:schemeClr val="bg1">
                   <a:lumMod val="50000"/>
@@ -3931,14 +4016,33 @@
           </a:p>
           <a:p>
             <a:r>
-              <a:rPr lang="en-US" dirty="0">
+              <a:rPr lang="en-US" sz="3200" dirty="0">
                 <a:solidFill>
                   <a:schemeClr val="bg1">
                     <a:lumMod val="50000"/>
                   </a:schemeClr>
                 </a:solidFill>
               </a:rPr>
-              <a:t>Making Your Java Streams Leaner, Meaner, and Cleaner</a:t>
+              <a:t>Making Your Java Streams</a:t>
+            </a:r>
+            <a:br>
+              <a:rPr lang="en-US" sz="3200" dirty="0">
+                <a:solidFill>
+                  <a:schemeClr val="bg1">
+                    <a:lumMod val="50000"/>
+                  </a:schemeClr>
+                </a:solidFill>
+              </a:rPr>
+            </a:br>
+            <a:r>
+              <a:rPr lang="en-US" sz="3200" dirty="0">
+                <a:solidFill>
+                  <a:schemeClr val="bg1">
+                    <a:lumMod val="50000"/>
+                  </a:schemeClr>
+                </a:solidFill>
+              </a:rPr>
+              <a:t>Leaner, Meaner, and Cleaner</a:t>
             </a:r>
           </a:p>
         </p:txBody>
@@ -3947,6 +4051,93 @@
     <p:extLst>
       <p:ext uri="{BB962C8B-B14F-4D97-AF65-F5344CB8AC3E}">
         <p14:creationId xmlns:p14="http://schemas.microsoft.com/office/powerpoint/2010/main" val="174461652"/>
+      </p:ext>
+    </p:extLst>
+  </p:cSld>
+  <p:clrMapOvr>
+    <a:masterClrMapping/>
+  </p:clrMapOvr>
+</p:sld>
+</file>
+
+<file path=ppt/slides/slide10.xml><?xml version="1.0" encoding="utf-8"?>
+<p:sld xmlns:a="http://schemas.openxmlformats.org/drawingml/2006/main" xmlns:r="http://schemas.openxmlformats.org/officeDocument/2006/relationships" xmlns:p="http://schemas.openxmlformats.org/presentationml/2006/main">
+  <p:cSld>
+    <p:spTree>
+      <p:nvGrpSpPr>
+        <p:cNvPr id="1" name=""/>
+        <p:cNvGrpSpPr/>
+        <p:nvPr/>
+      </p:nvGrpSpPr>
+      <p:grpSpPr>
+        <a:xfrm>
+          <a:off x="0" y="0"/>
+          <a:ext cx="0" cy="0"/>
+          <a:chOff x="0" y="0"/>
+          <a:chExt cx="0" cy="0"/>
+        </a:xfrm>
+      </p:grpSpPr>
+      <p:sp>
+        <p:nvSpPr>
+          <p:cNvPr id="2" name="Title 1">
+            <a:extLst>
+              <a:ext uri="{FF2B5EF4-FFF2-40B4-BE49-F238E27FC236}">
+                <a16:creationId xmlns:a16="http://schemas.microsoft.com/office/drawing/2014/main" id="{04D96E18-4D57-4F56-8D07-909F93855EEA}"/>
+              </a:ext>
+            </a:extLst>
+          </p:cNvPr>
+          <p:cNvSpPr>
+            <a:spLocks noGrp="1"/>
+          </p:cNvSpPr>
+          <p:nvPr>
+            <p:ph type="title"/>
+          </p:nvPr>
+        </p:nvSpPr>
+        <p:spPr/>
+        <p:txBody>
+          <a:bodyPr/>
+          <a:lstStyle/>
+          <a:p>
+            <a:r>
+              <a:rPr lang="en-US" dirty="0"/>
+              <a:t>Memory Usage Comparison</a:t>
+            </a:r>
+          </a:p>
+        </p:txBody>
+      </p:sp>
+      <p:sp>
+        <p:nvSpPr>
+          <p:cNvPr id="3" name="Slide Number Placeholder 2">
+            <a:extLst>
+              <a:ext uri="{FF2B5EF4-FFF2-40B4-BE49-F238E27FC236}">
+                <a16:creationId xmlns:a16="http://schemas.microsoft.com/office/drawing/2014/main" id="{885CA2D9-69D5-40FF-B640-6B98926BDD62}"/>
+              </a:ext>
+            </a:extLst>
+          </p:cNvPr>
+          <p:cNvSpPr>
+            <a:spLocks noGrp="1"/>
+          </p:cNvSpPr>
+          <p:nvPr>
+            <p:ph type="sldNum" sz="quarter" idx="12"/>
+          </p:nvPr>
+        </p:nvSpPr>
+        <p:spPr/>
+        <p:txBody>
+          <a:bodyPr/>
+          <a:lstStyle/>
+          <a:p>
+            <a:fld id="{EF57339A-E29B-45C7-A4AA-9F67BACDCD80}" type="slidenum">
+              <a:rPr lang="en-US" smtClean="0"/>
+              <a:t>10</a:t>
+            </a:fld>
+            <a:endParaRPr lang="en-US"/>
+          </a:p>
+        </p:txBody>
+      </p:sp>
+    </p:spTree>
+    <p:extLst>
+      <p:ext uri="{BB962C8B-B14F-4D97-AF65-F5344CB8AC3E}">
+        <p14:creationId xmlns:p14="http://schemas.microsoft.com/office/powerpoint/2010/main" val="3262160996"/>
       </p:ext>
     </p:extLst>
   </p:cSld>
@@ -4168,7 +4359,7 @@
             </a:pPr>
             <a:r>
               <a:rPr lang="en-US" dirty="0"/>
-              <a:t>Eclipse Collections </a:t>
+              <a:t>Eclipse Collections is </a:t>
             </a:r>
             <a:r>
               <a:rPr lang="en-US" dirty="0">
@@ -4317,13 +4508,8 @@
           <a:p>
             <a:r>
               <a:rPr lang="en-US" dirty="0"/>
-              <a:t>Build Any Types </a:t>
+              <a:t>Any Types You Need</a:t>
             </a:r>
-            <a:r>
-              <a:rPr lang="en-US"/>
-              <a:t>You Need</a:t>
-            </a:r>
-            <a:endParaRPr lang="en-US" dirty="0"/>
           </a:p>
         </p:txBody>
       </p:sp>
@@ -8122,6 +8308,1637 @@
       </p:grpSpPr>
       <p:sp>
         <p:nvSpPr>
+          <p:cNvPr id="30" name="Oval 29">
+            <a:extLst>
+              <a:ext uri="{FF2B5EF4-FFF2-40B4-BE49-F238E27FC236}">
+                <a16:creationId xmlns:a16="http://schemas.microsoft.com/office/drawing/2014/main" id="{188E3C94-C167-4C69-8650-2223D7382AF7}"/>
+              </a:ext>
+            </a:extLst>
+          </p:cNvPr>
+          <p:cNvSpPr/>
+          <p:nvPr/>
+        </p:nvSpPr>
+        <p:spPr>
+          <a:xfrm>
+            <a:off x="1184564" y="4800600"/>
+            <a:ext cx="9822872" cy="1822856"/>
+          </a:xfrm>
+          <a:prstGeom prst="ellipse">
+            <a:avLst/>
+          </a:prstGeom>
+          <a:solidFill>
+            <a:schemeClr val="bg1">
+              <a:lumMod val="95000"/>
+            </a:schemeClr>
+          </a:solidFill>
+          <a:ln>
+            <a:noFill/>
+          </a:ln>
+        </p:spPr>
+        <p:style>
+          <a:lnRef idx="2">
+            <a:schemeClr val="accent1">
+              <a:shade val="50000"/>
+            </a:schemeClr>
+          </a:lnRef>
+          <a:fillRef idx="1">
+            <a:schemeClr val="accent1"/>
+          </a:fillRef>
+          <a:effectRef idx="0">
+            <a:schemeClr val="accent1"/>
+          </a:effectRef>
+          <a:fontRef idx="minor">
+            <a:schemeClr val="lt1"/>
+          </a:fontRef>
+        </p:style>
+        <p:txBody>
+          <a:bodyPr rtlCol="0" anchor="ctr"/>
+          <a:lstStyle/>
+          <a:p>
+            <a:pPr algn="ctr"/>
+            <a:endParaRPr lang="en-US"/>
+          </a:p>
+        </p:txBody>
+      </p:sp>
+      <p:sp>
+        <p:nvSpPr>
+          <p:cNvPr id="2" name="Title 1">
+            <a:extLst>
+              <a:ext uri="{FF2B5EF4-FFF2-40B4-BE49-F238E27FC236}">
+                <a16:creationId xmlns:a16="http://schemas.microsoft.com/office/drawing/2014/main" id="{0BB1ED5E-2E3F-47F0-AFB1-F3CAAA500266}"/>
+              </a:ext>
+            </a:extLst>
+          </p:cNvPr>
+          <p:cNvSpPr>
+            <a:spLocks noGrp="1"/>
+          </p:cNvSpPr>
+          <p:nvPr>
+            <p:ph type="title"/>
+          </p:nvPr>
+        </p:nvSpPr>
+        <p:spPr/>
+        <p:txBody>
+          <a:bodyPr>
+            <a:normAutofit/>
+          </a:bodyPr>
+          <a:lstStyle/>
+          <a:p>
+            <a:r>
+              <a:rPr lang="en-US" dirty="0"/>
+              <a:t>Instantiate Them Using Factories</a:t>
+            </a:r>
+          </a:p>
+        </p:txBody>
+      </p:sp>
+      <p:sp>
+        <p:nvSpPr>
+          <p:cNvPr id="48" name="Slide Number Placeholder 47">
+            <a:extLst>
+              <a:ext uri="{FF2B5EF4-FFF2-40B4-BE49-F238E27FC236}">
+                <a16:creationId xmlns:a16="http://schemas.microsoft.com/office/drawing/2014/main" id="{82DFF3D0-859B-4A6C-95FD-90554F211DF1}"/>
+              </a:ext>
+            </a:extLst>
+          </p:cNvPr>
+          <p:cNvSpPr>
+            <a:spLocks noGrp="1"/>
+          </p:cNvSpPr>
+          <p:nvPr>
+            <p:ph type="sldNum" sz="quarter" idx="12"/>
+          </p:nvPr>
+        </p:nvSpPr>
+        <p:spPr/>
+        <p:txBody>
+          <a:bodyPr/>
+          <a:lstStyle/>
+          <a:p>
+            <a:fld id="{EF57339A-E29B-45C7-A4AA-9F67BACDCD80}" type="slidenum">
+              <a:rPr lang="en-US" smtClean="0"/>
+              <a:t>4</a:t>
+            </a:fld>
+            <a:endParaRPr lang="en-US"/>
+          </a:p>
+        </p:txBody>
+      </p:sp>
+      <p:graphicFrame>
+        <p:nvGraphicFramePr>
+          <p:cNvPr id="4" name="Table 3">
+            <a:extLst>
+              <a:ext uri="{FF2B5EF4-FFF2-40B4-BE49-F238E27FC236}">
+                <a16:creationId xmlns:a16="http://schemas.microsoft.com/office/drawing/2014/main" id="{AC981788-EE7F-40CE-BD1D-47FAE6CDFC8B}"/>
+              </a:ext>
+            </a:extLst>
+          </p:cNvPr>
+          <p:cNvGraphicFramePr>
+            <a:graphicFrameLocks noGrp="1"/>
+          </p:cNvGraphicFramePr>
+          <p:nvPr>
+            <p:extLst>
+              <p:ext uri="{D42A27DB-BD31-4B8C-83A1-F6EECF244321}">
+                <p14:modId xmlns:p14="http://schemas.microsoft.com/office/powerpoint/2010/main" val="3089789605"/>
+              </p:ext>
+            </p:extLst>
+          </p:nvPr>
+        </p:nvGraphicFramePr>
+        <p:xfrm>
+          <a:off x="1052945" y="1294628"/>
+          <a:ext cx="10086111" cy="3474720"/>
+        </p:xfrm>
+        <a:graphic>
+          <a:graphicData uri="http://schemas.openxmlformats.org/drawingml/2006/table">
+            <a:tbl>
+              <a:tblPr firstRow="1" bandRow="1">
+                <a:tableStyleId>{2D5ABB26-0587-4C30-8999-92F81FD0307C}</a:tableStyleId>
+              </a:tblPr>
+              <a:tblGrid>
+                <a:gridCol w="1173255">
+                  <a:extLst>
+                    <a:ext uri="{9D8B030D-6E8A-4147-A177-3AD203B41FA5}">
+                      <a16:colId xmlns:a16="http://schemas.microsoft.com/office/drawing/2014/main" val="4285619337"/>
+                    </a:ext>
+                  </a:extLst>
+                </a:gridCol>
+                <a:gridCol w="1528382">
+                  <a:extLst>
+                    <a:ext uri="{9D8B030D-6E8A-4147-A177-3AD203B41FA5}">
+                      <a16:colId xmlns:a16="http://schemas.microsoft.com/office/drawing/2014/main" val="1444819999"/>
+                    </a:ext>
+                  </a:extLst>
+                </a:gridCol>
+                <a:gridCol w="1620982">
+                  <a:extLst>
+                    <a:ext uri="{9D8B030D-6E8A-4147-A177-3AD203B41FA5}">
+                      <a16:colId xmlns:a16="http://schemas.microsoft.com/office/drawing/2014/main" val="1908894984"/>
+                    </a:ext>
+                  </a:extLst>
+                </a:gridCol>
+                <a:gridCol w="1454727">
+                  <a:extLst>
+                    <a:ext uri="{9D8B030D-6E8A-4147-A177-3AD203B41FA5}">
+                      <a16:colId xmlns:a16="http://schemas.microsoft.com/office/drawing/2014/main" val="2221542817"/>
+                    </a:ext>
+                  </a:extLst>
+                </a:gridCol>
+                <a:gridCol w="2991655">
+                  <a:extLst>
+                    <a:ext uri="{9D8B030D-6E8A-4147-A177-3AD203B41FA5}">
+                      <a16:colId xmlns:a16="http://schemas.microsoft.com/office/drawing/2014/main" val="2470508501"/>
+                    </a:ext>
+                  </a:extLst>
+                </a:gridCol>
+                <a:gridCol w="1317110">
+                  <a:extLst>
+                    <a:ext uri="{9D8B030D-6E8A-4147-A177-3AD203B41FA5}">
+                      <a16:colId xmlns:a16="http://schemas.microsoft.com/office/drawing/2014/main" val="2783193310"/>
+                    </a:ext>
+                  </a:extLst>
+                </a:gridCol>
+              </a:tblGrid>
+              <a:tr h="370840">
+                <a:tc>
+                  <a:txBody>
+                    <a:bodyPr/>
+                    <a:lstStyle/>
+                    <a:p>
+                      <a:r>
+                        <a:rPr lang="en-US" b="1" dirty="0">
+                          <a:latin typeface="+mn-lt"/>
+                        </a:rPr>
+                        <a:t>Primitive Type</a:t>
+                      </a:r>
+                    </a:p>
+                  </a:txBody>
+                  <a:tcPr anchor="b">
+                    <a:lnL w="38100" cap="flat" cmpd="sng" algn="ctr">
+                      <a:solidFill>
+                        <a:schemeClr val="bg1"/>
+                      </a:solidFill>
+                      <a:prstDash val="solid"/>
+                      <a:round/>
+                      <a:headEnd type="none" w="med" len="med"/>
+                      <a:tailEnd type="none" w="med" len="med"/>
+                    </a:lnL>
+                    <a:lnR w="57150" cap="flat" cmpd="sng" algn="ctr">
+                      <a:noFill/>
+                      <a:prstDash val="solid"/>
+                      <a:round/>
+                      <a:headEnd type="none" w="med" len="med"/>
+                      <a:tailEnd type="none" w="med" len="med"/>
+                    </a:lnR>
+                    <a:lnB w="12700" cap="flat" cmpd="sng" algn="ctr">
+                      <a:solidFill>
+                        <a:schemeClr val="tx1"/>
+                      </a:solidFill>
+                      <a:prstDash val="solid"/>
+                      <a:round/>
+                      <a:headEnd type="none" w="med" len="med"/>
+                      <a:tailEnd type="none" w="med" len="med"/>
+                    </a:lnB>
+                  </a:tcPr>
+                </a:tc>
+                <a:tc>
+                  <a:txBody>
+                    <a:bodyPr/>
+                    <a:lstStyle/>
+                    <a:p>
+                      <a:r>
+                        <a:rPr lang="en-US" b="1" dirty="0">
+                          <a:latin typeface="+mn-lt"/>
+                        </a:rPr>
+                        <a:t>Container Type</a:t>
+                      </a:r>
+                    </a:p>
+                  </a:txBody>
+                  <a:tcPr anchor="b">
+                    <a:lnL w="57150" cap="flat" cmpd="sng" algn="ctr">
+                      <a:noFill/>
+                      <a:prstDash val="solid"/>
+                      <a:round/>
+                      <a:headEnd type="none" w="med" len="med"/>
+                      <a:tailEnd type="none" w="med" len="med"/>
+                    </a:lnL>
+                    <a:lnR w="57150" cap="flat" cmpd="sng" algn="ctr">
+                      <a:noFill/>
+                      <a:prstDash val="solid"/>
+                      <a:round/>
+                      <a:headEnd type="none" w="med" len="med"/>
+                      <a:tailEnd type="none" w="med" len="med"/>
+                    </a:lnR>
+                    <a:lnB w="12700" cap="flat" cmpd="sng" algn="ctr">
+                      <a:solidFill>
+                        <a:schemeClr val="tx1"/>
+                      </a:solidFill>
+                      <a:prstDash val="solid"/>
+                      <a:round/>
+                      <a:headEnd type="none" w="med" len="med"/>
+                      <a:tailEnd type="none" w="med" len="med"/>
+                    </a:lnB>
+                  </a:tcPr>
+                </a:tc>
+                <a:tc>
+                  <a:txBody>
+                    <a:bodyPr/>
+                    <a:lstStyle/>
+                    <a:p>
+                      <a:r>
+                        <a:rPr lang="en-US" b="1" dirty="0">
+                          <a:latin typeface="+mn-lt"/>
+                        </a:rPr>
+                        <a:t>Mutability</a:t>
+                      </a:r>
+                    </a:p>
+                  </a:txBody>
+                  <a:tcPr anchor="b">
+                    <a:lnL w="57150" cap="flat" cmpd="sng" algn="ctr">
+                      <a:noFill/>
+                      <a:prstDash val="solid"/>
+                      <a:round/>
+                      <a:headEnd type="none" w="med" len="med"/>
+                      <a:tailEnd type="none" w="med" len="med"/>
+                    </a:lnL>
+                    <a:lnR w="57150" cap="flat" cmpd="sng" algn="ctr">
+                      <a:noFill/>
+                      <a:prstDash val="solid"/>
+                      <a:round/>
+                      <a:headEnd type="none" w="med" len="med"/>
+                      <a:tailEnd type="none" w="med" len="med"/>
+                    </a:lnR>
+                    <a:lnB w="12700" cap="flat" cmpd="sng" algn="ctr">
+                      <a:solidFill>
+                        <a:schemeClr val="tx1"/>
+                      </a:solidFill>
+                      <a:prstDash val="solid"/>
+                      <a:round/>
+                      <a:headEnd type="none" w="med" len="med"/>
+                      <a:tailEnd type="none" w="med" len="med"/>
+                    </a:lnB>
+                  </a:tcPr>
+                </a:tc>
+                <a:tc>
+                  <a:txBody>
+                    <a:bodyPr/>
+                    <a:lstStyle/>
+                    <a:p>
+                      <a:r>
+                        <a:rPr lang="en-US" b="1" dirty="0">
+                          <a:latin typeface="+mn-lt"/>
+                        </a:rPr>
+                        <a:t>Multimap</a:t>
+                      </a:r>
+                    </a:p>
+                  </a:txBody>
+                  <a:tcPr anchor="b">
+                    <a:lnL w="57150" cap="flat" cmpd="sng" algn="ctr">
+                      <a:noFill/>
+                      <a:prstDash val="solid"/>
+                      <a:round/>
+                      <a:headEnd type="none" w="med" len="med"/>
+                      <a:tailEnd type="none" w="med" len="med"/>
+                    </a:lnL>
+                    <a:lnR w="57150" cap="flat" cmpd="sng" algn="ctr">
+                      <a:noFill/>
+                      <a:prstDash val="solid"/>
+                      <a:round/>
+                      <a:headEnd type="none" w="med" len="med"/>
+                      <a:tailEnd type="none" w="med" len="med"/>
+                    </a:lnR>
+                    <a:lnB w="12700" cap="flat" cmpd="sng" algn="ctr">
+                      <a:solidFill>
+                        <a:schemeClr val="tx1"/>
+                      </a:solidFill>
+                      <a:prstDash val="solid"/>
+                      <a:round/>
+                      <a:headEnd type="none" w="med" len="med"/>
+                      <a:tailEnd type="none" w="med" len="med"/>
+                    </a:lnB>
+                  </a:tcPr>
+                </a:tc>
+                <a:tc>
+                  <a:txBody>
+                    <a:bodyPr/>
+                    <a:lstStyle/>
+                    <a:p>
+                      <a:r>
+                        <a:rPr lang="en-US" b="1" dirty="0">
+                          <a:latin typeface="+mn-lt"/>
+                        </a:rPr>
+                        <a:t>Initialized</a:t>
+                      </a:r>
+                    </a:p>
+                  </a:txBody>
+                  <a:tcPr anchor="b">
+                    <a:lnL w="57150" cap="flat" cmpd="sng" algn="ctr">
+                      <a:noFill/>
+                      <a:prstDash val="solid"/>
+                      <a:round/>
+                      <a:headEnd type="none" w="med" len="med"/>
+                      <a:tailEnd type="none" w="med" len="med"/>
+                    </a:lnL>
+                    <a:lnR w="57150" cap="flat" cmpd="sng" algn="ctr">
+                      <a:noFill/>
+                      <a:prstDash val="solid"/>
+                      <a:round/>
+                      <a:headEnd type="none" w="med" len="med"/>
+                      <a:tailEnd type="none" w="med" len="med"/>
+                    </a:lnR>
+                    <a:lnB w="12700" cap="flat" cmpd="sng" algn="ctr">
+                      <a:solidFill>
+                        <a:schemeClr val="tx1"/>
+                      </a:solidFill>
+                      <a:prstDash val="solid"/>
+                      <a:round/>
+                      <a:headEnd type="none" w="med" len="med"/>
+                      <a:tailEnd type="none" w="med" len="med"/>
+                    </a:lnB>
+                  </a:tcPr>
+                </a:tc>
+                <a:tc>
+                  <a:txBody>
+                    <a:bodyPr/>
+                    <a:lstStyle/>
+                    <a:p>
+                      <a:r>
+                        <a:rPr lang="en-US" b="1" dirty="0">
+                          <a:latin typeface="+mn-lt"/>
+                        </a:rPr>
+                        <a:t>Lazy</a:t>
+                      </a:r>
+                    </a:p>
+                  </a:txBody>
+                  <a:tcPr anchor="b">
+                    <a:lnL w="57150" cap="flat" cmpd="sng" algn="ctr">
+                      <a:noFill/>
+                      <a:prstDash val="solid"/>
+                      <a:round/>
+                      <a:headEnd type="none" w="med" len="med"/>
+                      <a:tailEnd type="none" w="med" len="med"/>
+                    </a:lnL>
+                    <a:lnR w="57150" cap="flat" cmpd="sng" algn="ctr">
+                      <a:noFill/>
+                      <a:prstDash val="solid"/>
+                      <a:round/>
+                      <a:headEnd type="none" w="med" len="med"/>
+                      <a:tailEnd type="none" w="med" len="med"/>
+                    </a:lnR>
+                    <a:lnB w="12700" cap="flat" cmpd="sng" algn="ctr">
+                      <a:solidFill>
+                        <a:schemeClr val="tx1"/>
+                      </a:solidFill>
+                      <a:prstDash val="solid"/>
+                      <a:round/>
+                      <a:headEnd type="none" w="med" len="med"/>
+                      <a:tailEnd type="none" w="med" len="med"/>
+                    </a:lnB>
+                  </a:tcPr>
+                </a:tc>
+                <a:extLst>
+                  <a:ext uri="{0D108BD9-81ED-4DB2-BD59-A6C34878D82A}">
+                    <a16:rowId xmlns:a16="http://schemas.microsoft.com/office/drawing/2014/main" val="1725637936"/>
+                  </a:ext>
+                </a:extLst>
+              </a:tr>
+              <a:tr h="370840">
+                <a:tc>
+                  <a:txBody>
+                    <a:bodyPr/>
+                    <a:lstStyle/>
+                    <a:p>
+                      <a:r>
+                        <a:rPr lang="en-US" sz="1800" b="0" dirty="0">
+                          <a:solidFill>
+                            <a:schemeClr val="tx1"/>
+                          </a:solidFill>
+                          <a:latin typeface="Consolas" panose="020B0609020204030204" pitchFamily="49" charset="0"/>
+                        </a:rPr>
+                        <a:t>Boolean</a:t>
+                      </a:r>
+                      <a:br>
+                        <a:rPr lang="en-US" sz="1800" b="0" dirty="0">
+                          <a:solidFill>
+                            <a:schemeClr val="tx1"/>
+                          </a:solidFill>
+                          <a:latin typeface="Consolas" panose="020B0609020204030204" pitchFamily="49" charset="0"/>
+                        </a:rPr>
+                      </a:br>
+                      <a:r>
+                        <a:rPr lang="en-US" sz="1800" b="0" dirty="0">
+                          <a:solidFill>
+                            <a:schemeClr val="tx1"/>
+                          </a:solidFill>
+                          <a:latin typeface="Consolas" panose="020B0609020204030204" pitchFamily="49" charset="0"/>
+                        </a:rPr>
+                        <a:t>Byte</a:t>
+                      </a:r>
+                    </a:p>
+                    <a:p>
+                      <a:r>
+                        <a:rPr lang="en-US" sz="1800" b="0" dirty="0">
+                          <a:solidFill>
+                            <a:schemeClr val="tx1"/>
+                          </a:solidFill>
+                          <a:latin typeface="Consolas" panose="020B0609020204030204" pitchFamily="49" charset="0"/>
+                        </a:rPr>
+                        <a:t>Char</a:t>
+                      </a:r>
+                    </a:p>
+                    <a:p>
+                      <a:r>
+                        <a:rPr lang="en-US" sz="1800" b="0" dirty="0">
+                          <a:solidFill>
+                            <a:schemeClr val="tx1"/>
+                          </a:solidFill>
+                          <a:latin typeface="Consolas" panose="020B0609020204030204" pitchFamily="49" charset="0"/>
+                        </a:rPr>
+                        <a:t>Double</a:t>
+                      </a:r>
+                    </a:p>
+                    <a:p>
+                      <a:r>
+                        <a:rPr lang="en-US" sz="1800" b="0" dirty="0">
+                          <a:solidFill>
+                            <a:schemeClr val="tx1"/>
+                          </a:solidFill>
+                          <a:latin typeface="Consolas" panose="020B0609020204030204" pitchFamily="49" charset="0"/>
+                        </a:rPr>
+                        <a:t>Float</a:t>
+                      </a:r>
+                    </a:p>
+                    <a:p>
+                      <a:r>
+                        <a:rPr lang="en-US" sz="1800" b="0" dirty="0" err="1">
+                          <a:solidFill>
+                            <a:schemeClr val="tx1"/>
+                          </a:solidFill>
+                          <a:latin typeface="Consolas" panose="020B0609020204030204" pitchFamily="49" charset="0"/>
+                        </a:rPr>
+                        <a:t>Int</a:t>
+                      </a:r>
+                      <a:endParaRPr lang="en-US" sz="1800" b="0" dirty="0">
+                        <a:solidFill>
+                          <a:schemeClr val="tx1"/>
+                        </a:solidFill>
+                        <a:latin typeface="Consolas" panose="020B0609020204030204" pitchFamily="49" charset="0"/>
+                      </a:endParaRPr>
+                    </a:p>
+                    <a:p>
+                      <a:r>
+                        <a:rPr lang="en-US" sz="1800" b="0" dirty="0">
+                          <a:solidFill>
+                            <a:schemeClr val="tx1"/>
+                          </a:solidFill>
+                          <a:latin typeface="Consolas" panose="020B0609020204030204" pitchFamily="49" charset="0"/>
+                        </a:rPr>
+                        <a:t>Long</a:t>
+                      </a:r>
+                    </a:p>
+                    <a:p>
+                      <a:r>
+                        <a:rPr lang="en-US" sz="1800" b="0" dirty="0">
+                          <a:solidFill>
+                            <a:schemeClr val="tx1"/>
+                          </a:solidFill>
+                          <a:latin typeface="Consolas" panose="020B0609020204030204" pitchFamily="49" charset="0"/>
+                        </a:rPr>
+                        <a:t>Object</a:t>
+                      </a:r>
+                    </a:p>
+                    <a:p>
+                      <a:r>
+                        <a:rPr lang="en-US" sz="1800" b="0" dirty="0">
+                          <a:solidFill>
+                            <a:schemeClr val="tx1"/>
+                          </a:solidFill>
+                          <a:latin typeface="Consolas" panose="020B0609020204030204" pitchFamily="49" charset="0"/>
+                        </a:rPr>
+                        <a:t>Short</a:t>
+                      </a:r>
+                      <a:endParaRPr lang="en-US" dirty="0">
+                        <a:solidFill>
+                          <a:schemeClr val="tx1"/>
+                        </a:solidFill>
+                        <a:latin typeface="Consolas" panose="020B0609020204030204" pitchFamily="49" charset="0"/>
+                      </a:endParaRPr>
+                    </a:p>
+                  </a:txBody>
+                  <a:tcPr>
+                    <a:lnL w="38100" cap="flat" cmpd="sng" algn="ctr">
+                      <a:solidFill>
+                        <a:schemeClr val="bg1"/>
+                      </a:solidFill>
+                      <a:prstDash val="solid"/>
+                      <a:round/>
+                      <a:headEnd type="none" w="med" len="med"/>
+                      <a:tailEnd type="none" w="med" len="med"/>
+                    </a:lnL>
+                    <a:lnR w="57150" cap="flat" cmpd="sng" algn="ctr">
+                      <a:noFill/>
+                      <a:prstDash val="solid"/>
+                      <a:round/>
+                      <a:headEnd type="none" w="med" len="med"/>
+                      <a:tailEnd type="none" w="med" len="med"/>
+                    </a:lnR>
+                    <a:lnT w="12700" cap="flat" cmpd="sng" algn="ctr">
+                      <a:solidFill>
+                        <a:schemeClr val="tx1"/>
+                      </a:solidFill>
+                      <a:prstDash val="solid"/>
+                      <a:round/>
+                      <a:headEnd type="none" w="med" len="med"/>
+                      <a:tailEnd type="none" w="med" len="med"/>
+                    </a:lnT>
+                  </a:tcPr>
+                </a:tc>
+                <a:tc>
+                  <a:txBody>
+                    <a:bodyPr/>
+                    <a:lstStyle/>
+                    <a:p>
+                      <a:r>
+                        <a:rPr lang="en-US" dirty="0">
+                          <a:latin typeface="Consolas" panose="020B0609020204030204" pitchFamily="49" charset="0"/>
+                        </a:rPr>
+                        <a:t>Bags</a:t>
+                      </a:r>
+                    </a:p>
+                    <a:p>
+                      <a:r>
+                        <a:rPr lang="en-US" dirty="0" err="1">
+                          <a:latin typeface="Consolas" panose="020B0609020204030204" pitchFamily="49" charset="0"/>
+                        </a:rPr>
+                        <a:t>BiMaps</a:t>
+                      </a:r>
+                      <a:endParaRPr lang="en-US" dirty="0">
+                        <a:latin typeface="Consolas" panose="020B0609020204030204" pitchFamily="49" charset="0"/>
+                      </a:endParaRPr>
+                    </a:p>
+                    <a:p>
+                      <a:r>
+                        <a:rPr lang="en-US" dirty="0">
+                          <a:latin typeface="Consolas" panose="020B0609020204030204" pitchFamily="49" charset="0"/>
+                        </a:rPr>
+                        <a:t>Lists</a:t>
+                      </a:r>
+                    </a:p>
+                    <a:p>
+                      <a:r>
+                        <a:rPr lang="en-US" dirty="0">
+                          <a:latin typeface="Consolas" panose="020B0609020204030204" pitchFamily="49" charset="0"/>
+                        </a:rPr>
+                        <a:t>Maps</a:t>
+                      </a:r>
+                    </a:p>
+                    <a:p>
+                      <a:r>
+                        <a:rPr lang="en-US" dirty="0">
+                          <a:latin typeface="Consolas" panose="020B0609020204030204" pitchFamily="49" charset="0"/>
+                        </a:rPr>
+                        <a:t>Multimaps</a:t>
+                      </a:r>
+                    </a:p>
+                    <a:p>
+                      <a:r>
+                        <a:rPr lang="en-US" dirty="0">
+                          <a:latin typeface="Consolas" panose="020B0609020204030204" pitchFamily="49" charset="0"/>
+                        </a:rPr>
+                        <a:t>Sets</a:t>
+                      </a:r>
+                    </a:p>
+                    <a:p>
+                      <a:r>
+                        <a:rPr lang="en-US" dirty="0" err="1">
+                          <a:latin typeface="Consolas" panose="020B0609020204030204" pitchFamily="49" charset="0"/>
+                        </a:rPr>
+                        <a:t>SortedBags</a:t>
+                      </a:r>
+                      <a:endParaRPr lang="en-US" dirty="0">
+                        <a:latin typeface="Consolas" panose="020B0609020204030204" pitchFamily="49" charset="0"/>
+                      </a:endParaRPr>
+                    </a:p>
+                    <a:p>
+                      <a:r>
+                        <a:rPr lang="en-US" dirty="0" err="1">
+                          <a:latin typeface="Consolas" panose="020B0609020204030204" pitchFamily="49" charset="0"/>
+                        </a:rPr>
+                        <a:t>SortedMaps</a:t>
+                      </a:r>
+                      <a:endParaRPr lang="en-US" dirty="0">
+                        <a:latin typeface="Consolas" panose="020B0609020204030204" pitchFamily="49" charset="0"/>
+                      </a:endParaRPr>
+                    </a:p>
+                    <a:p>
+                      <a:r>
+                        <a:rPr lang="en-US" dirty="0" err="1">
+                          <a:latin typeface="Consolas" panose="020B0609020204030204" pitchFamily="49" charset="0"/>
+                        </a:rPr>
+                        <a:t>SortedSets</a:t>
+                      </a:r>
+                      <a:endParaRPr lang="en-US" dirty="0">
+                        <a:latin typeface="Consolas" panose="020B0609020204030204" pitchFamily="49" charset="0"/>
+                      </a:endParaRPr>
+                    </a:p>
+                    <a:p>
+                      <a:r>
+                        <a:rPr lang="en-US" dirty="0">
+                          <a:latin typeface="Consolas" panose="020B0609020204030204" pitchFamily="49" charset="0"/>
+                        </a:rPr>
+                        <a:t>Stacks</a:t>
+                      </a:r>
+                    </a:p>
+                  </a:txBody>
+                  <a:tcPr>
+                    <a:lnL w="57150" cap="flat" cmpd="sng" algn="ctr">
+                      <a:noFill/>
+                      <a:prstDash val="solid"/>
+                      <a:round/>
+                      <a:headEnd type="none" w="med" len="med"/>
+                      <a:tailEnd type="none" w="med" len="med"/>
+                    </a:lnL>
+                    <a:lnR w="57150" cap="flat" cmpd="sng" algn="ctr">
+                      <a:noFill/>
+                      <a:prstDash val="solid"/>
+                      <a:round/>
+                      <a:headEnd type="none" w="med" len="med"/>
+                      <a:tailEnd type="none" w="med" len="med"/>
+                    </a:lnR>
+                    <a:lnT w="12700" cap="flat" cmpd="sng" algn="ctr">
+                      <a:solidFill>
+                        <a:schemeClr val="tx1"/>
+                      </a:solidFill>
+                      <a:prstDash val="solid"/>
+                      <a:round/>
+                      <a:headEnd type="none" w="med" len="med"/>
+                      <a:tailEnd type="none" w="med" len="med"/>
+                    </a:lnT>
+                  </a:tcPr>
+                </a:tc>
+                <a:tc>
+                  <a:txBody>
+                    <a:bodyPr/>
+                    <a:lstStyle/>
+                    <a:p>
+                      <a:r>
+                        <a:rPr lang="en-US" dirty="0">
+                          <a:latin typeface="Consolas" panose="020B0609020204030204" pitchFamily="49" charset="0"/>
+                        </a:rPr>
+                        <a:t>.mutable</a:t>
+                      </a:r>
+                    </a:p>
+                    <a:p>
+                      <a:r>
+                        <a:rPr lang="en-US" dirty="0">
+                          <a:latin typeface="Consolas" panose="020B0609020204030204" pitchFamily="49" charset="0"/>
+                        </a:rPr>
+                        <a:t>.immutable</a:t>
+                      </a:r>
+                    </a:p>
+                    <a:p>
+                      <a:r>
+                        <a:rPr lang="en-US" dirty="0">
+                          <a:latin typeface="Consolas" panose="020B0609020204030204" pitchFamily="49" charset="0"/>
+                        </a:rPr>
+                        <a:t>.</a:t>
+                      </a:r>
+                      <a:r>
+                        <a:rPr lang="en-US" dirty="0" err="1">
+                          <a:latin typeface="Consolas" panose="020B0609020204030204" pitchFamily="49" charset="0"/>
+                        </a:rPr>
+                        <a:t>fixedSize</a:t>
+                      </a:r>
+                      <a:endParaRPr lang="en-US" dirty="0">
+                        <a:latin typeface="Consolas" panose="020B0609020204030204" pitchFamily="49" charset="0"/>
+                      </a:endParaRPr>
+                    </a:p>
+                  </a:txBody>
+                  <a:tcPr>
+                    <a:lnL w="57150" cap="flat" cmpd="sng" algn="ctr">
+                      <a:noFill/>
+                      <a:prstDash val="solid"/>
+                      <a:round/>
+                      <a:headEnd type="none" w="med" len="med"/>
+                      <a:tailEnd type="none" w="med" len="med"/>
+                    </a:lnL>
+                    <a:lnR w="57150" cap="flat" cmpd="sng" algn="ctr">
+                      <a:noFill/>
+                      <a:prstDash val="solid"/>
+                      <a:round/>
+                      <a:headEnd type="none" w="med" len="med"/>
+                      <a:tailEnd type="none" w="med" len="med"/>
+                    </a:lnR>
+                    <a:lnT w="12700" cap="flat" cmpd="sng" algn="ctr">
+                      <a:solidFill>
+                        <a:schemeClr val="tx1"/>
+                      </a:solidFill>
+                      <a:prstDash val="solid"/>
+                      <a:round/>
+                      <a:headEnd type="none" w="med" len="med"/>
+                      <a:tailEnd type="none" w="med" len="med"/>
+                    </a:lnT>
+                  </a:tcPr>
+                </a:tc>
+                <a:tc>
+                  <a:txBody>
+                    <a:bodyPr/>
+                    <a:lstStyle/>
+                    <a:p>
+                      <a:r>
+                        <a:rPr lang="en-US" dirty="0">
+                          <a:latin typeface="Consolas" panose="020B0609020204030204" pitchFamily="49" charset="0"/>
+                        </a:rPr>
+                        <a:t>.bag</a:t>
+                      </a:r>
+                    </a:p>
+                    <a:p>
+                      <a:r>
+                        <a:rPr lang="en-US" dirty="0">
+                          <a:latin typeface="Consolas" panose="020B0609020204030204" pitchFamily="49" charset="0"/>
+                        </a:rPr>
+                        <a:t>.list</a:t>
+                      </a:r>
+                    </a:p>
+                    <a:p>
+                      <a:r>
+                        <a:rPr lang="en-US" dirty="0">
+                          <a:latin typeface="Consolas" panose="020B0609020204030204" pitchFamily="49" charset="0"/>
+                        </a:rPr>
+                        <a:t>.set</a:t>
+                      </a:r>
+                    </a:p>
+                    <a:p>
+                      <a:r>
+                        <a:rPr lang="en-US" dirty="0">
+                          <a:latin typeface="Consolas" panose="020B0609020204030204" pitchFamily="49" charset="0"/>
+                        </a:rPr>
+                        <a:t>.</a:t>
+                      </a:r>
+                      <a:r>
+                        <a:rPr lang="en-US" dirty="0" err="1">
+                          <a:latin typeface="Consolas" panose="020B0609020204030204" pitchFamily="49" charset="0"/>
+                        </a:rPr>
+                        <a:t>sortedSet</a:t>
+                      </a:r>
+                      <a:endParaRPr lang="en-US" dirty="0">
+                        <a:latin typeface="Consolas" panose="020B0609020204030204" pitchFamily="49" charset="0"/>
+                      </a:endParaRPr>
+                    </a:p>
+                  </a:txBody>
+                  <a:tcPr>
+                    <a:lnL w="57150" cap="flat" cmpd="sng" algn="ctr">
+                      <a:noFill/>
+                      <a:prstDash val="solid"/>
+                      <a:round/>
+                      <a:headEnd type="none" w="med" len="med"/>
+                      <a:tailEnd type="none" w="med" len="med"/>
+                    </a:lnL>
+                    <a:lnR w="57150" cap="flat" cmpd="sng" algn="ctr">
+                      <a:noFill/>
+                      <a:prstDash val="solid"/>
+                      <a:round/>
+                      <a:headEnd type="none" w="med" len="med"/>
+                      <a:tailEnd type="none" w="med" len="med"/>
+                    </a:lnR>
+                    <a:lnT w="12700" cap="flat" cmpd="sng" algn="ctr">
+                      <a:solidFill>
+                        <a:schemeClr val="tx1"/>
+                      </a:solidFill>
+                      <a:prstDash val="solid"/>
+                      <a:round/>
+                      <a:headEnd type="none" w="med" len="med"/>
+                      <a:tailEnd type="none" w="med" len="med"/>
+                    </a:lnT>
+                  </a:tcPr>
+                </a:tc>
+                <a:tc>
+                  <a:txBody>
+                    <a:bodyPr/>
+                    <a:lstStyle/>
+                    <a:p>
+                      <a:r>
+                        <a:rPr lang="en-US" dirty="0">
+                          <a:latin typeface="Consolas" panose="020B0609020204030204" pitchFamily="49" charset="0"/>
+                        </a:rPr>
+                        <a:t>.empty()</a:t>
+                      </a:r>
+                      <a:r>
+                        <a:rPr lang="en-US" dirty="0">
+                          <a:solidFill>
+                            <a:srgbClr val="0066FF"/>
+                          </a:solidFill>
+                          <a:latin typeface="Consolas" panose="020B0609020204030204" pitchFamily="49" charset="0"/>
+                        </a:rPr>
+                        <a:t>|</a:t>
+                      </a:r>
+                      <a:r>
+                        <a:rPr lang="en-US" dirty="0">
+                          <a:latin typeface="Consolas" panose="020B0609020204030204" pitchFamily="49" charset="0"/>
+                        </a:rPr>
+                        <a:t>.of()</a:t>
+                      </a:r>
+                      <a:r>
+                        <a:rPr lang="en-US" dirty="0">
+                          <a:solidFill>
+                            <a:srgbClr val="0066FF"/>
+                          </a:solidFill>
+                          <a:latin typeface="Consolas" panose="020B0609020204030204" pitchFamily="49" charset="0"/>
+                        </a:rPr>
+                        <a:t>|</a:t>
+                      </a:r>
+                      <a:r>
+                        <a:rPr lang="en-US" dirty="0">
+                          <a:latin typeface="Consolas" panose="020B0609020204030204" pitchFamily="49" charset="0"/>
+                        </a:rPr>
+                        <a:t>.with()</a:t>
+                      </a:r>
+                    </a:p>
+                    <a:p>
+                      <a:r>
+                        <a:rPr lang="en-US" dirty="0">
+                          <a:latin typeface="Consolas" panose="020B0609020204030204" pitchFamily="49" charset="0"/>
+                        </a:rPr>
+                        <a:t>.of(one)</a:t>
+                      </a:r>
+                      <a:r>
+                        <a:rPr lang="en-US" dirty="0">
+                          <a:solidFill>
+                            <a:srgbClr val="0066FF"/>
+                          </a:solidFill>
+                          <a:latin typeface="Consolas" panose="020B0609020204030204" pitchFamily="49" charset="0"/>
+                        </a:rPr>
+                        <a:t>|</a:t>
+                      </a:r>
+                      <a:r>
+                        <a:rPr lang="en-US" dirty="0">
+                          <a:latin typeface="Consolas" panose="020B0609020204030204" pitchFamily="49" charset="0"/>
+                        </a:rPr>
+                        <a:t>.with(one)</a:t>
+                      </a:r>
+                    </a:p>
+                    <a:p>
+                      <a:r>
+                        <a:rPr lang="en-US" dirty="0">
+                          <a:latin typeface="Consolas" panose="020B0609020204030204" pitchFamily="49" charset="0"/>
+                        </a:rPr>
+                        <a:t>   ...</a:t>
+                      </a:r>
+                    </a:p>
+                    <a:p>
+                      <a:r>
+                        <a:rPr lang="en-US" dirty="0">
+                          <a:latin typeface="Consolas" panose="020B0609020204030204" pitchFamily="49" charset="0"/>
+                        </a:rPr>
+                        <a:t>.of(one,…,ten)</a:t>
+                      </a:r>
+                    </a:p>
+                    <a:p>
+                      <a:r>
+                        <a:rPr lang="en-US" dirty="0">
+                          <a:latin typeface="Consolas" panose="020B0609020204030204" pitchFamily="49" charset="0"/>
+                        </a:rPr>
+                        <a:t>.with(one,…,ten)</a:t>
+                      </a:r>
+                    </a:p>
+                    <a:p>
+                      <a:r>
+                        <a:rPr lang="en-US" dirty="0">
+                          <a:latin typeface="Consolas" panose="020B0609020204030204" pitchFamily="49" charset="0"/>
+                        </a:rPr>
+                        <a:t>.of(... elements)</a:t>
+                      </a:r>
+                    </a:p>
+                    <a:p>
+                      <a:r>
+                        <a:rPr lang="en-US" dirty="0">
+                          <a:latin typeface="Consolas" panose="020B0609020204030204" pitchFamily="49" charset="0"/>
+                        </a:rPr>
+                        <a:t>.with(... elements)</a:t>
+                      </a:r>
+                    </a:p>
+                    <a:p>
+                      <a:r>
+                        <a:rPr lang="en-US" dirty="0">
+                          <a:latin typeface="Consolas" panose="020B0609020204030204" pitchFamily="49" charset="0"/>
+                        </a:rPr>
+                        <a:t>.</a:t>
+                      </a:r>
+                      <a:r>
+                        <a:rPr lang="en-US" dirty="0" err="1">
+                          <a:latin typeface="Consolas" panose="020B0609020204030204" pitchFamily="49" charset="0"/>
+                        </a:rPr>
+                        <a:t>ofAll</a:t>
+                      </a:r>
+                      <a:r>
+                        <a:rPr lang="en-US" dirty="0">
+                          <a:latin typeface="Consolas" panose="020B0609020204030204" pitchFamily="49" charset="0"/>
+                        </a:rPr>
+                        <a:t>(</a:t>
+                      </a:r>
+                      <a:r>
+                        <a:rPr lang="en-US" dirty="0" err="1">
+                          <a:latin typeface="Consolas" panose="020B0609020204030204" pitchFamily="49" charset="0"/>
+                        </a:rPr>
+                        <a:t>Iterable</a:t>
+                      </a:r>
+                      <a:r>
+                        <a:rPr lang="en-US" dirty="0">
+                          <a:latin typeface="Consolas" panose="020B0609020204030204" pitchFamily="49" charset="0"/>
+                        </a:rPr>
+                        <a:t>)</a:t>
+                      </a:r>
+                    </a:p>
+                    <a:p>
+                      <a:r>
+                        <a:rPr lang="en-US" dirty="0">
+                          <a:latin typeface="Consolas" panose="020B0609020204030204" pitchFamily="49" charset="0"/>
+                        </a:rPr>
+                        <a:t>.</a:t>
+                      </a:r>
+                      <a:r>
+                        <a:rPr lang="en-US" dirty="0" err="1">
+                          <a:latin typeface="Consolas" panose="020B0609020204030204" pitchFamily="49" charset="0"/>
+                        </a:rPr>
+                        <a:t>withAll</a:t>
+                      </a:r>
+                      <a:r>
+                        <a:rPr lang="en-US" dirty="0">
+                          <a:latin typeface="Consolas" panose="020B0609020204030204" pitchFamily="49" charset="0"/>
+                        </a:rPr>
+                        <a:t>(</a:t>
+                      </a:r>
+                      <a:r>
+                        <a:rPr lang="en-US" dirty="0" err="1">
+                          <a:latin typeface="Consolas" panose="020B0609020204030204" pitchFamily="49" charset="0"/>
+                        </a:rPr>
+                        <a:t>Iterable</a:t>
+                      </a:r>
+                      <a:r>
+                        <a:rPr lang="en-US" dirty="0">
+                          <a:latin typeface="Consolas" panose="020B0609020204030204" pitchFamily="49" charset="0"/>
+                        </a:rPr>
+                        <a:t>)</a:t>
+                      </a:r>
+                    </a:p>
+                  </a:txBody>
+                  <a:tcPr>
+                    <a:lnL w="57150" cap="flat" cmpd="sng" algn="ctr">
+                      <a:noFill/>
+                      <a:prstDash val="solid"/>
+                      <a:round/>
+                      <a:headEnd type="none" w="med" len="med"/>
+                      <a:tailEnd type="none" w="med" len="med"/>
+                    </a:lnL>
+                    <a:lnR w="57150" cap="flat" cmpd="sng" algn="ctr">
+                      <a:noFill/>
+                      <a:prstDash val="solid"/>
+                      <a:round/>
+                      <a:headEnd type="none" w="med" len="med"/>
+                      <a:tailEnd type="none" w="med" len="med"/>
+                    </a:lnR>
+                    <a:lnT w="12700" cap="flat" cmpd="sng" algn="ctr">
+                      <a:solidFill>
+                        <a:schemeClr val="tx1"/>
+                      </a:solidFill>
+                      <a:prstDash val="solid"/>
+                      <a:round/>
+                      <a:headEnd type="none" w="med" len="med"/>
+                      <a:tailEnd type="none" w="med" len="med"/>
+                    </a:lnT>
+                  </a:tcPr>
+                </a:tc>
+                <a:tc>
+                  <a:txBody>
+                    <a:bodyPr/>
+                    <a:lstStyle/>
+                    <a:p>
+                      <a:r>
+                        <a:rPr lang="en-US" dirty="0">
+                          <a:latin typeface="Consolas" panose="020B0609020204030204" pitchFamily="49" charset="0"/>
+                        </a:rPr>
+                        <a:t>.</a:t>
+                      </a:r>
+                      <a:r>
+                        <a:rPr lang="en-US" dirty="0" err="1">
+                          <a:latin typeface="Consolas" panose="020B0609020204030204" pitchFamily="49" charset="0"/>
+                        </a:rPr>
+                        <a:t>asLazy</a:t>
+                      </a:r>
+                      <a:r>
+                        <a:rPr lang="en-US" dirty="0">
+                          <a:latin typeface="Consolas" panose="020B0609020204030204" pitchFamily="49" charset="0"/>
+                        </a:rPr>
+                        <a:t>()</a:t>
+                      </a:r>
+                    </a:p>
+                  </a:txBody>
+                  <a:tcPr>
+                    <a:lnL w="57150" cap="flat" cmpd="sng" algn="ctr">
+                      <a:noFill/>
+                      <a:prstDash val="solid"/>
+                      <a:round/>
+                      <a:headEnd type="none" w="med" len="med"/>
+                      <a:tailEnd type="none" w="med" len="med"/>
+                    </a:lnL>
+                    <a:lnR w="57150" cap="flat" cmpd="sng" algn="ctr">
+                      <a:noFill/>
+                      <a:prstDash val="solid"/>
+                      <a:round/>
+                      <a:headEnd type="none" w="med" len="med"/>
+                      <a:tailEnd type="none" w="med" len="med"/>
+                    </a:lnR>
+                    <a:lnT w="12700" cap="flat" cmpd="sng" algn="ctr">
+                      <a:solidFill>
+                        <a:schemeClr val="tx1"/>
+                      </a:solidFill>
+                      <a:prstDash val="solid"/>
+                      <a:round/>
+                      <a:headEnd type="none" w="med" len="med"/>
+                      <a:tailEnd type="none" w="med" len="med"/>
+                    </a:lnT>
+                  </a:tcPr>
+                </a:tc>
+                <a:extLst>
+                  <a:ext uri="{0D108BD9-81ED-4DB2-BD59-A6C34878D82A}">
+                    <a16:rowId xmlns:a16="http://schemas.microsoft.com/office/drawing/2014/main" val="603428685"/>
+                  </a:ext>
+                </a:extLst>
+              </a:tr>
+            </a:tbl>
+          </a:graphicData>
+        </a:graphic>
+      </p:graphicFrame>
+      <p:sp>
+        <p:nvSpPr>
+          <p:cNvPr id="15" name="Rectangle 3">
+            <a:extLst>
+              <a:ext uri="{FF2B5EF4-FFF2-40B4-BE49-F238E27FC236}">
+                <a16:creationId xmlns:a16="http://schemas.microsoft.com/office/drawing/2014/main" id="{2657ADAB-2CC7-408B-8716-453B942ABC0B}"/>
+              </a:ext>
+            </a:extLst>
+          </p:cNvPr>
+          <p:cNvSpPr>
+            <a:spLocks noChangeArrowheads="1"/>
+          </p:cNvSpPr>
+          <p:nvPr/>
+        </p:nvSpPr>
+        <p:spPr bwMode="auto">
+          <a:xfrm>
+            <a:off x="1492827" y="5375997"/>
+            <a:ext cx="9206346" cy="600164"/>
+          </a:xfrm>
+          <a:prstGeom prst="rect">
+            <a:avLst/>
+          </a:prstGeom>
+          <a:noFill/>
+          <a:ln>
+            <a:noFill/>
+          </a:ln>
+          <a:effectLst/>
+        </p:spPr>
+        <p:txBody>
+          <a:bodyPr vert="horz" wrap="square" lIns="91440" tIns="45720" rIns="91440" bIns="45720" numCol="1" anchor="ctr" anchorCtr="0" compatLnSpc="1">
+            <a:prstTxWarp prst="textNoShape">
+              <a:avLst/>
+            </a:prstTxWarp>
+            <a:spAutoFit/>
+          </a:bodyPr>
+          <a:lstStyle/>
+          <a:p>
+            <a:pPr marL="0" marR="0" lvl="0" indent="0" algn="ctr" defTabSz="914400" rtl="0" eaLnBrk="0" fontAlgn="base" latinLnBrk="0" hangingPunct="0">
+              <a:lnSpc>
+                <a:spcPct val="150000"/>
+              </a:lnSpc>
+              <a:spcBef>
+                <a:spcPct val="0"/>
+              </a:spcBef>
+              <a:spcAft>
+                <a:spcPct val="0"/>
+              </a:spcAft>
+              <a:buClrTx/>
+              <a:buSzTx/>
+              <a:buFontTx/>
+              <a:buNone/>
+              <a:tabLst/>
+            </a:pPr>
+            <a:r>
+              <a:rPr kumimoji="0" lang="en-US" altLang="en-US" sz="2400" b="0" i="0" u="none" strike="noStrike" cap="none" normalizeH="0" baseline="0" dirty="0" err="1">
+                <a:ln>
+                  <a:noFill/>
+                </a:ln>
+                <a:solidFill>
+                  <a:srgbClr val="0066FF"/>
+                </a:solidFill>
+                <a:effectLst/>
+                <a:latin typeface="Courier New" panose="02070309020205020404" pitchFamily="49" charset="0"/>
+                <a:cs typeface="Courier New" panose="02070309020205020404" pitchFamily="49" charset="0"/>
+              </a:rPr>
+              <a:t>LongStacks</a:t>
+            </a:r>
+            <a:r>
+              <a:rPr kumimoji="0" lang="en-US" altLang="en-US" sz="2400" b="0" i="0" u="none" strike="noStrike" cap="none" normalizeH="0" baseline="0" dirty="0" err="1">
+                <a:ln>
+                  <a:noFill/>
+                </a:ln>
+                <a:solidFill>
+                  <a:srgbClr val="000000"/>
+                </a:solidFill>
+                <a:effectLst/>
+                <a:latin typeface="Courier New" panose="02070309020205020404" pitchFamily="49" charset="0"/>
+                <a:cs typeface="Courier New" panose="02070309020205020404" pitchFamily="49" charset="0"/>
+              </a:rPr>
+              <a:t>.</a:t>
+            </a:r>
+            <a:r>
+              <a:rPr kumimoji="0" lang="en-US" altLang="en-US" sz="2400" b="1" i="1" u="none" strike="noStrike" cap="none" normalizeH="0" baseline="0" dirty="0" err="1">
+                <a:ln>
+                  <a:noFill/>
+                </a:ln>
+                <a:solidFill>
+                  <a:srgbClr val="660E7A"/>
+                </a:solidFill>
+                <a:effectLst/>
+                <a:latin typeface="Courier New" panose="02070309020205020404" pitchFamily="49" charset="0"/>
+                <a:cs typeface="Courier New" panose="02070309020205020404" pitchFamily="49" charset="0"/>
+              </a:rPr>
+              <a:t>immutable</a:t>
+            </a:r>
+            <a:r>
+              <a:rPr kumimoji="0" lang="en-US" altLang="en-US" sz="2400" b="0" i="0" u="none" strike="noStrike" cap="none" normalizeH="0" baseline="0" dirty="0" err="1">
+                <a:ln>
+                  <a:noFill/>
+                </a:ln>
+                <a:solidFill>
+                  <a:srgbClr val="000000"/>
+                </a:solidFill>
+                <a:effectLst/>
+                <a:latin typeface="Courier New" panose="02070309020205020404" pitchFamily="49" charset="0"/>
+                <a:cs typeface="Courier New" panose="02070309020205020404" pitchFamily="49" charset="0"/>
+              </a:rPr>
+              <a:t>.with</a:t>
+            </a:r>
+            <a:r>
+              <a:rPr kumimoji="0" lang="en-US" altLang="en-US" sz="2400" b="0" i="0" u="none" strike="noStrike" cap="none" normalizeH="0" baseline="0" dirty="0">
+                <a:ln>
+                  <a:noFill/>
+                </a:ln>
+                <a:solidFill>
+                  <a:srgbClr val="000000"/>
+                </a:solidFill>
+                <a:effectLst/>
+                <a:latin typeface="Courier New" panose="02070309020205020404" pitchFamily="49" charset="0"/>
+                <a:cs typeface="Courier New" panose="02070309020205020404" pitchFamily="49" charset="0"/>
+              </a:rPr>
+              <a:t>(</a:t>
+            </a:r>
+            <a:r>
+              <a:rPr kumimoji="0" lang="en-US" altLang="en-US" sz="2400" b="0" i="0" u="none" strike="noStrike" cap="none" normalizeH="0" baseline="0" dirty="0">
+                <a:ln>
+                  <a:noFill/>
+                </a:ln>
+                <a:solidFill>
+                  <a:srgbClr val="0000FF"/>
+                </a:solidFill>
+                <a:effectLst/>
+                <a:latin typeface="Courier New" panose="02070309020205020404" pitchFamily="49" charset="0"/>
+                <a:cs typeface="Courier New" panose="02070309020205020404" pitchFamily="49" charset="0"/>
+              </a:rPr>
+              <a:t>1</a:t>
+            </a:r>
+            <a:r>
+              <a:rPr kumimoji="0" lang="en-US" altLang="en-US" sz="2400" b="0" i="0" u="none" strike="noStrike" cap="none" normalizeH="0" baseline="0" dirty="0">
+                <a:ln>
+                  <a:noFill/>
+                </a:ln>
+                <a:solidFill>
+                  <a:srgbClr val="000000"/>
+                </a:solidFill>
+                <a:effectLst/>
+                <a:latin typeface="Courier New" panose="02070309020205020404" pitchFamily="49" charset="0"/>
+                <a:cs typeface="Courier New" panose="02070309020205020404" pitchFamily="49" charset="0"/>
+              </a:rPr>
+              <a:t>, </a:t>
+            </a:r>
+            <a:r>
+              <a:rPr kumimoji="0" lang="en-US" altLang="en-US" sz="2400" b="0" i="0" u="none" strike="noStrike" cap="none" normalizeH="0" baseline="0" dirty="0">
+                <a:ln>
+                  <a:noFill/>
+                </a:ln>
+                <a:solidFill>
+                  <a:srgbClr val="0000FF"/>
+                </a:solidFill>
+                <a:effectLst/>
+                <a:latin typeface="Courier New" panose="02070309020205020404" pitchFamily="49" charset="0"/>
+                <a:cs typeface="Courier New" panose="02070309020205020404" pitchFamily="49" charset="0"/>
+              </a:rPr>
+              <a:t>2</a:t>
+            </a:r>
+            <a:r>
+              <a:rPr kumimoji="0" lang="en-US" altLang="en-US" sz="2400" b="0" i="0" u="none" strike="noStrike" cap="none" normalizeH="0" baseline="0" dirty="0">
+                <a:ln>
+                  <a:noFill/>
+                </a:ln>
+                <a:solidFill>
+                  <a:srgbClr val="000000"/>
+                </a:solidFill>
+                <a:effectLst/>
+                <a:latin typeface="Courier New" panose="02070309020205020404" pitchFamily="49" charset="0"/>
+                <a:cs typeface="Courier New" panose="02070309020205020404" pitchFamily="49" charset="0"/>
+              </a:rPr>
+              <a:t>, </a:t>
+            </a:r>
+            <a:r>
+              <a:rPr kumimoji="0" lang="en-US" altLang="en-US" sz="2400" b="0" i="0" u="none" strike="noStrike" cap="none" normalizeH="0" baseline="0" dirty="0">
+                <a:ln>
+                  <a:noFill/>
+                </a:ln>
+                <a:solidFill>
+                  <a:srgbClr val="0000FF"/>
+                </a:solidFill>
+                <a:effectLst/>
+                <a:latin typeface="Courier New" panose="02070309020205020404" pitchFamily="49" charset="0"/>
+                <a:cs typeface="Courier New" panose="02070309020205020404" pitchFamily="49" charset="0"/>
+              </a:rPr>
+              <a:t>3</a:t>
+            </a:r>
+            <a:r>
+              <a:rPr kumimoji="0" lang="en-US" altLang="en-US" sz="2400" b="0" i="0" u="none" strike="noStrike" cap="none" normalizeH="0" baseline="0" dirty="0">
+                <a:ln>
+                  <a:noFill/>
+                </a:ln>
+                <a:solidFill>
+                  <a:srgbClr val="000000"/>
+                </a:solidFill>
+                <a:effectLst/>
+                <a:latin typeface="Courier New" panose="02070309020205020404" pitchFamily="49" charset="0"/>
+                <a:cs typeface="Courier New" panose="02070309020205020404" pitchFamily="49" charset="0"/>
+              </a:rPr>
+              <a:t>).</a:t>
+            </a:r>
+            <a:r>
+              <a:rPr kumimoji="0" lang="en-US" altLang="en-US" sz="2400" b="0" i="0" u="none" strike="noStrike" cap="none" normalizeH="0" baseline="0" dirty="0" err="1">
+                <a:ln>
+                  <a:noFill/>
+                </a:ln>
+                <a:solidFill>
+                  <a:srgbClr val="000000"/>
+                </a:solidFill>
+                <a:effectLst/>
+                <a:latin typeface="Courier New" panose="02070309020205020404" pitchFamily="49" charset="0"/>
+                <a:cs typeface="Courier New" panose="02070309020205020404" pitchFamily="49" charset="0"/>
+              </a:rPr>
+              <a:t>asLazy</a:t>
+            </a:r>
+            <a:r>
+              <a:rPr kumimoji="0" lang="en-US" altLang="en-US" sz="2400" b="0" i="0" u="none" strike="noStrike" cap="none" normalizeH="0" baseline="0" dirty="0">
+                <a:ln>
+                  <a:noFill/>
+                </a:ln>
+                <a:solidFill>
+                  <a:srgbClr val="000000"/>
+                </a:solidFill>
+                <a:effectLst/>
+                <a:latin typeface="Courier New" panose="02070309020205020404" pitchFamily="49" charset="0"/>
+                <a:cs typeface="Courier New" panose="02070309020205020404" pitchFamily="49" charset="0"/>
+              </a:rPr>
+              <a:t>()</a:t>
+            </a:r>
+          </a:p>
+        </p:txBody>
+      </p:sp>
+      <p:pic>
+        <p:nvPicPr>
+          <p:cNvPr id="17" name="Graphic 16" descr="Right Pointing Backhand Index ">
+            <a:extLst>
+              <a:ext uri="{FF2B5EF4-FFF2-40B4-BE49-F238E27FC236}">
+                <a16:creationId xmlns:a16="http://schemas.microsoft.com/office/drawing/2014/main" id="{F0279863-CD59-488C-94F1-0C5ECFA78070}"/>
+              </a:ext>
+            </a:extLst>
+          </p:cNvPr>
+          <p:cNvPicPr>
+            <a:picLocks noChangeAspect="1"/>
+          </p:cNvPicPr>
+          <p:nvPr/>
+        </p:nvPicPr>
+        <p:blipFill>
+          <a:blip r:embed="rId2">
+            <a:extLst>
+              <a:ext uri="{28A0092B-C50C-407E-A947-70E740481C1C}">
+                <a14:useLocalDpi xmlns:a14="http://schemas.microsoft.com/office/drawing/2010/main" val="0"/>
+              </a:ext>
+              <a:ext uri="{96DAC541-7B7A-43D3-8B79-37D633B846F1}">
+                <asvg:svgBlip xmlns:asvg="http://schemas.microsoft.com/office/drawing/2016/SVG/main" r:embed="rId3"/>
+              </a:ext>
+            </a:extLst>
+          </a:blip>
+          <a:stretch>
+            <a:fillRect/>
+          </a:stretch>
+        </p:blipFill>
+        <p:spPr>
+          <a:xfrm>
+            <a:off x="935944" y="5317988"/>
+            <a:ext cx="914400" cy="914400"/>
+          </a:xfrm>
+          <a:prstGeom prst="rect">
+            <a:avLst/>
+          </a:prstGeom>
+        </p:spPr>
+      </p:pic>
+      <p:sp>
+        <p:nvSpPr>
+          <p:cNvPr id="20" name="Right Brace 19">
+            <a:extLst>
+              <a:ext uri="{FF2B5EF4-FFF2-40B4-BE49-F238E27FC236}">
+                <a16:creationId xmlns:a16="http://schemas.microsoft.com/office/drawing/2014/main" id="{C9EAEEF7-B43F-4DD9-B94C-99863F44B38E}"/>
+              </a:ext>
+            </a:extLst>
+          </p:cNvPr>
+          <p:cNvSpPr/>
+          <p:nvPr/>
+        </p:nvSpPr>
+        <p:spPr>
+          <a:xfrm rot="5400000">
+            <a:off x="5964999" y="2154527"/>
+            <a:ext cx="262002" cy="7798584"/>
+          </a:xfrm>
+          <a:prstGeom prst="rightBrace">
+            <a:avLst>
+              <a:gd name="adj1" fmla="val 182836"/>
+              <a:gd name="adj2" fmla="val 50000"/>
+            </a:avLst>
+          </a:prstGeom>
+          <a:ln w="19050"/>
+        </p:spPr>
+        <p:style>
+          <a:lnRef idx="1">
+            <a:schemeClr val="accent1"/>
+          </a:lnRef>
+          <a:fillRef idx="0">
+            <a:schemeClr val="accent1"/>
+          </a:fillRef>
+          <a:effectRef idx="0">
+            <a:schemeClr val="accent1"/>
+          </a:effectRef>
+          <a:fontRef idx="minor">
+            <a:schemeClr val="tx1"/>
+          </a:fontRef>
+        </p:style>
+        <p:txBody>
+          <a:bodyPr rtlCol="0" anchor="ctr"/>
+          <a:lstStyle/>
+          <a:p>
+            <a:pPr algn="ctr"/>
+            <a:endParaRPr lang="en-US"/>
+          </a:p>
+        </p:txBody>
+      </p:sp>
+      <p:sp>
+        <p:nvSpPr>
+          <p:cNvPr id="44" name="Right Brace 43">
+            <a:extLst>
+              <a:ext uri="{FF2B5EF4-FFF2-40B4-BE49-F238E27FC236}">
+                <a16:creationId xmlns:a16="http://schemas.microsoft.com/office/drawing/2014/main" id="{392D2B76-F0C9-4BA5-8AD8-A9C035F62B76}"/>
+              </a:ext>
+            </a:extLst>
+          </p:cNvPr>
+          <p:cNvSpPr/>
+          <p:nvPr/>
+        </p:nvSpPr>
+        <p:spPr>
+          <a:xfrm rot="16200000" flipV="1">
+            <a:off x="5149216" y="2353174"/>
+            <a:ext cx="197911" cy="6170675"/>
+          </a:xfrm>
+          <a:prstGeom prst="rightBrace">
+            <a:avLst>
+              <a:gd name="adj1" fmla="val 182836"/>
+              <a:gd name="adj2" fmla="val 50000"/>
+            </a:avLst>
+          </a:prstGeom>
+          <a:ln w="19050"/>
+        </p:spPr>
+        <p:style>
+          <a:lnRef idx="1">
+            <a:schemeClr val="accent1"/>
+          </a:lnRef>
+          <a:fillRef idx="0">
+            <a:schemeClr val="accent1"/>
+          </a:fillRef>
+          <a:effectRef idx="0">
+            <a:schemeClr val="accent1"/>
+          </a:effectRef>
+          <a:fontRef idx="minor">
+            <a:schemeClr val="tx1"/>
+          </a:fontRef>
+        </p:style>
+        <p:txBody>
+          <a:bodyPr rtlCol="0" anchor="ctr"/>
+          <a:lstStyle/>
+          <a:p>
+            <a:pPr algn="ctr"/>
+            <a:endParaRPr lang="en-US"/>
+          </a:p>
+        </p:txBody>
+      </p:sp>
+      <p:sp>
+        <p:nvSpPr>
+          <p:cNvPr id="21" name="TextBox 20">
+            <a:extLst>
+              <a:ext uri="{FF2B5EF4-FFF2-40B4-BE49-F238E27FC236}">
+                <a16:creationId xmlns:a16="http://schemas.microsoft.com/office/drawing/2014/main" id="{D8810F7C-4491-4B05-ABB1-4CD1F4120CDD}"/>
+              </a:ext>
+            </a:extLst>
+          </p:cNvPr>
+          <p:cNvSpPr txBox="1"/>
+          <p:nvPr/>
+        </p:nvSpPr>
+        <p:spPr>
+          <a:xfrm>
+            <a:off x="4528905" y="6068286"/>
+            <a:ext cx="3134191" cy="598882"/>
+          </a:xfrm>
+          <a:prstGeom prst="rect">
+            <a:avLst/>
+          </a:prstGeom>
+          <a:noFill/>
+        </p:spPr>
+        <p:txBody>
+          <a:bodyPr wrap="none" rtlCol="0">
+            <a:spAutoFit/>
+          </a:bodyPr>
+          <a:lstStyle/>
+          <a:p>
+            <a:pPr lvl="0" algn="ctr" eaLnBrk="0" fontAlgn="base" hangingPunct="0">
+              <a:lnSpc>
+                <a:spcPct val="150000"/>
+              </a:lnSpc>
+              <a:spcBef>
+                <a:spcPct val="0"/>
+              </a:spcBef>
+              <a:spcAft>
+                <a:spcPct val="0"/>
+              </a:spcAft>
+            </a:pPr>
+            <a:r>
+              <a:rPr lang="en-US" altLang="en-US" sz="2400" dirty="0" err="1">
+                <a:solidFill>
+                  <a:srgbClr val="0066FF"/>
+                </a:solidFill>
+                <a:latin typeface="Courier New" panose="02070309020205020404" pitchFamily="49" charset="0"/>
+                <a:cs typeface="Courier New" panose="02070309020205020404" pitchFamily="49" charset="0"/>
+              </a:rPr>
+              <a:t>LazyLongIterable</a:t>
+            </a:r>
+            <a:endParaRPr lang="en-US" altLang="en-US" sz="2400" dirty="0">
+              <a:solidFill>
+                <a:prstClr val="black"/>
+              </a:solidFill>
+              <a:latin typeface="Arial" panose="020B0604020202020204" pitchFamily="34" charset="0"/>
+            </a:endParaRPr>
+          </a:p>
+        </p:txBody>
+      </p:sp>
+      <p:sp>
+        <p:nvSpPr>
+          <p:cNvPr id="29" name="Rectangle 7">
+            <a:extLst>
+              <a:ext uri="{FF2B5EF4-FFF2-40B4-BE49-F238E27FC236}">
+                <a16:creationId xmlns:a16="http://schemas.microsoft.com/office/drawing/2014/main" id="{7364266F-0AD0-45F8-93EF-980072D11205}"/>
+              </a:ext>
+            </a:extLst>
+          </p:cNvPr>
+          <p:cNvSpPr>
+            <a:spLocks noChangeArrowheads="1"/>
+          </p:cNvSpPr>
+          <p:nvPr/>
+        </p:nvSpPr>
+        <p:spPr bwMode="auto">
+          <a:xfrm>
+            <a:off x="3255821" y="4712697"/>
+            <a:ext cx="3969327" cy="598882"/>
+          </a:xfrm>
+          <a:prstGeom prst="rect">
+            <a:avLst/>
+          </a:prstGeom>
+          <a:noFill/>
+          <a:ln>
+            <a:noFill/>
+          </a:ln>
+          <a:effectLst/>
+        </p:spPr>
+        <p:txBody>
+          <a:bodyPr vert="horz" wrap="square" lIns="91440" tIns="45720" rIns="91440" bIns="45720" numCol="1" anchor="ctr" anchorCtr="0" compatLnSpc="1">
+            <a:prstTxWarp prst="textNoShape">
+              <a:avLst/>
+            </a:prstTxWarp>
+            <a:spAutoFit/>
+          </a:bodyPr>
+          <a:lstStyle/>
+          <a:p>
+            <a:pPr marR="0" lvl="0" indent="0" algn="ctr" eaLnBrk="0" fontAlgn="base" hangingPunct="0">
+              <a:lnSpc>
+                <a:spcPct val="150000"/>
+              </a:lnSpc>
+              <a:spcBef>
+                <a:spcPct val="0"/>
+              </a:spcBef>
+              <a:spcAft>
+                <a:spcPct val="0"/>
+              </a:spcAft>
+              <a:buClrTx/>
+              <a:buSzTx/>
+              <a:buFontTx/>
+              <a:buNone/>
+              <a:tabLst/>
+            </a:pPr>
+            <a:r>
+              <a:rPr lang="en-US" altLang="en-US" sz="2400" dirty="0" err="1">
+                <a:solidFill>
+                  <a:srgbClr val="0066FF"/>
+                </a:solidFill>
+                <a:latin typeface="Courier New" panose="02070309020205020404" pitchFamily="49" charset="0"/>
+                <a:cs typeface="Courier New" panose="02070309020205020404" pitchFamily="49" charset="0"/>
+              </a:rPr>
+              <a:t>ImmutableLongStack</a:t>
+            </a:r>
+            <a:endParaRPr lang="en-US" altLang="en-US" sz="2400" dirty="0">
+              <a:solidFill>
+                <a:srgbClr val="0066FF"/>
+              </a:solidFill>
+              <a:latin typeface="Courier New" panose="02070309020205020404" pitchFamily="49" charset="0"/>
+              <a:cs typeface="Courier New" panose="02070309020205020404" pitchFamily="49" charset="0"/>
+            </a:endParaRPr>
+          </a:p>
+        </p:txBody>
+      </p:sp>
+    </p:spTree>
+    <p:extLst>
+      <p:ext uri="{BB962C8B-B14F-4D97-AF65-F5344CB8AC3E}">
+        <p14:creationId xmlns:p14="http://schemas.microsoft.com/office/powerpoint/2010/main" val="1859543340"/>
+      </p:ext>
+    </p:extLst>
+  </p:cSld>
+  <p:clrMapOvr>
+    <a:masterClrMapping/>
+  </p:clrMapOvr>
+</p:sld>
+</file>
+
+<file path=ppt/slides/slide5.xml><?xml version="1.0" encoding="utf-8"?>
+<p:sld xmlns:a="http://schemas.openxmlformats.org/drawingml/2006/main" xmlns:r="http://schemas.openxmlformats.org/officeDocument/2006/relationships" xmlns:p="http://schemas.openxmlformats.org/presentationml/2006/main">
+  <p:cSld>
+    <p:spTree>
+      <p:nvGrpSpPr>
+        <p:cNvPr id="1" name=""/>
+        <p:cNvGrpSpPr/>
+        <p:nvPr/>
+      </p:nvGrpSpPr>
+      <p:grpSpPr>
+        <a:xfrm>
+          <a:off x="0" y="0"/>
+          <a:ext cx="0" cy="0"/>
+          <a:chOff x="0" y="0"/>
+          <a:chExt cx="0" cy="0"/>
+        </a:xfrm>
+      </p:grpSpPr>
+      <p:sp>
+        <p:nvSpPr>
           <p:cNvPr id="2" name="Title 1">
             <a:extLst>
               <a:ext uri="{FF2B5EF4-FFF2-40B4-BE49-F238E27FC236}">
@@ -8171,7 +9988,7 @@
           <a:p>
             <a:fld id="{EF57339A-E29B-45C7-A4AA-9F67BACDCD80}" type="slidenum">
               <a:rPr lang="en-US" smtClean="0"/>
-              <a:t>4</a:t>
+              <a:t>5</a:t>
             </a:fld>
             <a:endParaRPr lang="en-US"/>
           </a:p>
@@ -8191,11 +10008,16 @@
         </p:nvGrpSpPr>
         <p:grpSpPr>
           <a:xfrm>
-            <a:off x="735223" y="1485995"/>
-            <a:ext cx="2485772" cy="4682663"/>
-            <a:chOff x="1046203" y="1400432"/>
-            <a:chExt cx="2603158" cy="4682663"/>
+            <a:off x="552432" y="1128886"/>
+            <a:ext cx="5543568" cy="2720903"/>
+            <a:chOff x="1046201" y="1400432"/>
+            <a:chExt cx="2603160" cy="2720903"/>
           </a:xfrm>
+          <a:solidFill>
+            <a:schemeClr val="bg1">
+              <a:lumMod val="95000"/>
+            </a:schemeClr>
+          </a:solidFill>
         </p:grpSpPr>
         <p:sp>
           <p:nvSpPr>
@@ -8217,9 +10039,7 @@
             <a:prstGeom prst="rect">
               <a:avLst/>
             </a:prstGeom>
-            <a:solidFill>
-              <a:schemeClr val="bg1"/>
-            </a:solidFill>
+            <a:grpFill/>
             <a:ln>
               <a:noFill/>
             </a:ln>
@@ -8269,15 +10089,13 @@
           </p:nvSpPr>
           <p:spPr>
             <a:xfrm>
-              <a:off x="1046203" y="2051222"/>
-              <a:ext cx="2603157" cy="4031873"/>
+              <a:off x="1046201" y="2059232"/>
+              <a:ext cx="2603157" cy="2062103"/>
             </a:xfrm>
             <a:prstGeom prst="rect">
               <a:avLst/>
             </a:prstGeom>
-            <a:solidFill>
-              <a:schemeClr val="bg1"/>
-            </a:solidFill>
+            <a:grpFill/>
             <a:ln>
               <a:noFill/>
             </a:ln>
@@ -8312,15 +10130,13 @@
                 </a:rPr>
                 <a:t>collect</a:t>
               </a:r>
-            </a:p>
-            <a:p>
               <a:r>
-                <a:rPr lang="en-US" sz="1600" dirty="0" err="1">
+                <a:rPr lang="en-US" sz="1600" b="1" dirty="0">
                   <a:solidFill>
-                    <a:schemeClr val="tx1"/>
+                    <a:srgbClr val="0066FF"/>
                   </a:solidFill>
                 </a:rPr>
-                <a:t>collectBoolean</a:t>
+                <a:t>[With]</a:t>
               </a:r>
               <a:endParaRPr lang="en-US" sz="1600" dirty="0">
                 <a:solidFill>
@@ -8330,63 +10146,37 @@
             </a:p>
             <a:p>
               <a:r>
-                <a:rPr lang="en-US" sz="1600" dirty="0" err="1">
+                <a:rPr lang="en-US" sz="1600" dirty="0">
                   <a:solidFill>
                     <a:schemeClr val="tx1"/>
                   </a:solidFill>
                 </a:rPr>
-                <a:t>collectByte</a:t>
+                <a:t>collect</a:t>
               </a:r>
-              <a:endParaRPr lang="en-US" sz="1600" dirty="0">
-                <a:solidFill>
-                  <a:schemeClr val="tx1"/>
-                </a:solidFill>
-              </a:endParaRPr>
-            </a:p>
-            <a:p>
               <a:r>
-                <a:rPr lang="en-US" sz="1600" dirty="0" err="1">
+                <a:rPr lang="en-US" sz="1600" b="1" dirty="0">
                   <a:solidFill>
-                    <a:schemeClr val="tx1"/>
+                    <a:srgbClr val="0066FF"/>
                   </a:solidFill>
                 </a:rPr>
-                <a:t>collectChar</a:t>
+                <a:t>[</a:t>
               </a:r>
-              <a:endParaRPr lang="en-US" sz="1600" dirty="0">
-                <a:solidFill>
-                  <a:schemeClr val="tx1"/>
-                </a:solidFill>
-              </a:endParaRPr>
-            </a:p>
-            <a:p>
               <a:r>
-                <a:rPr lang="en-US" sz="1600" dirty="0" err="1">
+                <a:rPr lang="en-US" sz="1600" b="1" dirty="0" err="1">
                   <a:solidFill>
-                    <a:schemeClr val="tx1"/>
+                    <a:srgbClr val="0066FF"/>
                   </a:solidFill>
                 </a:rPr>
-                <a:t>collectDouble</a:t>
+                <a:t>Boolean,Byte,Char,Double,Float,Int,Long,Short</a:t>
               </a:r>
-              <a:endParaRPr lang="en-US" sz="1600" dirty="0">
-                <a:solidFill>
-                  <a:schemeClr val="tx1"/>
-                </a:solidFill>
-              </a:endParaRPr>
-            </a:p>
-            <a:p>
               <a:r>
-                <a:rPr lang="en-US" sz="1600" dirty="0" err="1">
+                <a:rPr lang="en-US" sz="1600" b="1" dirty="0">
                   <a:solidFill>
-                    <a:schemeClr val="tx1"/>
+                    <a:srgbClr val="0066FF"/>
                   </a:solidFill>
                 </a:rPr>
-                <a:t>collectFloat</a:t>
+                <a:t>]</a:t>
               </a:r>
-              <a:endParaRPr lang="en-US" sz="1600" dirty="0">
-                <a:solidFill>
-                  <a:schemeClr val="tx1"/>
-                </a:solidFill>
-              </a:endParaRPr>
             </a:p>
             <a:p>
               <a:r>
@@ -8396,21 +10186,6 @@
                   </a:solidFill>
                 </a:rPr>
                 <a:t>collectIf</a:t>
-              </a:r>
-              <a:endParaRPr lang="en-US" sz="1600" dirty="0">
-                <a:solidFill>
-                  <a:schemeClr val="tx1"/>
-                </a:solidFill>
-              </a:endParaRPr>
-            </a:p>
-            <a:p>
-              <a:r>
-                <a:rPr lang="en-US" sz="1600" dirty="0" err="1">
-                  <a:solidFill>
-                    <a:schemeClr val="tx1"/>
-                  </a:solidFill>
-                </a:rPr>
-                <a:t>collectInt</a:t>
               </a:r>
               <a:endParaRPr lang="en-US" sz="1600" dirty="0">
                 <a:solidFill>
@@ -8440,52 +10215,7 @@
                     <a:schemeClr val="tx1"/>
                   </a:solidFill>
                 </a:rPr>
-                <a:t>collectLong</a:t>
-              </a:r>
-              <a:endParaRPr lang="en-US" sz="1600" dirty="0">
-                <a:solidFill>
-                  <a:schemeClr val="tx1"/>
-                </a:solidFill>
-              </a:endParaRPr>
-            </a:p>
-            <a:p>
-              <a:r>
-                <a:rPr lang="en-US" sz="1600" dirty="0" err="1">
-                  <a:solidFill>
-                    <a:schemeClr val="tx1"/>
-                  </a:solidFill>
-                </a:rPr>
-                <a:t>collectShort</a:t>
-              </a:r>
-              <a:endParaRPr lang="en-US" sz="1600" dirty="0">
-                <a:solidFill>
-                  <a:schemeClr val="tx1"/>
-                </a:solidFill>
-              </a:endParaRPr>
-            </a:p>
-            <a:p>
-              <a:r>
-                <a:rPr lang="en-US" sz="1600" dirty="0" err="1">
-                  <a:solidFill>
-                    <a:schemeClr val="tx1"/>
-                  </a:solidFill>
-                </a:rPr>
                 <a:t>collectValues</a:t>
-              </a:r>
-              <a:endParaRPr lang="en-US" sz="1600" dirty="0">
-                <a:solidFill>
-                  <a:schemeClr val="tx1"/>
-                </a:solidFill>
-              </a:endParaRPr>
-            </a:p>
-            <a:p>
-              <a:r>
-                <a:rPr lang="en-US" sz="1600" dirty="0" err="1">
-                  <a:solidFill>
-                    <a:schemeClr val="tx1"/>
-                  </a:solidFill>
-                </a:rPr>
-                <a:t>collectWith</a:t>
               </a:r>
               <a:endParaRPr lang="en-US" sz="1600" dirty="0">
                 <a:solidFill>
@@ -8560,6 +10290,7 @@
             <a:prstGeom prst="line">
               <a:avLst/>
             </a:prstGeom>
+            <a:grpFill/>
             <a:ln w="28575">
               <a:solidFill>
                 <a:schemeClr val="tx1"/>
@@ -8596,11 +10327,17 @@
         </p:nvGrpSpPr>
         <p:grpSpPr>
           <a:xfrm>
-            <a:off x="3507255" y="1186952"/>
+            <a:off x="521347" y="4100167"/>
             <a:ext cx="2028571" cy="1990992"/>
             <a:chOff x="1046202" y="1400432"/>
             <a:chExt cx="2603159" cy="1990992"/>
           </a:xfrm>
+          <a:solidFill>
+            <a:schemeClr val="accent5">
+              <a:lumMod val="20000"/>
+              <a:lumOff val="80000"/>
+            </a:schemeClr>
+          </a:solidFill>
         </p:grpSpPr>
         <p:sp>
           <p:nvSpPr>
@@ -8622,9 +10359,7 @@
             <a:prstGeom prst="rect">
               <a:avLst/>
             </a:prstGeom>
-            <a:solidFill>
-              <a:schemeClr val="bg1"/>
-            </a:solidFill>
+            <a:grpFill/>
             <a:ln>
               <a:noFill/>
             </a:ln>
@@ -8680,9 +10415,7 @@
             <a:prstGeom prst="rect">
               <a:avLst/>
             </a:prstGeom>
-            <a:solidFill>
-              <a:schemeClr val="bg1"/>
-            </a:solidFill>
+            <a:grpFill/>
             <a:ln>
               <a:noFill/>
             </a:ln>
@@ -8805,6 +10538,7 @@
             <a:prstGeom prst="line">
               <a:avLst/>
             </a:prstGeom>
+            <a:grpFill/>
             <a:ln w="28575">
               <a:solidFill>
                 <a:schemeClr val="tx1"/>
@@ -8841,11 +10575,17 @@
         </p:nvGrpSpPr>
         <p:grpSpPr>
           <a:xfrm>
-            <a:off x="6288554" y="1135133"/>
-            <a:ext cx="2603159" cy="5415107"/>
-            <a:chOff x="1046202" y="1400432"/>
-            <a:chExt cx="2603159" cy="5415107"/>
+            <a:off x="7096362" y="1269359"/>
+            <a:ext cx="1968760" cy="4186991"/>
+            <a:chOff x="1046196" y="1400432"/>
+            <a:chExt cx="2603165" cy="4186991"/>
           </a:xfrm>
+          <a:solidFill>
+            <a:schemeClr val="accent2">
+              <a:lumMod val="20000"/>
+              <a:lumOff val="80000"/>
+            </a:schemeClr>
+          </a:solidFill>
         </p:grpSpPr>
         <p:sp>
           <p:nvSpPr>
@@ -8867,9 +10607,7 @@
             <a:prstGeom prst="rect">
               <a:avLst/>
             </a:prstGeom>
-            <a:solidFill>
-              <a:schemeClr val="bg1"/>
-            </a:solidFill>
+            <a:grpFill/>
             <a:ln>
               <a:noFill/>
             </a:ln>
@@ -8919,15 +10657,13 @@
           </p:nvSpPr>
           <p:spPr>
             <a:xfrm>
-              <a:off x="1046202" y="2045002"/>
-              <a:ext cx="2603157" cy="4770537"/>
+              <a:off x="1046196" y="2047993"/>
+              <a:ext cx="2603157" cy="3539430"/>
             </a:xfrm>
             <a:prstGeom prst="rect">
               <a:avLst/>
             </a:prstGeom>
-            <a:solidFill>
-              <a:schemeClr val="bg1"/>
-            </a:solidFill>
+            <a:grpFill/>
             <a:ln>
               <a:noFill/>
             </a:ln>
@@ -9005,21 +10741,6 @@
                     <a:schemeClr val="tx1"/>
                   </a:solidFill>
                 </a:rPr>
-                <a:t>toIntArray</a:t>
-              </a:r>
-              <a:endParaRPr lang="en-US" sz="1600" dirty="0">
-                <a:solidFill>
-                  <a:schemeClr val="tx1"/>
-                </a:solidFill>
-              </a:endParaRPr>
-            </a:p>
-            <a:p>
-              <a:r>
-                <a:rPr lang="en-US" sz="1600" dirty="0" err="1">
-                  <a:solidFill>
-                    <a:schemeClr val="tx1"/>
-                  </a:solidFill>
-                </a:rPr>
                 <a:t>toList</a:t>
               </a:r>
               <a:endParaRPr lang="en-US" sz="1600" dirty="0">
@@ -9036,51 +10757,6 @@
                   </a:solidFill>
                 </a:rPr>
                 <a:t>toMap</a:t>
-              </a:r>
-              <a:endParaRPr lang="en-US" sz="1600" dirty="0">
-                <a:solidFill>
-                  <a:schemeClr val="tx1"/>
-                </a:solidFill>
-              </a:endParaRPr>
-            </a:p>
-            <a:p>
-              <a:r>
-                <a:rPr lang="en-US" sz="1600" dirty="0" err="1">
-                  <a:solidFill>
-                    <a:schemeClr val="tx1"/>
-                  </a:solidFill>
-                </a:rPr>
-                <a:t>toMapOfItemToCount</a:t>
-              </a:r>
-              <a:endParaRPr lang="en-US" sz="1600" dirty="0">
-                <a:solidFill>
-                  <a:schemeClr val="tx1"/>
-                </a:solidFill>
-              </a:endParaRPr>
-            </a:p>
-            <a:p>
-              <a:r>
-                <a:rPr lang="en-US" sz="1600" dirty="0" err="1">
-                  <a:solidFill>
-                    <a:schemeClr val="tx1"/>
-                  </a:solidFill>
-                </a:rPr>
-                <a:t>toReverseArray</a:t>
-              </a:r>
-              <a:endParaRPr lang="en-US" sz="1600" dirty="0">
-                <a:solidFill>
-                  <a:schemeClr val="tx1"/>
-                </a:solidFill>
-              </a:endParaRPr>
-            </a:p>
-            <a:p>
-              <a:r>
-                <a:rPr lang="en-US" sz="1600" dirty="0" err="1">
-                  <a:solidFill>
-                    <a:schemeClr val="tx1"/>
-                  </a:solidFill>
-                </a:rPr>
-                <a:t>toReverseList</a:t>
               </a:r>
               <a:endParaRPr lang="en-US" sz="1600" dirty="0">
                 <a:solidFill>
@@ -9242,21 +10918,6 @@
                 </a:solidFill>
               </a:endParaRPr>
             </a:p>
-            <a:p>
-              <a:r>
-                <a:rPr lang="en-US" sz="1600" dirty="0" err="1">
-                  <a:solidFill>
-                    <a:schemeClr val="tx1"/>
-                  </a:solidFill>
-                </a:rPr>
-                <a:t>toStringOfItemToCount</a:t>
-              </a:r>
-              <a:endParaRPr lang="en-US" sz="1600" dirty="0">
-                <a:solidFill>
-                  <a:schemeClr val="tx1"/>
-                </a:solidFill>
-              </a:endParaRPr>
-            </a:p>
           </p:txBody>
         </p:sp>
         <p:cxnSp>
@@ -9268,7 +10929,9 @@
                 </a:ext>
               </a:extLst>
             </p:cNvPr>
-            <p:cNvCxnSpPr/>
+            <p:cNvCxnSpPr>
+              <a:cxnSpLocks/>
+            </p:cNvCxnSpPr>
             <p:nvPr/>
           </p:nvCxnSpPr>
           <p:spPr>
@@ -9279,6 +10942,7 @@
             <a:prstGeom prst="line">
               <a:avLst/>
             </a:prstGeom>
+            <a:grpFill/>
             <a:ln w="28575">
               <a:solidFill>
                 <a:schemeClr val="tx1"/>
@@ -9315,11 +10979,17 @@
         </p:nvGrpSpPr>
         <p:grpSpPr>
           <a:xfrm>
-            <a:off x="9037936" y="1485670"/>
-            <a:ext cx="2603158" cy="2223409"/>
+            <a:off x="9251088" y="1591525"/>
+            <a:ext cx="2241721" cy="2223409"/>
             <a:chOff x="1046201" y="1400432"/>
             <a:chExt cx="2603160" cy="2223409"/>
           </a:xfrm>
+          <a:solidFill>
+            <a:schemeClr val="accent1">
+              <a:lumMod val="20000"/>
+              <a:lumOff val="80000"/>
+            </a:schemeClr>
+          </a:solidFill>
         </p:grpSpPr>
         <p:sp>
           <p:nvSpPr>
@@ -9341,9 +11011,7 @@
             <a:prstGeom prst="rect">
               <a:avLst/>
             </a:prstGeom>
-            <a:solidFill>
-              <a:schemeClr val="bg1"/>
-            </a:solidFill>
+            <a:grpFill/>
             <a:ln>
               <a:noFill/>
             </a:ln>
@@ -9399,9 +11067,7 @@
             <a:prstGeom prst="rect">
               <a:avLst/>
             </a:prstGeom>
-            <a:solidFill>
-              <a:schemeClr val="bg1"/>
-            </a:solidFill>
+            <a:grpFill/>
             <a:ln>
               <a:noFill/>
             </a:ln>
@@ -9558,311 +11224,7 @@
             <a:prstGeom prst="line">
               <a:avLst/>
             </a:prstGeom>
-            <a:ln w="28575">
-              <a:solidFill>
-                <a:schemeClr val="tx1"/>
-              </a:solidFill>
-            </a:ln>
-          </p:spPr>
-          <p:style>
-            <a:lnRef idx="1">
-              <a:schemeClr val="accent1"/>
-            </a:lnRef>
-            <a:fillRef idx="0">
-              <a:schemeClr val="accent1"/>
-            </a:fillRef>
-            <a:effectRef idx="0">
-              <a:schemeClr val="accent1"/>
-            </a:effectRef>
-            <a:fontRef idx="minor">
-              <a:schemeClr val="tx1"/>
-            </a:fontRef>
-          </p:style>
-        </p:cxnSp>
-      </p:grpSp>
-      <p:grpSp>
-        <p:nvGrpSpPr>
-          <p:cNvPr id="25" name="Group 24">
-            <a:extLst>
-              <a:ext uri="{FF2B5EF4-FFF2-40B4-BE49-F238E27FC236}">
-                <a16:creationId xmlns:a16="http://schemas.microsoft.com/office/drawing/2014/main" id="{B362EF4A-7AD5-418E-B151-161BCFE564DD}"/>
-              </a:ext>
-            </a:extLst>
-          </p:cNvPr>
-          <p:cNvGrpSpPr/>
-          <p:nvPr/>
-        </p:nvGrpSpPr>
-        <p:grpSpPr>
-          <a:xfrm>
-            <a:off x="3641125" y="3383684"/>
-            <a:ext cx="2454875" cy="2975878"/>
-            <a:chOff x="1046203" y="1400432"/>
-            <a:chExt cx="2603158" cy="2975878"/>
-          </a:xfrm>
-        </p:grpSpPr>
-        <p:sp>
-          <p:nvSpPr>
-            <p:cNvPr id="26" name="Rectangle 25">
-              <a:extLst>
-                <a:ext uri="{FF2B5EF4-FFF2-40B4-BE49-F238E27FC236}">
-                  <a16:creationId xmlns:a16="http://schemas.microsoft.com/office/drawing/2014/main" id="{DE105EB8-BCD6-46BB-AF46-928526B86809}"/>
-                </a:ext>
-              </a:extLst>
-            </p:cNvPr>
-            <p:cNvSpPr/>
-            <p:nvPr/>
-          </p:nvSpPr>
-          <p:spPr>
-            <a:xfrm>
-              <a:off x="1046204" y="1400432"/>
-              <a:ext cx="2603157" cy="650790"/>
-            </a:xfrm>
-            <a:prstGeom prst="rect">
-              <a:avLst/>
-            </a:prstGeom>
-            <a:solidFill>
-              <a:schemeClr val="bg1"/>
-            </a:solidFill>
-            <a:ln>
-              <a:noFill/>
-            </a:ln>
-          </p:spPr>
-          <p:style>
-            <a:lnRef idx="2">
-              <a:schemeClr val="accent1">
-                <a:shade val="50000"/>
-              </a:schemeClr>
-            </a:lnRef>
-            <a:fillRef idx="1">
-              <a:schemeClr val="accent1"/>
-            </a:fillRef>
-            <a:effectRef idx="0">
-              <a:schemeClr val="accent1"/>
-            </a:effectRef>
-            <a:fontRef idx="minor">
-              <a:schemeClr val="lt1"/>
-            </a:fontRef>
-          </p:style>
-          <p:txBody>
-            <a:bodyPr rtlCol="0" anchor="ctr"/>
-            <a:lstStyle/>
-            <a:p>
-              <a:r>
-                <a:rPr lang="en-US" sz="3200" dirty="0">
-                  <a:solidFill>
-                    <a:schemeClr val="tx1"/>
-                  </a:solidFill>
-                </a:rPr>
-                <a:t>group</a:t>
-              </a:r>
-            </a:p>
-          </p:txBody>
-        </p:sp>
-        <p:sp>
-          <p:nvSpPr>
-            <p:cNvPr id="27" name="Rectangle 26">
-              <a:extLst>
-                <a:ext uri="{FF2B5EF4-FFF2-40B4-BE49-F238E27FC236}">
-                  <a16:creationId xmlns:a16="http://schemas.microsoft.com/office/drawing/2014/main" id="{5749EEC1-8935-4ED1-9AFF-DC0BDBCE271D}"/>
-                </a:ext>
-              </a:extLst>
-            </p:cNvPr>
-            <p:cNvSpPr/>
-            <p:nvPr/>
-          </p:nvSpPr>
-          <p:spPr>
-            <a:xfrm>
-              <a:off x="1046203" y="2067986"/>
-              <a:ext cx="2603157" cy="2308324"/>
-            </a:xfrm>
-            <a:prstGeom prst="rect">
-              <a:avLst/>
-            </a:prstGeom>
-            <a:solidFill>
-              <a:schemeClr val="bg1"/>
-            </a:solidFill>
-            <a:ln>
-              <a:noFill/>
-            </a:ln>
-          </p:spPr>
-          <p:style>
-            <a:lnRef idx="2">
-              <a:schemeClr val="accent1">
-                <a:shade val="50000"/>
-              </a:schemeClr>
-            </a:lnRef>
-            <a:fillRef idx="1">
-              <a:schemeClr val="accent1"/>
-            </a:fillRef>
-            <a:effectRef idx="0">
-              <a:schemeClr val="accent1"/>
-            </a:effectRef>
-            <a:fontRef idx="minor">
-              <a:schemeClr val="lt1"/>
-            </a:fontRef>
-          </p:style>
-          <p:txBody>
-            <a:bodyPr rtlCol="0" anchor="ctr">
-              <a:spAutoFit/>
-            </a:bodyPr>
-            <a:lstStyle/>
-            <a:p>
-              <a:r>
-                <a:rPr lang="en-US" sz="1600" dirty="0" err="1">
-                  <a:solidFill>
-                    <a:schemeClr val="tx1"/>
-                  </a:solidFill>
-                </a:rPr>
-                <a:t>groupBy</a:t>
-              </a:r>
-              <a:endParaRPr lang="en-US" sz="1600" dirty="0">
-                <a:solidFill>
-                  <a:schemeClr val="tx1"/>
-                </a:solidFill>
-              </a:endParaRPr>
-            </a:p>
-            <a:p>
-              <a:r>
-                <a:rPr lang="en-US" sz="1600" dirty="0" err="1">
-                  <a:solidFill>
-                    <a:schemeClr val="tx1"/>
-                  </a:solidFill>
-                </a:rPr>
-                <a:t>groupByEach</a:t>
-              </a:r>
-              <a:endParaRPr lang="en-US" sz="1600" dirty="0">
-                <a:solidFill>
-                  <a:schemeClr val="tx1"/>
-                </a:solidFill>
-              </a:endParaRPr>
-            </a:p>
-            <a:p>
-              <a:r>
-                <a:rPr lang="en-US" sz="1600" dirty="0" err="1">
-                  <a:solidFill>
-                    <a:schemeClr val="tx1"/>
-                  </a:solidFill>
-                </a:rPr>
-                <a:t>groupByUniqueKey</a:t>
-              </a:r>
-              <a:endParaRPr lang="en-US" sz="1600" dirty="0">
-                <a:solidFill>
-                  <a:schemeClr val="tx1"/>
-                </a:solidFill>
-              </a:endParaRPr>
-            </a:p>
-            <a:p>
-              <a:r>
-                <a:rPr lang="en-US" sz="1600" dirty="0" err="1">
-                  <a:solidFill>
-                    <a:schemeClr val="tx1"/>
-                  </a:solidFill>
-                </a:rPr>
-                <a:t>sumByDouble</a:t>
-              </a:r>
-              <a:endParaRPr lang="en-US" sz="1600" dirty="0">
-                <a:solidFill>
-                  <a:schemeClr val="tx1"/>
-                </a:solidFill>
-              </a:endParaRPr>
-            </a:p>
-            <a:p>
-              <a:r>
-                <a:rPr lang="en-US" sz="1600" dirty="0" err="1">
-                  <a:solidFill>
-                    <a:schemeClr val="tx1"/>
-                  </a:solidFill>
-                </a:rPr>
-                <a:t>sumByFloat</a:t>
-              </a:r>
-              <a:endParaRPr lang="en-US" sz="1600" dirty="0">
-                <a:solidFill>
-                  <a:schemeClr val="tx1"/>
-                </a:solidFill>
-              </a:endParaRPr>
-            </a:p>
-            <a:p>
-              <a:r>
-                <a:rPr lang="en-US" sz="1600" dirty="0" err="1">
-                  <a:solidFill>
-                    <a:schemeClr val="tx1"/>
-                  </a:solidFill>
-                </a:rPr>
-                <a:t>sumByInt</a:t>
-              </a:r>
-              <a:endParaRPr lang="en-US" sz="1600" dirty="0">
-                <a:solidFill>
-                  <a:schemeClr val="tx1"/>
-                </a:solidFill>
-              </a:endParaRPr>
-            </a:p>
-            <a:p>
-              <a:r>
-                <a:rPr lang="en-US" sz="1600" dirty="0" err="1">
-                  <a:solidFill>
-                    <a:schemeClr val="tx1"/>
-                  </a:solidFill>
-                </a:rPr>
-                <a:t>sumByLong</a:t>
-              </a:r>
-              <a:endParaRPr lang="en-US" sz="1600" dirty="0">
-                <a:solidFill>
-                  <a:schemeClr val="tx1"/>
-                </a:solidFill>
-              </a:endParaRPr>
-            </a:p>
-            <a:p>
-              <a:r>
-                <a:rPr lang="en-US" sz="1600" dirty="0" err="1">
-                  <a:solidFill>
-                    <a:schemeClr val="tx1"/>
-                  </a:solidFill>
-                </a:rPr>
-                <a:t>aggregateBy</a:t>
-              </a:r>
-              <a:endParaRPr lang="en-US" sz="1600" dirty="0">
-                <a:solidFill>
-                  <a:schemeClr val="tx1"/>
-                </a:solidFill>
-              </a:endParaRPr>
-            </a:p>
-            <a:p>
-              <a:r>
-                <a:rPr lang="en-US" sz="1600" dirty="0" err="1">
-                  <a:solidFill>
-                    <a:schemeClr val="tx1"/>
-                  </a:solidFill>
-                </a:rPr>
-                <a:t>aggregateInPlaceBy</a:t>
-              </a:r>
-              <a:endParaRPr lang="en-US" sz="1600" dirty="0">
-                <a:solidFill>
-                  <a:schemeClr val="tx1"/>
-                </a:solidFill>
-              </a:endParaRPr>
-            </a:p>
-          </p:txBody>
-        </p:sp>
-        <p:cxnSp>
-          <p:nvCxnSpPr>
-            <p:cNvPr id="28" name="Straight Connector 27">
-              <a:extLst>
-                <a:ext uri="{FF2B5EF4-FFF2-40B4-BE49-F238E27FC236}">
-                  <a16:creationId xmlns:a16="http://schemas.microsoft.com/office/drawing/2014/main" id="{892B75A8-46F0-4B64-9C7F-50B5DC0F50A1}"/>
-                </a:ext>
-              </a:extLst>
-            </p:cNvPr>
-            <p:cNvCxnSpPr/>
-            <p:nvPr/>
-          </p:nvCxnSpPr>
-          <p:spPr>
-            <a:xfrm>
-              <a:off x="1046203" y="2051222"/>
-              <a:ext cx="2603157" cy="0"/>
-            </a:xfrm>
-            <a:prstGeom prst="line">
-              <a:avLst/>
-            </a:prstGeom>
+            <a:grpFill/>
             <a:ln w="28575">
               <a:solidFill>
                 <a:schemeClr val="tx1"/>
@@ -9899,11 +11261,14 @@
         </p:nvGrpSpPr>
         <p:grpSpPr>
           <a:xfrm>
-            <a:off x="9251088" y="4182002"/>
+            <a:off x="8927706" y="4369182"/>
             <a:ext cx="2028573" cy="1986656"/>
             <a:chOff x="1046199" y="1400432"/>
             <a:chExt cx="2603162" cy="1986656"/>
           </a:xfrm>
+          <a:solidFill>
+            <a:srgbClr val="FFF1E1"/>
+          </a:solidFill>
         </p:grpSpPr>
         <p:sp>
           <p:nvSpPr>
@@ -9925,11 +11290,11 @@
             <a:prstGeom prst="rect">
               <a:avLst/>
             </a:prstGeom>
-            <a:solidFill>
-              <a:schemeClr val="bg1"/>
-            </a:solidFill>
+            <a:grpFill/>
             <a:ln>
-              <a:noFill/>
+              <a:solidFill>
+                <a:schemeClr val="bg1"/>
+              </a:solidFill>
             </a:ln>
           </p:spPr>
           <p:style>
@@ -9983,11 +11348,11 @@
             <a:prstGeom prst="rect">
               <a:avLst/>
             </a:prstGeom>
-            <a:solidFill>
-              <a:schemeClr val="bg1"/>
-            </a:solidFill>
+            <a:grpFill/>
             <a:ln>
-              <a:noFill/>
+              <a:solidFill>
+                <a:schemeClr val="bg1"/>
+              </a:solidFill>
             </a:ln>
           </p:spPr>
           <p:style>
@@ -10132,6 +11497,615 @@
             <a:prstGeom prst="line">
               <a:avLst/>
             </a:prstGeom>
+            <a:grpFill/>
+            <a:ln w="28575">
+              <a:solidFill>
+                <a:schemeClr val="tx1"/>
+              </a:solidFill>
+            </a:ln>
+          </p:spPr>
+          <p:style>
+            <a:lnRef idx="1">
+              <a:schemeClr val="accent1"/>
+            </a:lnRef>
+            <a:fillRef idx="0">
+              <a:schemeClr val="accent1"/>
+            </a:fillRef>
+            <a:effectRef idx="0">
+              <a:schemeClr val="accent1"/>
+            </a:effectRef>
+            <a:fontRef idx="minor">
+              <a:schemeClr val="tx1"/>
+            </a:fontRef>
+          </p:style>
+        </p:cxnSp>
+      </p:grpSp>
+      <p:grpSp>
+        <p:nvGrpSpPr>
+          <p:cNvPr id="33" name="Group 32">
+            <a:extLst>
+              <a:ext uri="{FF2B5EF4-FFF2-40B4-BE49-F238E27FC236}">
+                <a16:creationId xmlns:a16="http://schemas.microsoft.com/office/drawing/2014/main" id="{A88B32D4-7806-4710-91E4-62E38FA6028B}"/>
+              </a:ext>
+            </a:extLst>
+          </p:cNvPr>
+          <p:cNvGrpSpPr/>
+          <p:nvPr/>
+        </p:nvGrpSpPr>
+        <p:grpSpPr>
+          <a:xfrm>
+            <a:off x="2378424" y="4586862"/>
+            <a:ext cx="2214036" cy="1974228"/>
+            <a:chOff x="1046201" y="1400432"/>
+            <a:chExt cx="2603160" cy="1974228"/>
+          </a:xfrm>
+          <a:solidFill>
+            <a:schemeClr val="accent4">
+              <a:lumMod val="20000"/>
+              <a:lumOff val="80000"/>
+            </a:schemeClr>
+          </a:solidFill>
+        </p:grpSpPr>
+        <p:sp>
+          <p:nvSpPr>
+            <p:cNvPr id="34" name="Rectangle 33">
+              <a:extLst>
+                <a:ext uri="{FF2B5EF4-FFF2-40B4-BE49-F238E27FC236}">
+                  <a16:creationId xmlns:a16="http://schemas.microsoft.com/office/drawing/2014/main" id="{5868906E-1653-4A08-9017-2667B467A52A}"/>
+                </a:ext>
+              </a:extLst>
+            </p:cNvPr>
+            <p:cNvSpPr/>
+            <p:nvPr/>
+          </p:nvSpPr>
+          <p:spPr>
+            <a:xfrm>
+              <a:off x="1046204" y="1400432"/>
+              <a:ext cx="2603157" cy="650790"/>
+            </a:xfrm>
+            <a:prstGeom prst="rect">
+              <a:avLst/>
+            </a:prstGeom>
+            <a:grpFill/>
+            <a:ln>
+              <a:solidFill>
+                <a:schemeClr val="bg1"/>
+              </a:solidFill>
+            </a:ln>
+          </p:spPr>
+          <p:style>
+            <a:lnRef idx="2">
+              <a:schemeClr val="accent1">
+                <a:shade val="50000"/>
+              </a:schemeClr>
+            </a:lnRef>
+            <a:fillRef idx="1">
+              <a:schemeClr val="accent1"/>
+            </a:fillRef>
+            <a:effectRef idx="0">
+              <a:schemeClr val="accent1"/>
+            </a:effectRef>
+            <a:fontRef idx="minor">
+              <a:schemeClr val="lt1"/>
+            </a:fontRef>
+          </p:style>
+          <p:txBody>
+            <a:bodyPr rtlCol="0" anchor="ctr"/>
+            <a:lstStyle/>
+            <a:p>
+              <a:r>
+                <a:rPr lang="en-US" sz="3200" dirty="0">
+                  <a:solidFill>
+                    <a:schemeClr val="tx1"/>
+                  </a:solidFill>
+                </a:rPr>
+                <a:t>find</a:t>
+              </a:r>
+            </a:p>
+          </p:txBody>
+        </p:sp>
+        <p:sp>
+          <p:nvSpPr>
+            <p:cNvPr id="35" name="Rectangle 34">
+              <a:extLst>
+                <a:ext uri="{FF2B5EF4-FFF2-40B4-BE49-F238E27FC236}">
+                  <a16:creationId xmlns:a16="http://schemas.microsoft.com/office/drawing/2014/main" id="{D21F5A6B-D78D-4EC8-9FA7-05ECC180FDAF}"/>
+                </a:ext>
+              </a:extLst>
+            </p:cNvPr>
+            <p:cNvSpPr/>
+            <p:nvPr/>
+          </p:nvSpPr>
+          <p:spPr>
+            <a:xfrm>
+              <a:off x="1046201" y="2051221"/>
+              <a:ext cx="2603157" cy="1323439"/>
+            </a:xfrm>
+            <a:prstGeom prst="rect">
+              <a:avLst/>
+            </a:prstGeom>
+            <a:grpFill/>
+            <a:ln>
+              <a:solidFill>
+                <a:schemeClr val="bg1"/>
+              </a:solidFill>
+            </a:ln>
+          </p:spPr>
+          <p:style>
+            <a:lnRef idx="2">
+              <a:schemeClr val="accent1">
+                <a:shade val="50000"/>
+              </a:schemeClr>
+            </a:lnRef>
+            <a:fillRef idx="1">
+              <a:schemeClr val="accent1"/>
+            </a:fillRef>
+            <a:effectRef idx="0">
+              <a:schemeClr val="accent1"/>
+            </a:effectRef>
+            <a:fontRef idx="minor">
+              <a:schemeClr val="lt1"/>
+            </a:fontRef>
+          </p:style>
+          <p:txBody>
+            <a:bodyPr rtlCol="0" anchor="ctr">
+              <a:spAutoFit/>
+            </a:bodyPr>
+            <a:lstStyle/>
+            <a:p>
+              <a:r>
+                <a:rPr lang="en-US" sz="1600" dirty="0">
+                  <a:solidFill>
+                    <a:schemeClr val="tx1"/>
+                  </a:solidFill>
+                </a:rPr>
+                <a:t>detect</a:t>
+              </a:r>
+              <a:r>
+                <a:rPr lang="en-US" sz="1600" b="1" dirty="0">
+                  <a:solidFill>
+                    <a:srgbClr val="0066FF"/>
+                  </a:solidFill>
+                </a:rPr>
+                <a:t>[With]</a:t>
+              </a:r>
+            </a:p>
+            <a:p>
+              <a:r>
+                <a:rPr lang="en-US" sz="1600" dirty="0">
+                  <a:solidFill>
+                    <a:schemeClr val="tx1"/>
+                  </a:solidFill>
+                </a:rPr>
+                <a:t>detect</a:t>
+              </a:r>
+              <a:r>
+                <a:rPr lang="en-US" sz="1600" b="1" dirty="0">
+                  <a:solidFill>
+                    <a:srgbClr val="0066FF"/>
+                  </a:solidFill>
+                </a:rPr>
+                <a:t>[With]</a:t>
+              </a:r>
+              <a:r>
+                <a:rPr lang="en-US" sz="1600" dirty="0" err="1">
+                  <a:solidFill>
+                    <a:schemeClr val="tx1"/>
+                  </a:solidFill>
+                </a:rPr>
+                <a:t>IfNone</a:t>
+              </a:r>
+              <a:endParaRPr lang="en-US" sz="1600" dirty="0">
+                <a:solidFill>
+                  <a:schemeClr val="tx1"/>
+                </a:solidFill>
+              </a:endParaRPr>
+            </a:p>
+            <a:p>
+              <a:r>
+                <a:rPr lang="en-US" sz="1600" dirty="0">
+                  <a:solidFill>
+                    <a:schemeClr val="tx1"/>
+                  </a:solidFill>
+                </a:rPr>
+                <a:t>detect</a:t>
+              </a:r>
+              <a:r>
+                <a:rPr lang="en-US" sz="1600" b="1" dirty="0">
+                  <a:solidFill>
+                    <a:srgbClr val="0066FF"/>
+                  </a:solidFill>
+                </a:rPr>
+                <a:t>[With]</a:t>
+              </a:r>
+              <a:r>
+                <a:rPr lang="en-US" sz="1600" dirty="0">
+                  <a:solidFill>
+                    <a:schemeClr val="tx1"/>
+                  </a:solidFill>
+                </a:rPr>
+                <a:t>Optional</a:t>
+              </a:r>
+            </a:p>
+            <a:p>
+              <a:r>
+                <a:rPr lang="en-US" sz="1600" dirty="0">
+                  <a:solidFill>
+                    <a:schemeClr val="tx1"/>
+                  </a:solidFill>
+                </a:rPr>
+                <a:t>max</a:t>
+              </a:r>
+              <a:r>
+                <a:rPr lang="en-US" sz="1600" b="1" dirty="0">
+                  <a:solidFill>
+                    <a:srgbClr val="0066FF"/>
+                  </a:solidFill>
+                </a:rPr>
+                <a:t>[By]</a:t>
+              </a:r>
+            </a:p>
+            <a:p>
+              <a:r>
+                <a:rPr lang="en-US" sz="1600" dirty="0">
+                  <a:solidFill>
+                    <a:schemeClr val="tx1"/>
+                  </a:solidFill>
+                </a:rPr>
+                <a:t>min</a:t>
+              </a:r>
+              <a:r>
+                <a:rPr lang="en-US" sz="1600" b="1" dirty="0">
+                  <a:solidFill>
+                    <a:srgbClr val="0066FF"/>
+                  </a:solidFill>
+                </a:rPr>
+                <a:t>[By]</a:t>
+              </a:r>
+            </a:p>
+          </p:txBody>
+        </p:sp>
+        <p:cxnSp>
+          <p:nvCxnSpPr>
+            <p:cNvPr id="36" name="Straight Connector 35">
+              <a:extLst>
+                <a:ext uri="{FF2B5EF4-FFF2-40B4-BE49-F238E27FC236}">
+                  <a16:creationId xmlns:a16="http://schemas.microsoft.com/office/drawing/2014/main" id="{ECC77B0F-BC56-48AA-972A-0AE993BE8EEB}"/>
+                </a:ext>
+              </a:extLst>
+            </p:cNvPr>
+            <p:cNvCxnSpPr/>
+            <p:nvPr/>
+          </p:nvCxnSpPr>
+          <p:spPr>
+            <a:xfrm>
+              <a:off x="1046201" y="2051222"/>
+              <a:ext cx="2603157" cy="0"/>
+            </a:xfrm>
+            <a:prstGeom prst="line">
+              <a:avLst/>
+            </a:prstGeom>
+            <a:grpFill/>
+            <a:ln w="28575">
+              <a:solidFill>
+                <a:schemeClr val="tx1"/>
+              </a:solidFill>
+            </a:ln>
+          </p:spPr>
+          <p:style>
+            <a:lnRef idx="1">
+              <a:schemeClr val="accent1"/>
+            </a:lnRef>
+            <a:fillRef idx="0">
+              <a:schemeClr val="accent1"/>
+            </a:fillRef>
+            <a:effectRef idx="0">
+              <a:schemeClr val="accent1"/>
+            </a:effectRef>
+            <a:fontRef idx="minor">
+              <a:schemeClr val="tx1"/>
+            </a:fontRef>
+          </p:style>
+        </p:cxnSp>
+      </p:grpSp>
+      <p:grpSp>
+        <p:nvGrpSpPr>
+          <p:cNvPr id="25" name="Group 24">
+            <a:extLst>
+              <a:ext uri="{FF2B5EF4-FFF2-40B4-BE49-F238E27FC236}">
+                <a16:creationId xmlns:a16="http://schemas.microsoft.com/office/drawing/2014/main" id="{B362EF4A-7AD5-418E-B151-161BCFE564DD}"/>
+              </a:ext>
+            </a:extLst>
+          </p:cNvPr>
+          <p:cNvGrpSpPr/>
+          <p:nvPr/>
+        </p:nvGrpSpPr>
+        <p:grpSpPr>
+          <a:xfrm>
+            <a:off x="3848574" y="2493105"/>
+            <a:ext cx="3089566" cy="2490110"/>
+            <a:chOff x="1046201" y="1400432"/>
+            <a:chExt cx="2603160" cy="2490110"/>
+          </a:xfrm>
+          <a:solidFill>
+            <a:schemeClr val="accent6">
+              <a:lumMod val="20000"/>
+              <a:lumOff val="80000"/>
+            </a:schemeClr>
+          </a:solidFill>
+        </p:grpSpPr>
+        <p:sp>
+          <p:nvSpPr>
+            <p:cNvPr id="26" name="Rectangle 25">
+              <a:extLst>
+                <a:ext uri="{FF2B5EF4-FFF2-40B4-BE49-F238E27FC236}">
+                  <a16:creationId xmlns:a16="http://schemas.microsoft.com/office/drawing/2014/main" id="{DE105EB8-BCD6-46BB-AF46-928526B86809}"/>
+                </a:ext>
+              </a:extLst>
+            </p:cNvPr>
+            <p:cNvSpPr/>
+            <p:nvPr/>
+          </p:nvSpPr>
+          <p:spPr>
+            <a:xfrm>
+              <a:off x="1046204" y="1400432"/>
+              <a:ext cx="2603157" cy="650790"/>
+            </a:xfrm>
+            <a:prstGeom prst="rect">
+              <a:avLst/>
+            </a:prstGeom>
+            <a:grpFill/>
+            <a:ln>
+              <a:solidFill>
+                <a:schemeClr val="bg1"/>
+              </a:solidFill>
+            </a:ln>
+          </p:spPr>
+          <p:style>
+            <a:lnRef idx="2">
+              <a:schemeClr val="accent1">
+                <a:shade val="50000"/>
+              </a:schemeClr>
+            </a:lnRef>
+            <a:fillRef idx="1">
+              <a:schemeClr val="accent1"/>
+            </a:fillRef>
+            <a:effectRef idx="0">
+              <a:schemeClr val="accent1"/>
+            </a:effectRef>
+            <a:fontRef idx="minor">
+              <a:schemeClr val="lt1"/>
+            </a:fontRef>
+          </p:style>
+          <p:txBody>
+            <a:bodyPr rtlCol="0" anchor="ctr"/>
+            <a:lstStyle/>
+            <a:p>
+              <a:r>
+                <a:rPr lang="en-US" sz="3200" dirty="0">
+                  <a:solidFill>
+                    <a:schemeClr val="tx1"/>
+                  </a:solidFill>
+                </a:rPr>
+                <a:t>group</a:t>
+              </a:r>
+            </a:p>
+          </p:txBody>
+        </p:sp>
+        <p:sp>
+          <p:nvSpPr>
+            <p:cNvPr id="27" name="Rectangle 26">
+              <a:extLst>
+                <a:ext uri="{FF2B5EF4-FFF2-40B4-BE49-F238E27FC236}">
+                  <a16:creationId xmlns:a16="http://schemas.microsoft.com/office/drawing/2014/main" id="{5749EEC1-8935-4ED1-9AFF-DC0BDBCE271D}"/>
+                </a:ext>
+              </a:extLst>
+            </p:cNvPr>
+            <p:cNvSpPr/>
+            <p:nvPr/>
+          </p:nvSpPr>
+          <p:spPr>
+            <a:xfrm>
+              <a:off x="1046201" y="2074660"/>
+              <a:ext cx="2603157" cy="1815882"/>
+            </a:xfrm>
+            <a:prstGeom prst="rect">
+              <a:avLst/>
+            </a:prstGeom>
+            <a:grpFill/>
+            <a:ln>
+              <a:solidFill>
+                <a:schemeClr val="bg1"/>
+              </a:solidFill>
+            </a:ln>
+          </p:spPr>
+          <p:style>
+            <a:lnRef idx="2">
+              <a:schemeClr val="accent1">
+                <a:shade val="50000"/>
+              </a:schemeClr>
+            </a:lnRef>
+            <a:fillRef idx="1">
+              <a:schemeClr val="accent1"/>
+            </a:fillRef>
+            <a:effectRef idx="0">
+              <a:schemeClr val="accent1"/>
+            </a:effectRef>
+            <a:fontRef idx="minor">
+              <a:schemeClr val="lt1"/>
+            </a:fontRef>
+          </p:style>
+          <p:txBody>
+            <a:bodyPr rtlCol="0" anchor="ctr">
+              <a:spAutoFit/>
+            </a:bodyPr>
+            <a:lstStyle/>
+            <a:p>
+              <a:r>
+                <a:rPr lang="en-US" sz="1600" dirty="0" err="1">
+                  <a:solidFill>
+                    <a:schemeClr val="tx1"/>
+                  </a:solidFill>
+                </a:rPr>
+                <a:t>groupBy</a:t>
+              </a:r>
+              <a:endParaRPr lang="en-US" sz="1600" dirty="0">
+                <a:solidFill>
+                  <a:schemeClr val="tx1"/>
+                </a:solidFill>
+              </a:endParaRPr>
+            </a:p>
+            <a:p>
+              <a:r>
+                <a:rPr lang="en-US" sz="1600" dirty="0" err="1">
+                  <a:solidFill>
+                    <a:schemeClr val="tx1"/>
+                  </a:solidFill>
+                </a:rPr>
+                <a:t>groupByEach</a:t>
+              </a:r>
+              <a:endParaRPr lang="en-US" sz="1600" dirty="0">
+                <a:solidFill>
+                  <a:schemeClr val="tx1"/>
+                </a:solidFill>
+              </a:endParaRPr>
+            </a:p>
+            <a:p>
+              <a:r>
+                <a:rPr lang="en-US" sz="1600" dirty="0" err="1">
+                  <a:solidFill>
+                    <a:schemeClr val="tx1"/>
+                  </a:solidFill>
+                </a:rPr>
+                <a:t>groupByUniqueKey</a:t>
+              </a:r>
+              <a:endParaRPr lang="en-US" sz="1600" dirty="0">
+                <a:solidFill>
+                  <a:schemeClr val="tx1"/>
+                </a:solidFill>
+              </a:endParaRPr>
+            </a:p>
+            <a:p>
+              <a:r>
+                <a:rPr lang="en-US" sz="1600" dirty="0" err="1">
+                  <a:solidFill>
+                    <a:schemeClr val="tx1"/>
+                  </a:solidFill>
+                </a:rPr>
+                <a:t>sumBy</a:t>
+              </a:r>
+              <a:r>
+                <a:rPr lang="en-US" sz="1600" b="1" dirty="0">
+                  <a:solidFill>
+                    <a:srgbClr val="0066FF"/>
+                  </a:solidFill>
+                </a:rPr>
+                <a:t>[</a:t>
+              </a:r>
+              <a:r>
+                <a:rPr lang="en-US" sz="1600" b="1" dirty="0" err="1">
+                  <a:solidFill>
+                    <a:srgbClr val="0066FF"/>
+                  </a:solidFill>
+                </a:rPr>
+                <a:t>Double,Float,Int,Long</a:t>
+              </a:r>
+              <a:r>
+                <a:rPr lang="en-US" sz="1600" b="1" dirty="0">
+                  <a:solidFill>
+                    <a:srgbClr val="0066FF"/>
+                  </a:solidFill>
+                </a:rPr>
+                <a:t>]</a:t>
+              </a:r>
+            </a:p>
+            <a:p>
+              <a:r>
+                <a:rPr lang="en-US" sz="1600" dirty="0" err="1">
+                  <a:solidFill>
+                    <a:schemeClr val="tx1"/>
+                  </a:solidFill>
+                </a:rPr>
+                <a:t>sumOf</a:t>
+              </a:r>
+              <a:r>
+                <a:rPr lang="en-US" sz="1600" b="1" dirty="0">
+                  <a:solidFill>
+                    <a:srgbClr val="0066FF"/>
+                  </a:solidFill>
+                </a:rPr>
+                <a:t>[</a:t>
+              </a:r>
+              <a:r>
+                <a:rPr lang="en-US" sz="1600" b="1" dirty="0" err="1">
+                  <a:solidFill>
+                    <a:srgbClr val="0066FF"/>
+                  </a:solidFill>
+                </a:rPr>
+                <a:t>Double,Float,Int,Long</a:t>
+              </a:r>
+              <a:r>
+                <a:rPr lang="en-US" sz="1600" b="1" dirty="0">
+                  <a:solidFill>
+                    <a:srgbClr val="0066FF"/>
+                  </a:solidFill>
+                </a:rPr>
+                <a:t>]</a:t>
+              </a:r>
+            </a:p>
+            <a:p>
+              <a:r>
+                <a:rPr lang="en-US" sz="1600" dirty="0" err="1">
+                  <a:solidFill>
+                    <a:schemeClr val="tx1"/>
+                  </a:solidFill>
+                </a:rPr>
+                <a:t>aggregateBy</a:t>
+              </a:r>
+              <a:endParaRPr lang="en-US" sz="1600" dirty="0">
+                <a:solidFill>
+                  <a:schemeClr val="tx1"/>
+                </a:solidFill>
+              </a:endParaRPr>
+            </a:p>
+            <a:p>
+              <a:r>
+                <a:rPr lang="en-US" sz="1600" dirty="0" err="1">
+                  <a:solidFill>
+                    <a:schemeClr val="tx1"/>
+                  </a:solidFill>
+                </a:rPr>
+                <a:t>aggregateInPlaceBy</a:t>
+              </a:r>
+              <a:endParaRPr lang="en-US" sz="1600" dirty="0">
+                <a:solidFill>
+                  <a:schemeClr val="tx1"/>
+                </a:solidFill>
+              </a:endParaRPr>
+            </a:p>
+          </p:txBody>
+        </p:sp>
+        <p:cxnSp>
+          <p:nvCxnSpPr>
+            <p:cNvPr id="28" name="Straight Connector 27">
+              <a:extLst>
+                <a:ext uri="{FF2B5EF4-FFF2-40B4-BE49-F238E27FC236}">
+                  <a16:creationId xmlns:a16="http://schemas.microsoft.com/office/drawing/2014/main" id="{892B75A8-46F0-4B64-9C7F-50B5DC0F50A1}"/>
+                </a:ext>
+              </a:extLst>
+            </p:cNvPr>
+            <p:cNvCxnSpPr/>
+            <p:nvPr/>
+          </p:nvCxnSpPr>
+          <p:spPr>
+            <a:xfrm>
+              <a:off x="1046201" y="2051222"/>
+              <a:ext cx="2603157" cy="0"/>
+            </a:xfrm>
+            <a:prstGeom prst="line">
+              <a:avLst/>
+            </a:prstGeom>
+            <a:grpFill/>
             <a:ln w="28575">
               <a:solidFill>
                 <a:schemeClr val="tx1"/>
@@ -10167,7 +12141,7 @@
 </p:sld>
 </file>
 
-<file path=ppt/slides/slide5.xml><?xml version="1.0" encoding="utf-8"?>
+<file path=ppt/slides/slide6.xml><?xml version="1.0" encoding="utf-8"?>
 <p:sld xmlns:a="http://schemas.openxmlformats.org/drawingml/2006/main" xmlns:r="http://schemas.openxmlformats.org/officeDocument/2006/relationships" xmlns:p="http://schemas.openxmlformats.org/presentationml/2006/main">
   <p:cSld>
     <p:spTree>
@@ -10207,7 +12181,7 @@
           <a:p>
             <a:r>
               <a:rPr lang="en-US" dirty="0"/>
-              <a:t>Methods – lots more…</a:t>
+              <a:t>Methods – Lots More…</a:t>
             </a:r>
           </a:p>
         </p:txBody>
@@ -10235,7 +12209,7 @@
           <a:p>
             <a:fld id="{EF57339A-E29B-45C7-A4AA-9F67BACDCD80}" type="slidenum">
               <a:rPr lang="en-US" smtClean="0"/>
-              <a:t>5</a:t>
+              <a:t>6</a:t>
             </a:fld>
             <a:endParaRPr lang="en-US"/>
           </a:p>
@@ -10269,7 +12243,7 @@
         </p:blipFill>
         <p:spPr>
           <a:xfrm>
-            <a:off x="838200" y="1083336"/>
+            <a:off x="1524000" y="1083336"/>
             <a:ext cx="9144000" cy="5715000"/>
           </a:xfrm>
           <a:prstGeom prst="rect">
@@ -10277,83 +12251,6 @@
           </a:prstGeom>
         </p:spPr>
       </p:pic>
-      <p:sp>
-        <p:nvSpPr>
-          <p:cNvPr id="6" name="TextBox 5">
-            <a:extLst>
-              <a:ext uri="{FF2B5EF4-FFF2-40B4-BE49-F238E27FC236}">
-                <a16:creationId xmlns:a16="http://schemas.microsoft.com/office/drawing/2014/main" id="{11509C64-8998-4C1F-9C49-06CF510DF227}"/>
-              </a:ext>
-            </a:extLst>
-          </p:cNvPr>
-          <p:cNvSpPr txBox="1"/>
-          <p:nvPr/>
-        </p:nvSpPr>
-        <p:spPr>
-          <a:xfrm rot="632058">
-            <a:off x="8740029" y="1588979"/>
-            <a:ext cx="2843025" cy="2476162"/>
-          </a:xfrm>
-          <a:prstGeom prst="rect">
-            <a:avLst/>
-          </a:prstGeom>
-          <a:solidFill>
-            <a:schemeClr val="accent4">
-              <a:lumMod val="20000"/>
-              <a:lumOff val="80000"/>
-            </a:schemeClr>
-          </a:solidFill>
-          <a:effectLst>
-            <a:outerShdw blurRad="50800" dist="38100" dir="2700000" algn="tl" rotWithShape="0">
-              <a:prstClr val="black">
-                <a:alpha val="40000"/>
-              </a:prstClr>
-            </a:outerShdw>
-          </a:effectLst>
-        </p:spPr>
-        <p:txBody>
-          <a:bodyPr wrap="square" rtlCol="0" anchor="ctr">
-            <a:noAutofit/>
-          </a:bodyPr>
-          <a:lstStyle/>
-          <a:p>
-            <a:r>
-              <a:rPr lang="en-US" sz="2800" dirty="0">
-                <a:latin typeface="Leelawadee UI Semilight" panose="020B0402040204020203" pitchFamily="34" charset="-34"/>
-                <a:cs typeface="Leelawadee UI Semilight" panose="020B0402040204020203" pitchFamily="34" charset="-34"/>
-              </a:rPr>
-              <a:t>Word sizes are </a:t>
-            </a:r>
-          </a:p>
-          <a:p>
-            <a:r>
-              <a:rPr lang="en-US" sz="2800" dirty="0">
-                <a:latin typeface="Leelawadee UI Semilight" panose="020B0402040204020203" pitchFamily="34" charset="-34"/>
-                <a:cs typeface="Leelawadee UI Semilight" panose="020B0402040204020203" pitchFamily="34" charset="-34"/>
-              </a:rPr>
-              <a:t>proportional</a:t>
-            </a:r>
-          </a:p>
-          <a:p>
-            <a:r>
-              <a:rPr lang="en-US" sz="2800" dirty="0">
-                <a:latin typeface="Leelawadee UI Semilight" panose="020B0402040204020203" pitchFamily="34" charset="-34"/>
-                <a:cs typeface="Leelawadee UI Semilight" panose="020B0402040204020203" pitchFamily="34" charset="-34"/>
-              </a:rPr>
-              <a:t>to the number of </a:t>
-            </a:r>
-          </a:p>
-          <a:p>
-            <a:r>
-              <a:rPr lang="en-US" sz="2800" dirty="0">
-                <a:latin typeface="Leelawadee UI Semilight" panose="020B0402040204020203" pitchFamily="34" charset="-34"/>
-                <a:cs typeface="Leelawadee UI Semilight" panose="020B0402040204020203" pitchFamily="34" charset="-34"/>
-              </a:rPr>
-              <a:t>implementations of the method</a:t>
-            </a:r>
-          </a:p>
-        </p:txBody>
-      </p:sp>
     </p:spTree>
     <p:extLst>
       <p:ext uri="{BB962C8B-B14F-4D97-AF65-F5344CB8AC3E}">
@@ -10367,7 +12264,7 @@
 </p:sld>
 </file>
 
-<file path=ppt/slides/slide6.xml><?xml version="1.0" encoding="utf-8"?>
+<file path=ppt/slides/slide7.xml><?xml version="1.0" encoding="utf-8"?>
 <p:sld xmlns:a="http://schemas.openxmlformats.org/drawingml/2006/main" xmlns:r="http://schemas.openxmlformats.org/officeDocument/2006/relationships" xmlns:p="http://schemas.openxmlformats.org/presentationml/2006/main">
   <p:cSld>
     <p:spTree>
@@ -11007,7 +12904,7 @@
           <a:p>
             <a:fld id="{EF57339A-E29B-45C7-A4AA-9F67BACDCD80}" type="slidenum">
               <a:rPr lang="en-US" smtClean="0"/>
-              <a:t>6</a:t>
+              <a:t>7</a:t>
             </a:fld>
             <a:endParaRPr lang="en-US"/>
           </a:p>
@@ -12834,93 +14731,6 @@
 </p:sld>
 </file>
 
-<file path=ppt/slides/slide7.xml><?xml version="1.0" encoding="utf-8"?>
-<p:sld xmlns:a="http://schemas.openxmlformats.org/drawingml/2006/main" xmlns:r="http://schemas.openxmlformats.org/officeDocument/2006/relationships" xmlns:p="http://schemas.openxmlformats.org/presentationml/2006/main">
-  <p:cSld>
-    <p:spTree>
-      <p:nvGrpSpPr>
-        <p:cNvPr id="1" name=""/>
-        <p:cNvGrpSpPr/>
-        <p:nvPr/>
-      </p:nvGrpSpPr>
-      <p:grpSpPr>
-        <a:xfrm>
-          <a:off x="0" y="0"/>
-          <a:ext cx="0" cy="0"/>
-          <a:chOff x="0" y="0"/>
-          <a:chExt cx="0" cy="0"/>
-        </a:xfrm>
-      </p:grpSpPr>
-      <p:sp>
-        <p:nvSpPr>
-          <p:cNvPr id="2" name="Title 1">
-            <a:extLst>
-              <a:ext uri="{FF2B5EF4-FFF2-40B4-BE49-F238E27FC236}">
-                <a16:creationId xmlns:a16="http://schemas.microsoft.com/office/drawing/2014/main" id="{6459898C-2DF7-438B-A3CE-E09D142DED7D}"/>
-              </a:ext>
-            </a:extLst>
-          </p:cNvPr>
-          <p:cNvSpPr>
-            <a:spLocks noGrp="1"/>
-          </p:cNvSpPr>
-          <p:nvPr>
-            <p:ph type="title"/>
-          </p:nvPr>
-        </p:nvSpPr>
-        <p:spPr/>
-        <p:txBody>
-          <a:bodyPr/>
-          <a:lstStyle/>
-          <a:p>
-            <a:r>
-              <a:rPr lang="en-US" dirty="0"/>
-              <a:t>Let’s Do It!</a:t>
-            </a:r>
-          </a:p>
-        </p:txBody>
-      </p:sp>
-      <p:sp>
-        <p:nvSpPr>
-          <p:cNvPr id="3" name="Slide Number Placeholder 2">
-            <a:extLst>
-              <a:ext uri="{FF2B5EF4-FFF2-40B4-BE49-F238E27FC236}">
-                <a16:creationId xmlns:a16="http://schemas.microsoft.com/office/drawing/2014/main" id="{07BE615D-ED9E-4243-AD56-88B0079A6C08}"/>
-              </a:ext>
-            </a:extLst>
-          </p:cNvPr>
-          <p:cNvSpPr>
-            <a:spLocks noGrp="1"/>
-          </p:cNvSpPr>
-          <p:nvPr>
-            <p:ph type="sldNum" sz="quarter" idx="12"/>
-          </p:nvPr>
-        </p:nvSpPr>
-        <p:spPr/>
-        <p:txBody>
-          <a:bodyPr/>
-          <a:lstStyle/>
-          <a:p>
-            <a:fld id="{EF57339A-E29B-45C7-A4AA-9F67BACDCD80}" type="slidenum">
-              <a:rPr lang="en-US" smtClean="0"/>
-              <a:t>7</a:t>
-            </a:fld>
-            <a:endParaRPr lang="en-US"/>
-          </a:p>
-        </p:txBody>
-      </p:sp>
-    </p:spTree>
-    <p:extLst>
-      <p:ext uri="{BB962C8B-B14F-4D97-AF65-F5344CB8AC3E}">
-        <p14:creationId xmlns:p14="http://schemas.microsoft.com/office/powerpoint/2010/main" val="3258248763"/>
-      </p:ext>
-    </p:extLst>
-  </p:cSld>
-  <p:clrMapOvr>
-    <a:masterClrMapping/>
-  </p:clrMapOvr>
-</p:sld>
-</file>
-
 <file path=ppt/slides/slide8.xml><?xml version="1.0" encoding="utf-8"?>
 <p:sld xmlns:a="http://schemas.openxmlformats.org/drawingml/2006/main" xmlns:r="http://schemas.openxmlformats.org/officeDocument/2006/relationships" xmlns:p="http://schemas.openxmlformats.org/presentationml/2006/main">
   <p:cSld>
@@ -12943,7 +14753,7 @@
           <p:cNvPr id="2" name="Title 1">
             <a:extLst>
               <a:ext uri="{FF2B5EF4-FFF2-40B4-BE49-F238E27FC236}">
-                <a16:creationId xmlns:a16="http://schemas.microsoft.com/office/drawing/2014/main" id="{6EC97955-5F81-4961-86D0-519879FEA5AA}"/>
+                <a16:creationId xmlns:a16="http://schemas.microsoft.com/office/drawing/2014/main" id="{6459898C-2DF7-438B-A3CE-E09D142DED7D}"/>
               </a:ext>
             </a:extLst>
           </p:cNvPr>
@@ -12961,7 +14771,7 @@
           <a:p>
             <a:r>
               <a:rPr lang="en-US" dirty="0"/>
-              <a:t>JMH Benchmark Results</a:t>
+              <a:t>Let’s Do It!</a:t>
             </a:r>
           </a:p>
         </p:txBody>
@@ -12971,7 +14781,7 @@
           <p:cNvPr id="3" name="Slide Number Placeholder 2">
             <a:extLst>
               <a:ext uri="{FF2B5EF4-FFF2-40B4-BE49-F238E27FC236}">
-                <a16:creationId xmlns:a16="http://schemas.microsoft.com/office/drawing/2014/main" id="{9548E156-819E-4EED-9B8B-D205F8B45A0B}"/>
+                <a16:creationId xmlns:a16="http://schemas.microsoft.com/office/drawing/2014/main" id="{07BE615D-ED9E-4243-AD56-88B0079A6C08}"/>
               </a:ext>
             </a:extLst>
           </p:cNvPr>
@@ -12998,7 +14808,7 @@
     </p:spTree>
     <p:extLst>
       <p:ext uri="{BB962C8B-B14F-4D97-AF65-F5344CB8AC3E}">
-        <p14:creationId xmlns:p14="http://schemas.microsoft.com/office/powerpoint/2010/main" val="619593670"/>
+        <p14:creationId xmlns:p14="http://schemas.microsoft.com/office/powerpoint/2010/main" val="3258248763"/>
       </p:ext>
     </p:extLst>
   </p:cSld>
@@ -13030,7 +14840,7 @@
           <p:cNvPr id="2" name="Title 1">
             <a:extLst>
               <a:ext uri="{FF2B5EF4-FFF2-40B4-BE49-F238E27FC236}">
-                <a16:creationId xmlns:a16="http://schemas.microsoft.com/office/drawing/2014/main" id="{04D96E18-4D57-4F56-8D07-909F93855EEA}"/>
+                <a16:creationId xmlns:a16="http://schemas.microsoft.com/office/drawing/2014/main" id="{6EC97955-5F81-4961-86D0-519879FEA5AA}"/>
               </a:ext>
             </a:extLst>
           </p:cNvPr>
@@ -13048,7 +14858,7 @@
           <a:p>
             <a:r>
               <a:rPr lang="en-US" dirty="0"/>
-              <a:t>Memory Usage Comparison</a:t>
+              <a:t>JMH Benchmark Results</a:t>
             </a:r>
           </a:p>
         </p:txBody>
@@ -13058,7 +14868,7 @@
           <p:cNvPr id="3" name="Slide Number Placeholder 2">
             <a:extLst>
               <a:ext uri="{FF2B5EF4-FFF2-40B4-BE49-F238E27FC236}">
-                <a16:creationId xmlns:a16="http://schemas.microsoft.com/office/drawing/2014/main" id="{885CA2D9-69D5-40FF-B640-6B98926BDD62}"/>
+                <a16:creationId xmlns:a16="http://schemas.microsoft.com/office/drawing/2014/main" id="{9548E156-819E-4EED-9B8B-D205F8B45A0B}"/>
               </a:ext>
             </a:extLst>
           </p:cNvPr>
@@ -13085,7 +14895,7 @@
     </p:spTree>
     <p:extLst>
       <p:ext uri="{BB962C8B-B14F-4D97-AF65-F5344CB8AC3E}">
-        <p14:creationId xmlns:p14="http://schemas.microsoft.com/office/powerpoint/2010/main" val="3262160996"/>
+        <p14:creationId xmlns:p14="http://schemas.microsoft.com/office/powerpoint/2010/main" val="619593670"/>
       </p:ext>
     </p:extLst>
   </p:cSld>

</xml_diff>

<commit_message>
Added memory comparison graphs
Signed-off-by: vmzakharov <zakharov.vladimir.m@gmail.com>
</commit_message>
<xml_diff>
--- a/docs/RefactorToEcIntro.pptx
+++ b/docs/RefactorToEcIntro.pptx
@@ -210,7 +210,7 @@
           <a:p>
             <a:fld id="{0A3ECF1A-C506-483F-9BD5-3A37EAB21BED}" type="datetimeFigureOut">
               <a:rPr lang="en-US" smtClean="0"/>
-              <a:t>1/8/2018</a:t>
+              <a:t>1/15/2018</a:t>
             </a:fld>
             <a:endParaRPr lang="en-US"/>
           </a:p>
@@ -708,7 +708,7 @@
           <a:p>
             <a:fld id="{B01E6D21-A8A9-47BB-AAF4-BA66E1D4CADC}" type="datetime1">
               <a:rPr lang="en-US" smtClean="0"/>
-              <a:t>1/8/2018</a:t>
+              <a:t>1/15/2018</a:t>
             </a:fld>
             <a:endParaRPr lang="en-US"/>
           </a:p>
@@ -906,7 +906,7 @@
           <a:p>
             <a:fld id="{ED35BEB7-6A69-46B0-87F9-C824B47AE71E}" type="datetime1">
               <a:rPr lang="en-US" smtClean="0"/>
-              <a:t>1/8/2018</a:t>
+              <a:t>1/15/2018</a:t>
             </a:fld>
             <a:endParaRPr lang="en-US"/>
           </a:p>
@@ -1114,7 +1114,7 @@
           <a:p>
             <a:fld id="{EC05F448-01D4-43D9-A78F-C558AA092412}" type="datetime1">
               <a:rPr lang="en-US" smtClean="0"/>
-              <a:t>1/8/2018</a:t>
+              <a:t>1/15/2018</a:t>
             </a:fld>
             <a:endParaRPr lang="en-US"/>
           </a:p>
@@ -1312,7 +1312,7 @@
           <a:p>
             <a:fld id="{C59299DC-A265-4E49-B17A-DE0D5C00C9AB}" type="datetime1">
               <a:rPr lang="en-US" smtClean="0"/>
-              <a:t>1/8/2018</a:t>
+              <a:t>1/15/2018</a:t>
             </a:fld>
             <a:endParaRPr lang="en-US"/>
           </a:p>
@@ -1630,7 +1630,7 @@
           <a:p>
             <a:fld id="{204EBBBC-15A7-4FCE-B6B7-3947C545F524}" type="datetime1">
               <a:rPr lang="en-US" smtClean="0"/>
-              <a:t>1/8/2018</a:t>
+              <a:t>1/15/2018</a:t>
             </a:fld>
             <a:endParaRPr lang="en-US"/>
           </a:p>
@@ -1895,7 +1895,7 @@
           <a:p>
             <a:fld id="{88496FF8-6CE1-4C50-9FF1-F4B619FD13C1}" type="datetime1">
               <a:rPr lang="en-US" smtClean="0"/>
-              <a:t>1/8/2018</a:t>
+              <a:t>1/15/2018</a:t>
             </a:fld>
             <a:endParaRPr lang="en-US"/>
           </a:p>
@@ -2350,7 +2350,7 @@
           <a:p>
             <a:fld id="{7A870CA9-64F7-4D04-A791-C33F2DA5696A}" type="datetime1">
               <a:rPr lang="en-US" smtClean="0"/>
-              <a:t>1/8/2018</a:t>
+              <a:t>1/15/2018</a:t>
             </a:fld>
             <a:endParaRPr lang="en-US"/>
           </a:p>
@@ -2534,7 +2534,7 @@
           <a:p>
             <a:fld id="{036E2797-557C-4D30-BD50-A93066FAC4DE}" type="datetime1">
               <a:rPr lang="en-US" smtClean="0"/>
-              <a:t>1/8/2018</a:t>
+              <a:t>1/15/2018</a:t>
             </a:fld>
             <a:endParaRPr lang="en-US"/>
           </a:p>
@@ -2690,7 +2690,7 @@
           <a:p>
             <a:fld id="{6B8338EF-DB38-47F2-AC4F-ED460855DDBE}" type="datetime1">
               <a:rPr lang="en-US" smtClean="0"/>
-              <a:t>1/8/2018</a:t>
+              <a:t>1/15/2018</a:t>
             </a:fld>
             <a:endParaRPr lang="en-US"/>
           </a:p>
@@ -3001,7 +3001,7 @@
           <a:p>
             <a:fld id="{5A4D1A4B-CD09-4B45-8956-0726DCFE9F61}" type="datetime1">
               <a:rPr lang="en-US" smtClean="0"/>
-              <a:t>1/8/2018</a:t>
+              <a:t>1/15/2018</a:t>
             </a:fld>
             <a:endParaRPr lang="en-US"/>
           </a:p>
@@ -3289,7 +3289,7 @@
           <a:p>
             <a:fld id="{4F3145A3-6131-4271-9039-944CD844150A}" type="datetime1">
               <a:rPr lang="en-US" smtClean="0"/>
-              <a:t>1/8/2018</a:t>
+              <a:t>1/15/2018</a:t>
             </a:fld>
             <a:endParaRPr lang="en-US"/>
           </a:p>
@@ -3530,7 +3530,7 @@
           <a:p>
             <a:fld id="{F3DFC797-DE7B-4026-9213-8D54CB76373D}" type="datetime1">
               <a:rPr lang="en-US" smtClean="0"/>
-              <a:t>1/8/2018</a:t>
+              <a:t>1/15/2018</a:t>
             </a:fld>
             <a:endParaRPr lang="en-US"/>
           </a:p>
@@ -4100,7 +4100,7 @@
           <a:p>
             <a:r>
               <a:rPr lang="en-US" dirty="0"/>
-              <a:t>Memory Usage Comparison</a:t>
+              <a:t>Memory Usage Comparison (KB, count)</a:t>
             </a:r>
           </a:p>
         </p:txBody>
@@ -4134,6 +4134,126 @@
           </a:p>
         </p:txBody>
       </p:sp>
+      <p:pic>
+        <p:nvPicPr>
+          <p:cNvPr id="22" name="Picture 21">
+            <a:extLst>
+              <a:ext uri="{FF2B5EF4-FFF2-40B4-BE49-F238E27FC236}">
+                <a16:creationId xmlns:a16="http://schemas.microsoft.com/office/drawing/2014/main" id="{CC9B9EA6-364F-474C-B040-32EC0C649E60}"/>
+              </a:ext>
+            </a:extLst>
+          </p:cNvPr>
+          <p:cNvPicPr>
+            <a:picLocks noChangeAspect="1"/>
+          </p:cNvPicPr>
+          <p:nvPr/>
+        </p:nvPicPr>
+        <p:blipFill>
+          <a:blip r:embed="rId2"/>
+          <a:stretch>
+            <a:fillRect/>
+          </a:stretch>
+        </p:blipFill>
+        <p:spPr>
+          <a:xfrm>
+            <a:off x="1078244" y="3965843"/>
+            <a:ext cx="4584589" cy="2755631"/>
+          </a:xfrm>
+          <a:prstGeom prst="rect">
+            <a:avLst/>
+          </a:prstGeom>
+        </p:spPr>
+      </p:pic>
+      <p:pic>
+        <p:nvPicPr>
+          <p:cNvPr id="24" name="Picture 23">
+            <a:extLst>
+              <a:ext uri="{FF2B5EF4-FFF2-40B4-BE49-F238E27FC236}">
+                <a16:creationId xmlns:a16="http://schemas.microsoft.com/office/drawing/2014/main" id="{E8ACCD5D-CEF7-4138-8393-80A984DB604B}"/>
+              </a:ext>
+            </a:extLst>
+          </p:cNvPr>
+          <p:cNvPicPr>
+            <a:picLocks noChangeAspect="1"/>
+          </p:cNvPicPr>
+          <p:nvPr/>
+        </p:nvPicPr>
+        <p:blipFill>
+          <a:blip r:embed="rId3"/>
+          <a:stretch>
+            <a:fillRect/>
+          </a:stretch>
+        </p:blipFill>
+        <p:spPr>
+          <a:xfrm>
+            <a:off x="6019797" y="1113822"/>
+            <a:ext cx="4584589" cy="2755631"/>
+          </a:xfrm>
+          <a:prstGeom prst="rect">
+            <a:avLst/>
+          </a:prstGeom>
+        </p:spPr>
+      </p:pic>
+      <p:pic>
+        <p:nvPicPr>
+          <p:cNvPr id="26" name="Picture 25">
+            <a:extLst>
+              <a:ext uri="{FF2B5EF4-FFF2-40B4-BE49-F238E27FC236}">
+                <a16:creationId xmlns:a16="http://schemas.microsoft.com/office/drawing/2014/main" id="{86AD0F9B-BA26-4960-A804-58F67E853389}"/>
+              </a:ext>
+            </a:extLst>
+          </p:cNvPr>
+          <p:cNvPicPr>
+            <a:picLocks noChangeAspect="1"/>
+          </p:cNvPicPr>
+          <p:nvPr/>
+        </p:nvPicPr>
+        <p:blipFill>
+          <a:blip r:embed="rId4"/>
+          <a:stretch>
+            <a:fillRect/>
+          </a:stretch>
+        </p:blipFill>
+        <p:spPr>
+          <a:xfrm>
+            <a:off x="6019796" y="3965842"/>
+            <a:ext cx="4584589" cy="2755631"/>
+          </a:xfrm>
+          <a:prstGeom prst="rect">
+            <a:avLst/>
+          </a:prstGeom>
+        </p:spPr>
+      </p:pic>
+      <p:pic>
+        <p:nvPicPr>
+          <p:cNvPr id="28" name="Picture 27">
+            <a:extLst>
+              <a:ext uri="{FF2B5EF4-FFF2-40B4-BE49-F238E27FC236}">
+                <a16:creationId xmlns:a16="http://schemas.microsoft.com/office/drawing/2014/main" id="{FAC43573-93F7-4E83-A23A-3603456A728B}"/>
+              </a:ext>
+            </a:extLst>
+          </p:cNvPr>
+          <p:cNvPicPr>
+            <a:picLocks noChangeAspect="1"/>
+          </p:cNvPicPr>
+          <p:nvPr/>
+        </p:nvPicPr>
+        <p:blipFill>
+          <a:blip r:embed="rId5"/>
+          <a:stretch>
+            <a:fillRect/>
+          </a:stretch>
+        </p:blipFill>
+        <p:spPr>
+          <a:xfrm>
+            <a:off x="1071313" y="1113822"/>
+            <a:ext cx="4584589" cy="2755631"/>
+          </a:xfrm>
+          <a:prstGeom prst="rect">
+            <a:avLst/>
+          </a:prstGeom>
+        </p:spPr>
+      </p:pic>
     </p:spTree>
     <p:extLst>
       <p:ext uri="{BB962C8B-B14F-4D97-AF65-F5344CB8AC3E}">
@@ -4192,7 +4312,7 @@
         </p:blipFill>
         <p:spPr>
           <a:xfrm>
-            <a:off x="9556241" y="2362020"/>
+            <a:off x="9791769" y="2112640"/>
             <a:ext cx="1797559" cy="1370405"/>
           </a:xfrm>
           <a:prstGeom prst="rect">
@@ -4247,7 +4367,7 @@
         <p:spPr/>
         <p:txBody>
           <a:bodyPr>
-            <a:normAutofit lnSpcReduction="10000"/>
+            <a:normAutofit fontScale="92500" lnSpcReduction="10000"/>
           </a:bodyPr>
           <a:lstStyle/>
           <a:p>
@@ -4359,11 +4479,29 @@
             </a:pPr>
             <a:r>
               <a:rPr lang="en-US" dirty="0"/>
+              <a:t>Learn Eclipse Collections with </a:t>
+            </a:r>
+            <a:r>
+              <a:rPr lang="en-US" dirty="0">
+                <a:hlinkClick r:id="rId5"/>
+              </a:rPr>
+              <a:t>Kata</a:t>
+            </a:r>
+            <a:endParaRPr lang="en-US" dirty="0"/>
+          </a:p>
+          <a:p>
+            <a:pPr>
+              <a:lnSpc>
+                <a:spcPct val="120000"/>
+              </a:lnSpc>
+            </a:pPr>
+            <a:r>
+              <a:rPr lang="en-US" dirty="0"/>
               <a:t>Eclipse Collections is </a:t>
             </a:r>
             <a:r>
               <a:rPr lang="en-US" dirty="0">
-                <a:hlinkClick r:id="rId5"/>
+                <a:hlinkClick r:id="rId6"/>
               </a:rPr>
               <a:t>open for contributions</a:t>
             </a:r>
@@ -9960,7 +10098,7 @@
           <a:p>
             <a:r>
               <a:rPr lang="en-US" dirty="0"/>
-              <a:t>Methods [some of] by Category</a:t>
+              <a:t>Methods by Category - Highlights</a:t>
             </a:r>
           </a:p>
         </p:txBody>
@@ -12283,6 +12421,96 @@
       </p:grpSpPr>
       <p:cxnSp>
         <p:nvCxnSpPr>
+          <p:cNvPr id="53" name="Straight Connector 52">
+            <a:extLst>
+              <a:ext uri="{FF2B5EF4-FFF2-40B4-BE49-F238E27FC236}">
+                <a16:creationId xmlns:a16="http://schemas.microsoft.com/office/drawing/2014/main" id="{B16FCD28-B7DE-4C87-9788-4475E74F7A32}"/>
+              </a:ext>
+            </a:extLst>
+          </p:cNvPr>
+          <p:cNvCxnSpPr>
+            <a:cxnSpLocks/>
+          </p:cNvCxnSpPr>
+          <p:nvPr/>
+        </p:nvCxnSpPr>
+        <p:spPr>
+          <a:xfrm>
+            <a:off x="5165294" y="5076153"/>
+            <a:ext cx="771531" cy="1162728"/>
+          </a:xfrm>
+          <a:prstGeom prst="line">
+            <a:avLst/>
+          </a:prstGeom>
+          <a:ln w="28575">
+            <a:solidFill>
+              <a:schemeClr val="accent5">
+                <a:lumMod val="75000"/>
+              </a:schemeClr>
+            </a:solidFill>
+          </a:ln>
+        </p:spPr>
+        <p:style>
+          <a:lnRef idx="1">
+            <a:schemeClr val="accent1"/>
+          </a:lnRef>
+          <a:fillRef idx="0">
+            <a:schemeClr val="accent1"/>
+          </a:fillRef>
+          <a:effectRef idx="0">
+            <a:schemeClr val="accent1"/>
+          </a:effectRef>
+          <a:fontRef idx="minor">
+            <a:schemeClr val="tx1"/>
+          </a:fontRef>
+        </p:style>
+      </p:cxnSp>
+      <p:cxnSp>
+        <p:nvCxnSpPr>
+          <p:cNvPr id="54" name="Straight Connector 53">
+            <a:extLst>
+              <a:ext uri="{FF2B5EF4-FFF2-40B4-BE49-F238E27FC236}">
+                <a16:creationId xmlns:a16="http://schemas.microsoft.com/office/drawing/2014/main" id="{85645ED5-67C2-4B23-ABD9-2F9FB4B69AA3}"/>
+              </a:ext>
+            </a:extLst>
+          </p:cNvPr>
+          <p:cNvCxnSpPr>
+            <a:cxnSpLocks/>
+          </p:cNvCxnSpPr>
+          <p:nvPr/>
+        </p:nvCxnSpPr>
+        <p:spPr>
+          <a:xfrm flipH="1">
+            <a:off x="2355273" y="4986001"/>
+            <a:ext cx="2812960" cy="699381"/>
+          </a:xfrm>
+          <a:prstGeom prst="line">
+            <a:avLst/>
+          </a:prstGeom>
+          <a:ln w="28575">
+            <a:solidFill>
+              <a:schemeClr val="accent5">
+                <a:lumMod val="75000"/>
+              </a:schemeClr>
+            </a:solidFill>
+          </a:ln>
+        </p:spPr>
+        <p:style>
+          <a:lnRef idx="1">
+            <a:schemeClr val="accent1"/>
+          </a:lnRef>
+          <a:fillRef idx="0">
+            <a:schemeClr val="accent1"/>
+          </a:fillRef>
+          <a:effectRef idx="0">
+            <a:schemeClr val="accent1"/>
+          </a:effectRef>
+          <a:fontRef idx="minor">
+            <a:schemeClr val="tx1"/>
+          </a:fontRef>
+        </p:style>
+      </p:cxnSp>
+      <p:cxnSp>
+        <p:nvCxnSpPr>
           <p:cNvPr id="73" name="Straight Connector 72">
             <a:extLst>
               <a:ext uri="{FF2B5EF4-FFF2-40B4-BE49-F238E27FC236}">
@@ -13942,7 +14170,7 @@
         </p:nvSpPr>
         <p:spPr>
           <a:xfrm>
-            <a:off x="3388725" y="6011997"/>
+            <a:off x="4705125" y="6059955"/>
             <a:ext cx="2613657" cy="357852"/>
           </a:xfrm>
           <a:prstGeom prst="roundRect">
@@ -13985,67 +14213,6 @@
                 </a:solidFill>
               </a:rPr>
               <a:t>Efficient Maps and Sets</a:t>
-            </a:r>
-          </a:p>
-        </p:txBody>
-      </p:sp>
-      <p:sp>
-        <p:nvSpPr>
-          <p:cNvPr id="45" name="Rectangle: Rounded Corners 44">
-            <a:extLst>
-              <a:ext uri="{FF2B5EF4-FFF2-40B4-BE49-F238E27FC236}">
-                <a16:creationId xmlns:a16="http://schemas.microsoft.com/office/drawing/2014/main" id="{DE38DB02-B971-4712-A42D-D9307D0F8534}"/>
-              </a:ext>
-            </a:extLst>
-          </p:cNvPr>
-          <p:cNvSpPr/>
-          <p:nvPr/>
-        </p:nvSpPr>
-        <p:spPr>
-          <a:xfrm>
-            <a:off x="5642637" y="5685382"/>
-            <a:ext cx="1987117" cy="357852"/>
-          </a:xfrm>
-          <a:prstGeom prst="roundRect">
-            <a:avLst/>
-          </a:prstGeom>
-          <a:solidFill>
-            <a:schemeClr val="bg1"/>
-          </a:solidFill>
-          <a:ln>
-            <a:noFill/>
-          </a:ln>
-        </p:spPr>
-        <p:style>
-          <a:lnRef idx="2">
-            <a:schemeClr val="accent1">
-              <a:shade val="50000"/>
-            </a:schemeClr>
-          </a:lnRef>
-          <a:fillRef idx="1">
-            <a:schemeClr val="accent1"/>
-          </a:fillRef>
-          <a:effectRef idx="0">
-            <a:schemeClr val="accent1"/>
-          </a:effectRef>
-          <a:fontRef idx="minor">
-            <a:schemeClr val="lt1"/>
-          </a:fontRef>
-        </p:style>
-        <p:txBody>
-          <a:bodyPr rtlCol="0" anchor="ctr"/>
-          <a:lstStyle/>
-          <a:p>
-            <a:pPr algn="ctr"/>
-            <a:r>
-              <a:rPr lang="en-US" sz="1600" dirty="0">
-                <a:solidFill>
-                  <a:schemeClr val="accent5">
-                    <a:lumMod val="50000"/>
-                  </a:schemeClr>
-                </a:solidFill>
-              </a:rPr>
-              <a:t>Primitive Types</a:t>
             </a:r>
           </a:p>
         </p:txBody>
@@ -14353,96 +14520,6 @@
           </a:p>
         </p:txBody>
       </p:sp>
-      <p:cxnSp>
-        <p:nvCxnSpPr>
-          <p:cNvPr id="52" name="Straight Connector 51">
-            <a:extLst>
-              <a:ext uri="{FF2B5EF4-FFF2-40B4-BE49-F238E27FC236}">
-                <a16:creationId xmlns:a16="http://schemas.microsoft.com/office/drawing/2014/main" id="{9B322B75-02DC-46CE-BD9C-9B025ED16272}"/>
-              </a:ext>
-            </a:extLst>
-          </p:cNvPr>
-          <p:cNvCxnSpPr>
-            <a:cxnSpLocks/>
-          </p:cNvCxnSpPr>
-          <p:nvPr/>
-        </p:nvCxnSpPr>
-        <p:spPr>
-          <a:xfrm>
-            <a:off x="5614334" y="5229233"/>
-            <a:ext cx="643275" cy="552760"/>
-          </a:xfrm>
-          <a:prstGeom prst="line">
-            <a:avLst/>
-          </a:prstGeom>
-          <a:ln w="28575">
-            <a:solidFill>
-              <a:schemeClr val="accent5">
-                <a:lumMod val="75000"/>
-              </a:schemeClr>
-            </a:solidFill>
-          </a:ln>
-        </p:spPr>
-        <p:style>
-          <a:lnRef idx="1">
-            <a:schemeClr val="accent1"/>
-          </a:lnRef>
-          <a:fillRef idx="0">
-            <a:schemeClr val="accent1"/>
-          </a:fillRef>
-          <a:effectRef idx="0">
-            <a:schemeClr val="accent1"/>
-          </a:effectRef>
-          <a:fontRef idx="minor">
-            <a:schemeClr val="tx1"/>
-          </a:fontRef>
-        </p:style>
-      </p:cxnSp>
-      <p:cxnSp>
-        <p:nvCxnSpPr>
-          <p:cNvPr id="53" name="Straight Connector 52">
-            <a:extLst>
-              <a:ext uri="{FF2B5EF4-FFF2-40B4-BE49-F238E27FC236}">
-                <a16:creationId xmlns:a16="http://schemas.microsoft.com/office/drawing/2014/main" id="{B16FCD28-B7DE-4C87-9788-4475E74F7A32}"/>
-              </a:ext>
-            </a:extLst>
-          </p:cNvPr>
-          <p:cNvCxnSpPr>
-            <a:cxnSpLocks/>
-          </p:cNvCxnSpPr>
-          <p:nvPr/>
-        </p:nvCxnSpPr>
-        <p:spPr>
-          <a:xfrm flipH="1">
-            <a:off x="4676928" y="5290588"/>
-            <a:ext cx="233043" cy="721409"/>
-          </a:xfrm>
-          <a:prstGeom prst="line">
-            <a:avLst/>
-          </a:prstGeom>
-          <a:ln w="28575">
-            <a:solidFill>
-              <a:schemeClr val="accent5">
-                <a:lumMod val="75000"/>
-              </a:schemeClr>
-            </a:solidFill>
-          </a:ln>
-        </p:spPr>
-        <p:style>
-          <a:lnRef idx="1">
-            <a:schemeClr val="accent1"/>
-          </a:lnRef>
-          <a:fillRef idx="0">
-            <a:schemeClr val="accent1"/>
-          </a:fillRef>
-          <a:effectRef idx="0">
-            <a:schemeClr val="accent1"/>
-          </a:effectRef>
-          <a:fontRef idx="minor">
-            <a:schemeClr val="tx1"/>
-          </a:fontRef>
-        </p:style>
-      </p:cxnSp>
       <p:grpSp>
         <p:nvGrpSpPr>
           <p:cNvPr id="64" name="Group 63">

</xml_diff>

<commit_message>
Added performance graphs to the presentation
Signed-off-by: vmzakharov <zakharov.vladimir.m@gmail.com>
</commit_message>
<xml_diff>
--- a/docs/RefactorToEcIntro.pptx
+++ b/docs/RefactorToEcIntro.pptx
@@ -210,7 +210,7 @@
           <a:p>
             <a:fld id="{0A3ECF1A-C506-483F-9BD5-3A37EAB21BED}" type="datetimeFigureOut">
               <a:rPr lang="en-US" smtClean="0"/>
-              <a:t>1/15/2018</a:t>
+              <a:t>1/21/2018</a:t>
             </a:fld>
             <a:endParaRPr lang="en-US"/>
           </a:p>
@@ -708,7 +708,7 @@
           <a:p>
             <a:fld id="{B01E6D21-A8A9-47BB-AAF4-BA66E1D4CADC}" type="datetime1">
               <a:rPr lang="en-US" smtClean="0"/>
-              <a:t>1/15/2018</a:t>
+              <a:t>1/21/2018</a:t>
             </a:fld>
             <a:endParaRPr lang="en-US"/>
           </a:p>
@@ -906,7 +906,7 @@
           <a:p>
             <a:fld id="{ED35BEB7-6A69-46B0-87F9-C824B47AE71E}" type="datetime1">
               <a:rPr lang="en-US" smtClean="0"/>
-              <a:t>1/15/2018</a:t>
+              <a:t>1/21/2018</a:t>
             </a:fld>
             <a:endParaRPr lang="en-US"/>
           </a:p>
@@ -1114,7 +1114,7 @@
           <a:p>
             <a:fld id="{EC05F448-01D4-43D9-A78F-C558AA092412}" type="datetime1">
               <a:rPr lang="en-US" smtClean="0"/>
-              <a:t>1/15/2018</a:t>
+              <a:t>1/21/2018</a:t>
             </a:fld>
             <a:endParaRPr lang="en-US"/>
           </a:p>
@@ -1312,7 +1312,7 @@
           <a:p>
             <a:fld id="{C59299DC-A265-4E49-B17A-DE0D5C00C9AB}" type="datetime1">
               <a:rPr lang="en-US" smtClean="0"/>
-              <a:t>1/15/2018</a:t>
+              <a:t>1/21/2018</a:t>
             </a:fld>
             <a:endParaRPr lang="en-US"/>
           </a:p>
@@ -1630,7 +1630,7 @@
           <a:p>
             <a:fld id="{204EBBBC-15A7-4FCE-B6B7-3947C545F524}" type="datetime1">
               <a:rPr lang="en-US" smtClean="0"/>
-              <a:t>1/15/2018</a:t>
+              <a:t>1/21/2018</a:t>
             </a:fld>
             <a:endParaRPr lang="en-US"/>
           </a:p>
@@ -1895,7 +1895,7 @@
           <a:p>
             <a:fld id="{88496FF8-6CE1-4C50-9FF1-F4B619FD13C1}" type="datetime1">
               <a:rPr lang="en-US" smtClean="0"/>
-              <a:t>1/15/2018</a:t>
+              <a:t>1/21/2018</a:t>
             </a:fld>
             <a:endParaRPr lang="en-US"/>
           </a:p>
@@ -2350,7 +2350,7 @@
           <a:p>
             <a:fld id="{7A870CA9-64F7-4D04-A791-C33F2DA5696A}" type="datetime1">
               <a:rPr lang="en-US" smtClean="0"/>
-              <a:t>1/15/2018</a:t>
+              <a:t>1/21/2018</a:t>
             </a:fld>
             <a:endParaRPr lang="en-US"/>
           </a:p>
@@ -2534,7 +2534,7 @@
           <a:p>
             <a:fld id="{036E2797-557C-4D30-BD50-A93066FAC4DE}" type="datetime1">
               <a:rPr lang="en-US" smtClean="0"/>
-              <a:t>1/15/2018</a:t>
+              <a:t>1/21/2018</a:t>
             </a:fld>
             <a:endParaRPr lang="en-US"/>
           </a:p>
@@ -2690,7 +2690,7 @@
           <a:p>
             <a:fld id="{6B8338EF-DB38-47F2-AC4F-ED460855DDBE}" type="datetime1">
               <a:rPr lang="en-US" smtClean="0"/>
-              <a:t>1/15/2018</a:t>
+              <a:t>1/21/2018</a:t>
             </a:fld>
             <a:endParaRPr lang="en-US"/>
           </a:p>
@@ -3001,7 +3001,7 @@
           <a:p>
             <a:fld id="{5A4D1A4B-CD09-4B45-8956-0726DCFE9F61}" type="datetime1">
               <a:rPr lang="en-US" smtClean="0"/>
-              <a:t>1/15/2018</a:t>
+              <a:t>1/21/2018</a:t>
             </a:fld>
             <a:endParaRPr lang="en-US"/>
           </a:p>
@@ -3289,7 +3289,7 @@
           <a:p>
             <a:fld id="{4F3145A3-6131-4271-9039-944CD844150A}" type="datetime1">
               <a:rPr lang="en-US" smtClean="0"/>
-              <a:t>1/15/2018</a:t>
+              <a:t>1/21/2018</a:t>
             </a:fld>
             <a:endParaRPr lang="en-US"/>
           </a:p>
@@ -3530,7 +3530,7 @@
           <a:p>
             <a:fld id="{F3DFC797-DE7B-4026-9213-8D54CB76373D}" type="datetime1">
               <a:rPr lang="en-US" smtClean="0"/>
-              <a:t>1/15/2018</a:t>
+              <a:t>1/21/2018</a:t>
             </a:fld>
             <a:endParaRPr lang="en-US"/>
           </a:p>
@@ -4100,7 +4100,7 @@
           <a:p>
             <a:r>
               <a:rPr lang="en-US" dirty="0"/>
-              <a:t>Memory Usage Comparison (KB, count)</a:t>
+              <a:t>Memory Usage (Overhead in KB, Count)</a:t>
             </a:r>
           </a:p>
         </p:txBody>
@@ -4136,10 +4136,10 @@
       </p:sp>
       <p:pic>
         <p:nvPicPr>
-          <p:cNvPr id="22" name="Picture 21">
-            <a:extLst>
-              <a:ext uri="{FF2B5EF4-FFF2-40B4-BE49-F238E27FC236}">
-                <a16:creationId xmlns:a16="http://schemas.microsoft.com/office/drawing/2014/main" id="{CC9B9EA6-364F-474C-B040-32EC0C649E60}"/>
+          <p:cNvPr id="24" name="Picture 23">
+            <a:extLst>
+              <a:ext uri="{FF2B5EF4-FFF2-40B4-BE49-F238E27FC236}">
+                <a16:creationId xmlns:a16="http://schemas.microsoft.com/office/drawing/2014/main" id="{E8ACCD5D-CEF7-4138-8393-80A984DB604B}"/>
               </a:ext>
             </a:extLst>
           </p:cNvPr>
@@ -4150,36 +4150,6 @@
         </p:nvPicPr>
         <p:blipFill>
           <a:blip r:embed="rId2"/>
-          <a:stretch>
-            <a:fillRect/>
-          </a:stretch>
-        </p:blipFill>
-        <p:spPr>
-          <a:xfrm>
-            <a:off x="1078244" y="3965843"/>
-            <a:ext cx="4584589" cy="2755631"/>
-          </a:xfrm>
-          <a:prstGeom prst="rect">
-            <a:avLst/>
-          </a:prstGeom>
-        </p:spPr>
-      </p:pic>
-      <p:pic>
-        <p:nvPicPr>
-          <p:cNvPr id="24" name="Picture 23">
-            <a:extLst>
-              <a:ext uri="{FF2B5EF4-FFF2-40B4-BE49-F238E27FC236}">
-                <a16:creationId xmlns:a16="http://schemas.microsoft.com/office/drawing/2014/main" id="{E8ACCD5D-CEF7-4138-8393-80A984DB604B}"/>
-              </a:ext>
-            </a:extLst>
-          </p:cNvPr>
-          <p:cNvPicPr>
-            <a:picLocks noChangeAspect="1"/>
-          </p:cNvPicPr>
-          <p:nvPr/>
-        </p:nvPicPr>
-        <p:blipFill>
-          <a:blip r:embed="rId3"/>
           <a:stretch>
             <a:fillRect/>
           </a:stretch>
@@ -4209,7 +4179,7 @@
           <p:nvPr/>
         </p:nvPicPr>
         <p:blipFill>
-          <a:blip r:embed="rId4"/>
+          <a:blip r:embed="rId3"/>
           <a:stretch>
             <a:fillRect/>
           </a:stretch>
@@ -4226,10 +4196,40 @@
       </p:pic>
       <p:pic>
         <p:nvPicPr>
-          <p:cNvPr id="28" name="Picture 27">
-            <a:extLst>
-              <a:ext uri="{FF2B5EF4-FFF2-40B4-BE49-F238E27FC236}">
-                <a16:creationId xmlns:a16="http://schemas.microsoft.com/office/drawing/2014/main" id="{FAC43573-93F7-4E83-A23A-3603456A728B}"/>
+          <p:cNvPr id="4" name="Picture 3">
+            <a:extLst>
+              <a:ext uri="{FF2B5EF4-FFF2-40B4-BE49-F238E27FC236}">
+                <a16:creationId xmlns:a16="http://schemas.microsoft.com/office/drawing/2014/main" id="{29DCE8C2-07E2-4170-8251-F24D14B6E093}"/>
+              </a:ext>
+            </a:extLst>
+          </p:cNvPr>
+          <p:cNvPicPr>
+            <a:picLocks noChangeAspect="1"/>
+          </p:cNvPicPr>
+          <p:nvPr/>
+        </p:nvPicPr>
+        <p:blipFill>
+          <a:blip r:embed="rId4"/>
+          <a:stretch>
+            <a:fillRect/>
+          </a:stretch>
+        </p:blipFill>
+        <p:spPr>
+          <a:xfrm>
+            <a:off x="1071313" y="3965842"/>
+            <a:ext cx="4584589" cy="2755631"/>
+          </a:xfrm>
+          <a:prstGeom prst="rect">
+            <a:avLst/>
+          </a:prstGeom>
+        </p:spPr>
+      </p:pic>
+      <p:pic>
+        <p:nvPicPr>
+          <p:cNvPr id="5" name="Picture 4">
+            <a:extLst>
+              <a:ext uri="{FF2B5EF4-FFF2-40B4-BE49-F238E27FC236}">
+                <a16:creationId xmlns:a16="http://schemas.microsoft.com/office/drawing/2014/main" id="{92745C09-AABD-44AE-8C31-44463CE11E61}"/>
               </a:ext>
             </a:extLst>
           </p:cNvPr>
@@ -4246,7 +4246,7 @@
         </p:blipFill>
         <p:spPr>
           <a:xfrm>
-            <a:off x="1071313" y="1113822"/>
+            <a:off x="1071312" y="1113821"/>
             <a:ext cx="4584589" cy="2755631"/>
           </a:xfrm>
           <a:prstGeom prst="rect">
@@ -14969,6 +14969,36 @@
           </a:p>
         </p:txBody>
       </p:sp>
+      <p:pic>
+        <p:nvPicPr>
+          <p:cNvPr id="8" name="Picture 7">
+            <a:extLst>
+              <a:ext uri="{FF2B5EF4-FFF2-40B4-BE49-F238E27FC236}">
+                <a16:creationId xmlns:a16="http://schemas.microsoft.com/office/drawing/2014/main" id="{5DA01102-5E5C-4728-AE46-E16D7B9BD07D}"/>
+              </a:ext>
+            </a:extLst>
+          </p:cNvPr>
+          <p:cNvPicPr>
+            <a:picLocks noChangeAspect="1"/>
+          </p:cNvPicPr>
+          <p:nvPr/>
+        </p:nvPicPr>
+        <p:blipFill>
+          <a:blip r:embed="rId2"/>
+          <a:stretch>
+            <a:fillRect/>
+          </a:stretch>
+        </p:blipFill>
+        <p:spPr>
+          <a:xfrm>
+            <a:off x="365263" y="1291943"/>
+            <a:ext cx="11461473" cy="4889416"/>
+          </a:xfrm>
+          <a:prstGeom prst="rect">
+            <a:avLst/>
+          </a:prstGeom>
+        </p:spPr>
+      </p:pic>
     </p:spTree>
     <p:extLst>
       <p:ext uri="{BB962C8B-B14F-4D97-AF65-F5344CB8AC3E}">

</xml_diff>